<commit_message>
Added chapter 2 in teory
</commit_message>
<xml_diff>
--- a/Prezentacja Praca Inż.pptx
+++ b/Prezentacja Praca Inż.pptx
@@ -19,6 +19,8 @@
     <p:sldId id="266" r:id="rId13"/>
     <p:sldId id="267" r:id="rId14"/>
     <p:sldId id="269" r:id="rId15"/>
+    <p:sldId id="270" r:id="rId16"/>
+    <p:sldId id="271" r:id="rId17"/>
   </p:sldIdLst>
   <p:sldSz cx="9144000" cy="6858000" type="screen4x3"/>
   <p:notesSz cx="6858000" cy="9144000"/>
@@ -293,7 +295,8 @@
           <a:p>
             <a:fld id="{E2699B8C-B7F7-4D4D-90D9-FF159D88763D}" type="datetimeFigureOut">
               <a:rPr lang="pl-PL" smtClean="0"/>
-              <a:t>17.01.2022</a:t>
+              <a:pPr/>
+              <a:t>18.01.2022</a:t>
             </a:fld>
             <a:endParaRPr lang="pl-PL"/>
           </a:p>
@@ -335,6 +338,7 @@
           <a:p>
             <a:fld id="{ABB6616C-FD9B-4419-A183-8B942468E50F}" type="slidenum">
               <a:rPr lang="pl-PL" smtClean="0"/>
+              <a:pPr/>
               <a:t>‹#›</a:t>
             </a:fld>
             <a:endParaRPr lang="pl-PL"/>
@@ -458,7 +462,8 @@
           <a:p>
             <a:fld id="{E2699B8C-B7F7-4D4D-90D9-FF159D88763D}" type="datetimeFigureOut">
               <a:rPr lang="pl-PL" smtClean="0"/>
-              <a:t>17.01.2022</a:t>
+              <a:pPr/>
+              <a:t>18.01.2022</a:t>
             </a:fld>
             <a:endParaRPr lang="pl-PL"/>
           </a:p>
@@ -500,6 +505,7 @@
           <a:p>
             <a:fld id="{ABB6616C-FD9B-4419-A183-8B942468E50F}" type="slidenum">
               <a:rPr lang="pl-PL" smtClean="0"/>
+              <a:pPr/>
               <a:t>‹#›</a:t>
             </a:fld>
             <a:endParaRPr lang="pl-PL"/>
@@ -633,7 +639,8 @@
           <a:p>
             <a:fld id="{E2699B8C-B7F7-4D4D-90D9-FF159D88763D}" type="datetimeFigureOut">
               <a:rPr lang="pl-PL" smtClean="0"/>
-              <a:t>17.01.2022</a:t>
+              <a:pPr/>
+              <a:t>18.01.2022</a:t>
             </a:fld>
             <a:endParaRPr lang="pl-PL"/>
           </a:p>
@@ -675,6 +682,7 @@
           <a:p>
             <a:fld id="{ABB6616C-FD9B-4419-A183-8B942468E50F}" type="slidenum">
               <a:rPr lang="pl-PL" smtClean="0"/>
+              <a:pPr/>
               <a:t>‹#›</a:t>
             </a:fld>
             <a:endParaRPr lang="pl-PL"/>
@@ -798,7 +806,8 @@
           <a:p>
             <a:fld id="{E2699B8C-B7F7-4D4D-90D9-FF159D88763D}" type="datetimeFigureOut">
               <a:rPr lang="pl-PL" smtClean="0"/>
-              <a:t>17.01.2022</a:t>
+              <a:pPr/>
+              <a:t>18.01.2022</a:t>
             </a:fld>
             <a:endParaRPr lang="pl-PL"/>
           </a:p>
@@ -840,6 +849,7 @@
           <a:p>
             <a:fld id="{ABB6616C-FD9B-4419-A183-8B942468E50F}" type="slidenum">
               <a:rPr lang="pl-PL" smtClean="0"/>
+              <a:pPr/>
               <a:t>‹#›</a:t>
             </a:fld>
             <a:endParaRPr lang="pl-PL"/>
@@ -1040,7 +1050,8 @@
           <a:p>
             <a:fld id="{E2699B8C-B7F7-4D4D-90D9-FF159D88763D}" type="datetimeFigureOut">
               <a:rPr lang="pl-PL" smtClean="0"/>
-              <a:t>17.01.2022</a:t>
+              <a:pPr/>
+              <a:t>18.01.2022</a:t>
             </a:fld>
             <a:endParaRPr lang="pl-PL"/>
           </a:p>
@@ -1082,6 +1093,7 @@
           <a:p>
             <a:fld id="{ABB6616C-FD9B-4419-A183-8B942468E50F}" type="slidenum">
               <a:rPr lang="pl-PL" smtClean="0"/>
+              <a:pPr/>
               <a:t>‹#›</a:t>
             </a:fld>
             <a:endParaRPr lang="pl-PL"/>
@@ -1304,7 +1316,8 @@
           <a:p>
             <a:fld id="{E2699B8C-B7F7-4D4D-90D9-FF159D88763D}" type="datetimeFigureOut">
               <a:rPr lang="pl-PL" smtClean="0"/>
-              <a:t>17.01.2022</a:t>
+              <a:pPr/>
+              <a:t>18.01.2022</a:t>
             </a:fld>
             <a:endParaRPr lang="pl-PL"/>
           </a:p>
@@ -1346,6 +1359,7 @@
           <a:p>
             <a:fld id="{ABB6616C-FD9B-4419-A183-8B942468E50F}" type="slidenum">
               <a:rPr lang="pl-PL" smtClean="0"/>
+              <a:pPr/>
               <a:t>‹#›</a:t>
             </a:fld>
             <a:endParaRPr lang="pl-PL"/>
@@ -1682,7 +1696,8 @@
           <a:p>
             <a:fld id="{E2699B8C-B7F7-4D4D-90D9-FF159D88763D}" type="datetimeFigureOut">
               <a:rPr lang="pl-PL" smtClean="0"/>
-              <a:t>17.01.2022</a:t>
+              <a:pPr/>
+              <a:t>18.01.2022</a:t>
             </a:fld>
             <a:endParaRPr lang="pl-PL"/>
           </a:p>
@@ -1724,6 +1739,7 @@
           <a:p>
             <a:fld id="{ABB6616C-FD9B-4419-A183-8B942468E50F}" type="slidenum">
               <a:rPr lang="pl-PL" smtClean="0"/>
+              <a:pPr/>
               <a:t>‹#›</a:t>
             </a:fld>
             <a:endParaRPr lang="pl-PL"/>
@@ -1832,7 +1848,8 @@
           <a:p>
             <a:fld id="{E2699B8C-B7F7-4D4D-90D9-FF159D88763D}" type="datetimeFigureOut">
               <a:rPr lang="pl-PL" smtClean="0"/>
-              <a:t>17.01.2022</a:t>
+              <a:pPr/>
+              <a:t>18.01.2022</a:t>
             </a:fld>
             <a:endParaRPr lang="pl-PL"/>
           </a:p>
@@ -1874,6 +1891,7 @@
           <a:p>
             <a:fld id="{ABB6616C-FD9B-4419-A183-8B942468E50F}" type="slidenum">
               <a:rPr lang="pl-PL" smtClean="0"/>
+              <a:pPr/>
               <a:t>‹#›</a:t>
             </a:fld>
             <a:endParaRPr lang="pl-PL"/>
@@ -1922,7 +1940,8 @@
           <a:p>
             <a:fld id="{E2699B8C-B7F7-4D4D-90D9-FF159D88763D}" type="datetimeFigureOut">
               <a:rPr lang="pl-PL" smtClean="0"/>
-              <a:t>17.01.2022</a:t>
+              <a:pPr/>
+              <a:t>18.01.2022</a:t>
             </a:fld>
             <a:endParaRPr lang="pl-PL"/>
           </a:p>
@@ -1964,6 +1983,7 @@
           <a:p>
             <a:fld id="{ABB6616C-FD9B-4419-A183-8B942468E50F}" type="slidenum">
               <a:rPr lang="pl-PL" smtClean="0"/>
+              <a:pPr/>
               <a:t>‹#›</a:t>
             </a:fld>
             <a:endParaRPr lang="pl-PL"/>
@@ -2183,7 +2203,8 @@
           <a:p>
             <a:fld id="{E2699B8C-B7F7-4D4D-90D9-FF159D88763D}" type="datetimeFigureOut">
               <a:rPr lang="pl-PL" smtClean="0"/>
-              <a:t>17.01.2022</a:t>
+              <a:pPr/>
+              <a:t>18.01.2022</a:t>
             </a:fld>
             <a:endParaRPr lang="pl-PL"/>
           </a:p>
@@ -2225,6 +2246,7 @@
           <a:p>
             <a:fld id="{ABB6616C-FD9B-4419-A183-8B942468E50F}" type="slidenum">
               <a:rPr lang="pl-PL" smtClean="0"/>
+              <a:pPr/>
               <a:t>‹#›</a:t>
             </a:fld>
             <a:endParaRPr lang="pl-PL"/>
@@ -2471,7 +2493,8 @@
           <a:p>
             <a:fld id="{E2699B8C-B7F7-4D4D-90D9-FF159D88763D}" type="datetimeFigureOut">
               <a:rPr lang="pl-PL" smtClean="0"/>
-              <a:t>17.01.2022</a:t>
+              <a:pPr/>
+              <a:t>18.01.2022</a:t>
             </a:fld>
             <a:endParaRPr lang="pl-PL"/>
           </a:p>
@@ -2518,6 +2541,7 @@
           <a:p>
             <a:fld id="{ABB6616C-FD9B-4419-A183-8B942468E50F}" type="slidenum">
               <a:rPr lang="pl-PL" smtClean="0"/>
+              <a:pPr/>
               <a:t>‹#›</a:t>
             </a:fld>
             <a:endParaRPr lang="pl-PL"/>
@@ -3242,7 +3266,8 @@
           <a:p>
             <a:fld id="{E2699B8C-B7F7-4D4D-90D9-FF159D88763D}" type="datetimeFigureOut">
               <a:rPr lang="pl-PL" smtClean="0"/>
-              <a:t>17.01.2022</a:t>
+              <a:pPr/>
+              <a:t>18.01.2022</a:t>
             </a:fld>
             <a:endParaRPr lang="pl-PL"/>
           </a:p>
@@ -3320,6 +3345,7 @@
           <a:p>
             <a:fld id="{ABB6616C-FD9B-4419-A183-8B942468E50F}" type="slidenum">
               <a:rPr lang="pl-PL" smtClean="0"/>
+              <a:pPr/>
               <a:t>‹#›</a:t>
             </a:fld>
             <a:endParaRPr lang="pl-PL"/>
@@ -4129,11 +4155,7 @@
             </a:r>
             <a:r>
               <a:rPr lang="pl-PL" b="1" i="1" dirty="0" smtClean="0"/>
-              <a:t> </a:t>
-            </a:r>
-            <a:r>
-              <a:rPr lang="pl-PL" b="1" i="1" dirty="0" smtClean="0"/>
-              <a:t>oraz </a:t>
+              <a:t> oraz </a:t>
             </a:r>
             <a:r>
               <a:rPr lang="pl-PL" b="1" i="1" dirty="0" err="1" smtClean="0"/>
@@ -4169,7 +4191,6 @@
               <a:rPr lang="pl-PL" sz="1300" dirty="0" smtClean="0"/>
               <a:t>”, a pozycja zostanie dodana do listy.</a:t>
             </a:r>
-            <a:endParaRPr lang="pl-PL" sz="1300" dirty="0" smtClean="0"/>
           </a:p>
           <a:p>
             <a:endParaRPr lang="pl-PL" sz="1500" dirty="0"/>
@@ -4308,6 +4329,36 @@
           <a:effectLst/>
         </p:spPr>
       </p:pic>
+      <p:sp>
+        <p:nvSpPr>
+          <p:cNvPr id="7" name="pole tekstowe 6"/>
+          <p:cNvSpPr txBox="1"/>
+          <p:nvPr/>
+        </p:nvSpPr>
+        <p:spPr>
+          <a:xfrm>
+            <a:off x="8762164" y="6488668"/>
+            <a:ext cx="381836" cy="369332"/>
+          </a:xfrm>
+          <a:prstGeom prst="rect">
+            <a:avLst/>
+          </a:prstGeom>
+          <a:noFill/>
+        </p:spPr>
+        <p:txBody>
+          <a:bodyPr wrap="none" rtlCol="0">
+            <a:spAutoFit/>
+          </a:bodyPr>
+          <a:lstStyle/>
+          <a:p>
+            <a:r>
+              <a:rPr lang="pl-PL" dirty="0" smtClean="0"/>
+              <a:t>10</a:t>
+            </a:r>
+            <a:endParaRPr lang="pl-PL" dirty="0"/>
+          </a:p>
+        </p:txBody>
+      </p:sp>
     </p:spTree>
   </p:cSld>
   <p:clrMapOvr>
@@ -4400,10 +4451,105 @@
               <a:rPr lang="pl-PL" sz="1300" dirty="0" smtClean="0"/>
               <a:t>. Po kliknięciu w przycisk zostajemy przeniesieni do fragmentu tworzącego wiersz.</a:t>
             </a:r>
-            <a:endParaRPr lang="pl-PL" sz="1300" dirty="0" smtClean="0"/>
           </a:p>
           <a:p>
             <a:endParaRPr lang="pl-PL" sz="1500" dirty="0"/>
+          </a:p>
+        </p:txBody>
+      </p:sp>
+      <p:pic>
+        <p:nvPicPr>
+          <p:cNvPr id="5121" name="Picture 1"/>
+          <p:cNvPicPr>
+            <a:picLocks noChangeAspect="1" noChangeArrowheads="1"/>
+          </p:cNvPicPr>
+          <p:nvPr/>
+        </p:nvPicPr>
+        <p:blipFill>
+          <a:blip r:embed="rId2"/>
+          <a:srcRect/>
+          <a:stretch>
+            <a:fillRect/>
+          </a:stretch>
+        </p:blipFill>
+        <p:spPr bwMode="auto">
+          <a:xfrm>
+            <a:off x="571472" y="2214554"/>
+            <a:ext cx="2506534" cy="4357721"/>
+          </a:xfrm>
+          <a:prstGeom prst="rect">
+            <a:avLst/>
+          </a:prstGeom>
+          <a:noFill/>
+          <a:ln w="9525">
+            <a:noFill/>
+            <a:miter lim="800000"/>
+            <a:headEnd/>
+            <a:tailEnd/>
+          </a:ln>
+          <a:effectLst/>
+        </p:spPr>
+      </p:pic>
+      <p:pic>
+        <p:nvPicPr>
+          <p:cNvPr id="5122" name="Picture 2"/>
+          <p:cNvPicPr>
+            <a:picLocks noChangeAspect="1" noChangeArrowheads="1"/>
+          </p:cNvPicPr>
+          <p:nvPr/>
+        </p:nvPicPr>
+        <p:blipFill>
+          <a:blip r:embed="rId3"/>
+          <a:srcRect/>
+          <a:stretch>
+            <a:fillRect/>
+          </a:stretch>
+        </p:blipFill>
+        <p:spPr bwMode="auto">
+          <a:xfrm>
+            <a:off x="3500430" y="2214554"/>
+            <a:ext cx="2499764" cy="4357697"/>
+          </a:xfrm>
+          <a:prstGeom prst="rect">
+            <a:avLst/>
+          </a:prstGeom>
+          <a:noFill/>
+          <a:ln w="9525">
+            <a:noFill/>
+            <a:miter lim="800000"/>
+            <a:headEnd/>
+            <a:tailEnd/>
+          </a:ln>
+          <a:effectLst/>
+        </p:spPr>
+      </p:pic>
+      <p:sp>
+        <p:nvSpPr>
+          <p:cNvPr id="5" name="pole tekstowe 4"/>
+          <p:cNvSpPr txBox="1"/>
+          <p:nvPr/>
+        </p:nvSpPr>
+        <p:spPr>
+          <a:xfrm>
+            <a:off x="8815064" y="6488668"/>
+            <a:ext cx="328936" cy="369332"/>
+          </a:xfrm>
+          <a:prstGeom prst="rect">
+            <a:avLst/>
+          </a:prstGeom>
+          <a:noFill/>
+        </p:spPr>
+        <p:txBody>
+          <a:bodyPr wrap="none" rtlCol="0">
+            <a:spAutoFit/>
+          </a:bodyPr>
+          <a:lstStyle/>
+          <a:p>
+            <a:r>
+              <a:rPr lang="pl-PL" dirty="0" smtClean="0"/>
+              <a:t>11</a:t>
+            </a:r>
+            <a:endParaRPr lang="pl-PL" dirty="0"/>
           </a:p>
         </p:txBody>
       </p:sp>
@@ -4475,7 +4621,6 @@
               <a:rPr lang="pl-PL" sz="1300" dirty="0" smtClean="0"/>
               <a:t>Po dodaniu pozycji do alergii, istnieje możliwość dodania komentarza, który pełni funkcję pomocniczą, w przypadku ponownego kontaktu z alergenem. Listę można sortować według typów pozycji. Po kliknięciu w pozycje, następuje przeniesienie do fragmentu zawierającego wszystkie informacje. Usunięcie alergii odbywa się poprzek kliknięcie w ikonę kosza.</a:t>
             </a:r>
-            <a:endParaRPr lang="pl-PL" sz="1300" dirty="0" smtClean="0"/>
           </a:p>
           <a:p>
             <a:endParaRPr lang="pl-PL" sz="1500" dirty="0"/>
@@ -4565,7 +4710,7 @@
         </p:blipFill>
         <p:spPr bwMode="auto">
           <a:xfrm>
-            <a:off x="6286512" y="2143116"/>
+            <a:off x="6143636" y="2143116"/>
             <a:ext cx="2601280" cy="4515029"/>
           </a:xfrm>
           <a:prstGeom prst="rect">
@@ -4581,6 +4726,36 @@
           <a:effectLst/>
         </p:spPr>
       </p:pic>
+      <p:sp>
+        <p:nvSpPr>
+          <p:cNvPr id="6" name="pole tekstowe 5"/>
+          <p:cNvSpPr txBox="1"/>
+          <p:nvPr/>
+        </p:nvSpPr>
+        <p:spPr>
+          <a:xfrm>
+            <a:off x="8774988" y="6488668"/>
+            <a:ext cx="369012" cy="369332"/>
+          </a:xfrm>
+          <a:prstGeom prst="rect">
+            <a:avLst/>
+          </a:prstGeom>
+          <a:noFill/>
+        </p:spPr>
+        <p:txBody>
+          <a:bodyPr wrap="none" rtlCol="0">
+            <a:spAutoFit/>
+          </a:bodyPr>
+          <a:lstStyle/>
+          <a:p>
+            <a:r>
+              <a:rPr lang="pl-PL" dirty="0" smtClean="0"/>
+              <a:t>12</a:t>
+            </a:r>
+            <a:endParaRPr lang="pl-PL" dirty="0"/>
+          </a:p>
+        </p:txBody>
+      </p:sp>
     </p:spTree>
   </p:cSld>
   <p:clrMapOvr>
@@ -4671,7 +4846,7 @@
         </p:blipFill>
         <p:spPr bwMode="auto">
           <a:xfrm>
-            <a:off x="785786" y="2000240"/>
+            <a:off x="1357290" y="2000240"/>
             <a:ext cx="2723656" cy="4724412"/>
           </a:xfrm>
           <a:prstGeom prst="rect">
@@ -4687,6 +4862,69 @@
           <a:effectLst/>
         </p:spPr>
       </p:pic>
+      <p:pic>
+        <p:nvPicPr>
+          <p:cNvPr id="3073" name="Picture 1"/>
+          <p:cNvPicPr>
+            <a:picLocks noChangeAspect="1" noChangeArrowheads="1"/>
+          </p:cNvPicPr>
+          <p:nvPr/>
+        </p:nvPicPr>
+        <p:blipFill>
+          <a:blip r:embed="rId3"/>
+          <a:srcRect/>
+          <a:stretch>
+            <a:fillRect/>
+          </a:stretch>
+        </p:blipFill>
+        <p:spPr bwMode="auto">
+          <a:xfrm>
+            <a:off x="5187253" y="2000240"/>
+            <a:ext cx="2670895" cy="4643470"/>
+          </a:xfrm>
+          <a:prstGeom prst="rect">
+            <a:avLst/>
+          </a:prstGeom>
+          <a:noFill/>
+          <a:ln w="9525">
+            <a:noFill/>
+            <a:miter lim="800000"/>
+            <a:headEnd/>
+            <a:tailEnd/>
+          </a:ln>
+          <a:effectLst/>
+        </p:spPr>
+      </p:pic>
+      <p:sp>
+        <p:nvSpPr>
+          <p:cNvPr id="5" name="pole tekstowe 4"/>
+          <p:cNvSpPr txBox="1"/>
+          <p:nvPr/>
+        </p:nvSpPr>
+        <p:spPr>
+          <a:xfrm>
+            <a:off x="8783645" y="6488668"/>
+            <a:ext cx="360355" cy="369332"/>
+          </a:xfrm>
+          <a:prstGeom prst="rect">
+            <a:avLst/>
+          </a:prstGeom>
+          <a:noFill/>
+        </p:spPr>
+        <p:txBody>
+          <a:bodyPr wrap="none" rtlCol="0">
+            <a:spAutoFit/>
+          </a:bodyPr>
+          <a:lstStyle/>
+          <a:p>
+            <a:r>
+              <a:rPr lang="pl-PL" dirty="0" smtClean="0"/>
+              <a:t>13</a:t>
+            </a:r>
+            <a:endParaRPr lang="pl-PL" dirty="0"/>
+          </a:p>
+        </p:txBody>
+      </p:sp>
     </p:spTree>
   </p:cSld>
   <p:clrMapOvr>
@@ -4855,6 +5093,457 @@
           <a:effectLst/>
         </p:spPr>
       </p:pic>
+      <p:sp>
+        <p:nvSpPr>
+          <p:cNvPr id="6" name="pole tekstowe 5"/>
+          <p:cNvSpPr txBox="1"/>
+          <p:nvPr/>
+        </p:nvSpPr>
+        <p:spPr>
+          <a:xfrm>
+            <a:off x="8765370" y="6488668"/>
+            <a:ext cx="378630" cy="369332"/>
+          </a:xfrm>
+          <a:prstGeom prst="rect">
+            <a:avLst/>
+          </a:prstGeom>
+          <a:noFill/>
+        </p:spPr>
+        <p:txBody>
+          <a:bodyPr wrap="none" rtlCol="0">
+            <a:spAutoFit/>
+          </a:bodyPr>
+          <a:lstStyle/>
+          <a:p>
+            <a:r>
+              <a:rPr lang="pl-PL" dirty="0" smtClean="0"/>
+              <a:t>14</a:t>
+            </a:r>
+            <a:endParaRPr lang="pl-PL" dirty="0"/>
+          </a:p>
+        </p:txBody>
+      </p:sp>
+    </p:spTree>
+  </p:cSld>
+  <p:clrMapOvr>
+    <a:masterClrMapping/>
+  </p:clrMapOvr>
+</p:sld>
+</file>
+
+<file path=ppt/slides/slide15.xml><?xml version="1.0" encoding="utf-8"?>
+<p:sld xmlns:a="http://schemas.openxmlformats.org/drawingml/2006/main" xmlns:r="http://schemas.openxmlformats.org/officeDocument/2006/relationships" xmlns:p="http://schemas.openxmlformats.org/presentationml/2006/main">
+  <p:cSld>
+    <p:spTree>
+      <p:nvGrpSpPr>
+        <p:cNvPr id="1" name=""/>
+        <p:cNvGrpSpPr/>
+        <p:nvPr/>
+      </p:nvGrpSpPr>
+      <p:grpSpPr>
+        <a:xfrm>
+          <a:off x="0" y="0"/>
+          <a:ext cx="0" cy="0"/>
+          <a:chOff x="0" y="0"/>
+          <a:chExt cx="0" cy="0"/>
+        </a:xfrm>
+      </p:grpSpPr>
+      <p:sp>
+        <p:nvSpPr>
+          <p:cNvPr id="2" name="Tytuł 1"/>
+          <p:cNvSpPr>
+            <a:spLocks noGrp="1"/>
+          </p:cNvSpPr>
+          <p:nvPr>
+            <p:ph type="title"/>
+          </p:nvPr>
+        </p:nvSpPr>
+        <p:spPr/>
+        <p:txBody>
+          <a:bodyPr/>
+          <a:lstStyle/>
+          <a:p>
+            <a:r>
+              <a:rPr lang="pl-PL" dirty="0" smtClean="0"/>
+              <a:t>Podsumowanie</a:t>
+            </a:r>
+            <a:endParaRPr lang="pl-PL" dirty="0"/>
+          </a:p>
+        </p:txBody>
+      </p:sp>
+      <p:sp>
+        <p:nvSpPr>
+          <p:cNvPr id="3" name="Symbol zastępczy zawartości 2"/>
+          <p:cNvSpPr>
+            <a:spLocks noGrp="1"/>
+          </p:cNvSpPr>
+          <p:nvPr>
+            <p:ph sz="half" idx="1"/>
+          </p:nvPr>
+        </p:nvSpPr>
+        <p:spPr>
+          <a:xfrm>
+            <a:off x="457200" y="1920085"/>
+            <a:ext cx="8472518" cy="1437477"/>
+          </a:xfrm>
+        </p:spPr>
+        <p:txBody>
+          <a:bodyPr>
+            <a:normAutofit fontScale="92500" lnSpcReduction="10000"/>
+          </a:bodyPr>
+          <a:lstStyle/>
+          <a:p>
+            <a:pPr>
+              <a:buNone/>
+            </a:pPr>
+            <a:r>
+              <a:rPr lang="pl-PL" dirty="0" smtClean="0"/>
+              <a:t>Po zapoznaniu się z obecnie dostępnym aplikacjami oraz wymaganiami alergików, stworzona została aplikacja która oferuje rozwiązania niedostępne dotychczas. Wszystkie założenia zostały zrealizowane. </a:t>
+            </a:r>
+            <a:endParaRPr lang="pl-PL" dirty="0"/>
+          </a:p>
+        </p:txBody>
+      </p:sp>
+      <p:pic>
+        <p:nvPicPr>
+          <p:cNvPr id="1025" name="Picture 1"/>
+          <p:cNvPicPr>
+            <a:picLocks noGrp="1" noChangeAspect="1" noChangeArrowheads="1"/>
+          </p:cNvPicPr>
+          <p:nvPr>
+            <p:ph sz="half" idx="2"/>
+          </p:nvPr>
+        </p:nvPicPr>
+        <p:blipFill>
+          <a:blip r:embed="rId2"/>
+          <a:srcRect/>
+          <a:stretch>
+            <a:fillRect/>
+          </a:stretch>
+        </p:blipFill>
+        <p:spPr bwMode="auto">
+          <a:xfrm>
+            <a:off x="1928794" y="3786190"/>
+            <a:ext cx="5173444" cy="2279665"/>
+          </a:xfrm>
+          <a:prstGeom prst="rect">
+            <a:avLst/>
+          </a:prstGeom>
+          <a:noFill/>
+          <a:ln w="9525">
+            <a:noFill/>
+            <a:miter lim="800000"/>
+            <a:headEnd/>
+            <a:tailEnd/>
+          </a:ln>
+          <a:effectLst/>
+        </p:spPr>
+      </p:pic>
+      <p:sp>
+        <p:nvSpPr>
+          <p:cNvPr id="7" name="pole tekstowe 6"/>
+          <p:cNvSpPr txBox="1"/>
+          <p:nvPr/>
+        </p:nvSpPr>
+        <p:spPr>
+          <a:xfrm>
+            <a:off x="8781593" y="6488668"/>
+            <a:ext cx="362407" cy="369332"/>
+          </a:xfrm>
+          <a:prstGeom prst="rect">
+            <a:avLst/>
+          </a:prstGeom>
+          <a:noFill/>
+        </p:spPr>
+        <p:txBody>
+          <a:bodyPr wrap="none" rtlCol="0">
+            <a:spAutoFit/>
+          </a:bodyPr>
+          <a:lstStyle/>
+          <a:p>
+            <a:r>
+              <a:rPr lang="pl-PL" dirty="0" smtClean="0"/>
+              <a:t>15</a:t>
+            </a:r>
+            <a:endParaRPr lang="pl-PL" dirty="0"/>
+          </a:p>
+        </p:txBody>
+      </p:sp>
+    </p:spTree>
+  </p:cSld>
+  <p:clrMapOvr>
+    <a:masterClrMapping/>
+  </p:clrMapOvr>
+</p:sld>
+</file>
+
+<file path=ppt/slides/slide16.xml><?xml version="1.0" encoding="utf-8"?>
+<p:sld xmlns:a="http://schemas.openxmlformats.org/drawingml/2006/main" xmlns:r="http://schemas.openxmlformats.org/officeDocument/2006/relationships" xmlns:p="http://schemas.openxmlformats.org/presentationml/2006/main">
+  <p:cSld>
+    <p:spTree>
+      <p:nvGrpSpPr>
+        <p:cNvPr id="1" name=""/>
+        <p:cNvGrpSpPr/>
+        <p:nvPr/>
+      </p:nvGrpSpPr>
+      <p:grpSpPr>
+        <a:xfrm>
+          <a:off x="0" y="0"/>
+          <a:ext cx="0" cy="0"/>
+          <a:chOff x="0" y="0"/>
+          <a:chExt cx="0" cy="0"/>
+        </a:xfrm>
+      </p:grpSpPr>
+      <p:sp>
+        <p:nvSpPr>
+          <p:cNvPr id="2" name="Tytuł 1"/>
+          <p:cNvSpPr>
+            <a:spLocks noGrp="1"/>
+          </p:cNvSpPr>
+          <p:nvPr>
+            <p:ph type="title"/>
+          </p:nvPr>
+        </p:nvSpPr>
+        <p:spPr/>
+        <p:txBody>
+          <a:bodyPr/>
+          <a:lstStyle/>
+          <a:p>
+            <a:r>
+              <a:rPr lang="pl-PL" dirty="0" smtClean="0"/>
+              <a:t>Bibliografia</a:t>
+            </a:r>
+            <a:endParaRPr lang="pl-PL" dirty="0"/>
+          </a:p>
+        </p:txBody>
+      </p:sp>
+      <p:sp>
+        <p:nvSpPr>
+          <p:cNvPr id="3" name="Symbol zastępczy zawartości 2"/>
+          <p:cNvSpPr>
+            <a:spLocks noGrp="1"/>
+          </p:cNvSpPr>
+          <p:nvPr>
+            <p:ph sz="half" idx="1"/>
+          </p:nvPr>
+        </p:nvSpPr>
+        <p:spPr>
+          <a:xfrm>
+            <a:off x="457200" y="1920085"/>
+            <a:ext cx="8543956" cy="4434840"/>
+          </a:xfrm>
+        </p:spPr>
+        <p:txBody>
+          <a:bodyPr>
+            <a:normAutofit fontScale="92500" lnSpcReduction="20000"/>
+          </a:bodyPr>
+          <a:lstStyle/>
+          <a:p>
+            <a:pPr>
+              <a:buNone/>
+            </a:pPr>
+            <a:r>
+              <a:rPr lang="pl-PL" dirty="0" smtClean="0"/>
+              <a:t>1.  </a:t>
+            </a:r>
+            <a:r>
+              <a:rPr lang="pl-PL" dirty="0" err="1" smtClean="0"/>
+              <a:t>Statista</a:t>
+            </a:r>
+            <a:r>
+              <a:rPr lang="pl-PL" dirty="0" smtClean="0"/>
+              <a:t> [dostęp: 12 grudnia 2022]</a:t>
+            </a:r>
+          </a:p>
+          <a:p>
+            <a:pPr>
+              <a:buNone/>
+            </a:pPr>
+            <a:r>
+              <a:rPr lang="pl-PL" u="sng" dirty="0" smtClean="0">
+                <a:hlinkClick r:id="rId2"/>
+              </a:rPr>
+              <a:t>https://</a:t>
+            </a:r>
+            <a:r>
+              <a:rPr lang="pl-PL" u="sng" dirty="0" smtClean="0">
+                <a:hlinkClick r:id="rId2"/>
+              </a:rPr>
+              <a:t>www.statista.com/statistics/330695/number-of-smartphone-users-worldwide</a:t>
+            </a:r>
+            <a:r>
+              <a:rPr lang="pl-PL" u="sng" dirty="0" smtClean="0">
+                <a:hlinkClick r:id="rId2"/>
+              </a:rPr>
+              <a:t>/</a:t>
+            </a:r>
+            <a:endParaRPr lang="pl-PL" dirty="0" smtClean="0"/>
+          </a:p>
+          <a:p>
+            <a:pPr>
+              <a:buNone/>
+            </a:pPr>
+            <a:r>
+              <a:rPr lang="pl-PL" dirty="0" smtClean="0"/>
+              <a:t>2.  </a:t>
+            </a:r>
+            <a:r>
+              <a:rPr lang="pl-PL" dirty="0" err="1" smtClean="0"/>
+              <a:t>Statista</a:t>
+            </a:r>
+            <a:r>
+              <a:rPr lang="pl-PL" dirty="0" smtClean="0"/>
+              <a:t> [dostęp: 12 grudnia 2022]</a:t>
+            </a:r>
+          </a:p>
+          <a:p>
+            <a:pPr>
+              <a:buNone/>
+            </a:pPr>
+            <a:r>
+              <a:rPr lang="pl-PL" dirty="0" smtClean="0">
+                <a:hlinkClick r:id="rId3"/>
+              </a:rPr>
+              <a:t>https</a:t>
+            </a:r>
+            <a:r>
+              <a:rPr lang="pl-PL" dirty="0" smtClean="0">
+                <a:hlinkClick r:id="rId3"/>
+              </a:rPr>
+              <a:t>://</a:t>
+            </a:r>
+            <a:r>
+              <a:rPr lang="pl-PL" dirty="0" smtClean="0">
+                <a:hlinkClick r:id="rId3"/>
+              </a:rPr>
+              <a:t>www.statista.com/statistics/734332/google-play-app-installs-per-year/</a:t>
+            </a:r>
+            <a:endParaRPr lang="pl-PL" dirty="0" smtClean="0"/>
+          </a:p>
+          <a:p>
+            <a:pPr>
+              <a:buNone/>
+            </a:pPr>
+            <a:r>
+              <a:rPr lang="pl-PL" u="sng" dirty="0" smtClean="0"/>
+              <a:t>3. </a:t>
+            </a:r>
+            <a:r>
+              <a:rPr lang="pl-PL" dirty="0" err="1" smtClean="0"/>
+              <a:t>Muntenescu</a:t>
+            </a:r>
+            <a:r>
+              <a:rPr lang="pl-PL" dirty="0" smtClean="0"/>
+              <a:t> </a:t>
+            </a:r>
+            <a:r>
+              <a:rPr lang="pl-PL" dirty="0" err="1" smtClean="0"/>
+              <a:t>Florina</a:t>
+            </a:r>
+            <a:r>
+              <a:rPr lang="pl-PL" dirty="0" smtClean="0"/>
+              <a:t>, </a:t>
+            </a:r>
+            <a:r>
+              <a:rPr lang="pl-PL" i="1" dirty="0" smtClean="0"/>
+              <a:t>Android </a:t>
+            </a:r>
+            <a:r>
+              <a:rPr lang="pl-PL" i="1" dirty="0" err="1" smtClean="0"/>
+              <a:t>Architecture</a:t>
+            </a:r>
+            <a:r>
+              <a:rPr lang="pl-PL" i="1" dirty="0" smtClean="0"/>
+              <a:t> </a:t>
+            </a:r>
+            <a:r>
+              <a:rPr lang="pl-PL" i="1" dirty="0" err="1" smtClean="0"/>
+              <a:t>Patterns</a:t>
+            </a:r>
+            <a:r>
+              <a:rPr lang="pl-PL" i="1" dirty="0" smtClean="0"/>
+              <a:t> Part 2: </a:t>
+            </a:r>
+            <a:r>
+              <a:rPr lang="pl-PL" i="1" dirty="0" err="1" smtClean="0"/>
+              <a:t>Model-View-Presenter</a:t>
+            </a:r>
+            <a:r>
+              <a:rPr lang="pl-PL" i="1" dirty="0" smtClean="0"/>
+              <a:t> </a:t>
+            </a:r>
+            <a:r>
+              <a:rPr lang="pl-PL" dirty="0" smtClean="0"/>
+              <a:t>[</a:t>
+            </a:r>
+            <a:r>
+              <a:rPr lang="pl-PL" dirty="0" smtClean="0"/>
+              <a:t>dostęp </a:t>
+            </a:r>
+            <a:r>
+              <a:rPr lang="pl-PL" dirty="0" smtClean="0"/>
+              <a:t>12 </a:t>
+            </a:r>
+            <a:r>
+              <a:rPr lang="pl-PL" dirty="0" smtClean="0"/>
+              <a:t>grudnia </a:t>
+            </a:r>
+            <a:r>
+              <a:rPr lang="pl-PL" dirty="0" smtClean="0"/>
+              <a:t>2022] </a:t>
+            </a:r>
+            <a:endParaRPr lang="pl-PL" dirty="0" smtClean="0"/>
+          </a:p>
+          <a:p>
+            <a:pPr>
+              <a:buNone/>
+            </a:pPr>
+            <a:r>
+              <a:rPr lang="pl-PL" dirty="0" smtClean="0"/>
+              <a:t>https://</a:t>
+            </a:r>
+            <a:r>
+              <a:rPr lang="pl-PL" dirty="0" smtClean="0"/>
+              <a:t>medium.com/upday-devs/android-architecture-p</a:t>
+            </a:r>
+          </a:p>
+          <a:p>
+            <a:pPr>
+              <a:buNone/>
+            </a:pPr>
+            <a:r>
+              <a:rPr lang="pl-PL" dirty="0" smtClean="0"/>
+              <a:t>atterns-part-2-model-viewpresenter-8a6faaae14a5</a:t>
+            </a:r>
+          </a:p>
+          <a:p>
+            <a:pPr>
+              <a:buNone/>
+            </a:pPr>
+            <a:r>
+              <a:rPr lang="pl-PL" dirty="0" smtClean="0"/>
+              <a:t>4.</a:t>
+            </a:r>
+            <a:r>
+              <a:rPr lang="pl-PL" dirty="0" smtClean="0"/>
+              <a:t> Griffiths, Down, </a:t>
+            </a:r>
+            <a:r>
+              <a:rPr lang="pl-PL" i="1" dirty="0" smtClean="0"/>
+              <a:t>Android: programowanie aplikacji</a:t>
+            </a:r>
+            <a:r>
+              <a:rPr lang="pl-PL" dirty="0" smtClean="0"/>
+              <a:t>, Gliwice, Helion, 2016, </a:t>
+            </a:r>
+            <a:r>
+              <a:rPr lang="pl-PL" dirty="0" smtClean="0"/>
+              <a:t>ISBN978-83-283-2063-5 </a:t>
+            </a:r>
+            <a:endParaRPr lang="pl-PL" dirty="0"/>
+          </a:p>
+        </p:txBody>
+      </p:sp>
     </p:spTree>
   </p:cSld>
   <p:clrMapOvr>
@@ -4892,7 +5581,7 @@
         </p:nvSpPr>
         <p:spPr>
           <a:xfrm>
-            <a:off x="428596" y="500042"/>
+            <a:off x="428596" y="1142984"/>
             <a:ext cx="8229600" cy="785818"/>
           </a:xfrm>
         </p:spPr>
@@ -4945,7 +5634,7 @@
         </p:nvSpPr>
         <p:spPr>
           <a:xfrm>
-            <a:off x="428596" y="857232"/>
+            <a:off x="428596" y="1643050"/>
             <a:ext cx="8258204" cy="5467368"/>
           </a:xfrm>
         </p:spPr>
@@ -4969,21 +5658,8 @@
             </a:pPr>
             <a:r>
               <a:rPr lang="pl-PL" b="1" dirty="0" smtClean="0"/>
-              <a:t>1. </a:t>
-            </a:r>
-            <a:r>
-              <a:rPr lang="pl-PL" b="1" dirty="0" smtClean="0"/>
-              <a:t>WSTĘP							</a:t>
-            </a:r>
-            <a:r>
-              <a:rPr lang="pl-PL" b="1" dirty="0" smtClean="0"/>
-              <a:t>	</a:t>
-            </a:r>
-            <a:r>
-              <a:rPr lang="pl-PL" b="1" dirty="0" smtClean="0"/>
-              <a:t>11</a:t>
-            </a:r>
-            <a:endParaRPr lang="pl-PL" b="1" dirty="0" smtClean="0"/>
+              <a:t>1. WSTĘP								11</a:t>
+            </a:r>
           </a:p>
           <a:p>
             <a:pPr>
@@ -4995,15 +5671,7 @@
             </a:r>
             <a:r>
               <a:rPr lang="x-none" smtClean="0"/>
-              <a:t>1.1</a:t>
-            </a:r>
-            <a:r>
-              <a:rPr lang="x-none" smtClean="0"/>
-              <a:t>. Motywacja - problem </a:t>
-            </a:r>
-            <a:r>
-              <a:rPr lang="x-none" smtClean="0"/>
-              <a:t>alergii </a:t>
+              <a:t>1.1. Motywacja - problem alergii </a:t>
             </a:r>
             <a:r>
               <a:rPr lang="pl-PL" dirty="0" smtClean="0"/>
@@ -5034,19 +5702,7 @@
             </a:pPr>
             <a:r>
               <a:rPr lang="pl-PL" dirty="0" smtClean="0"/>
-              <a:t>	1.3</a:t>
-            </a:r>
-            <a:r>
-              <a:rPr lang="pl-PL" dirty="0" smtClean="0"/>
-              <a:t>.  Cel </a:t>
-            </a:r>
-            <a:r>
-              <a:rPr lang="pl-PL" dirty="0" smtClean="0"/>
-              <a:t>pracy 						</a:t>
-            </a:r>
-            <a:r>
-              <a:rPr lang="pl-PL" dirty="0" smtClean="0"/>
-              <a:t>	13</a:t>
+              <a:t>	1.3.  Cel pracy 							13</a:t>
             </a:r>
             <a:endParaRPr lang="pl-PL" b="1" dirty="0" smtClean="0"/>
           </a:p>
@@ -5056,15 +5712,7 @@
             </a:pPr>
             <a:r>
               <a:rPr lang="x-none" b="1" smtClean="0"/>
-              <a:t>2. APLIKACJE O </a:t>
-            </a:r>
-            <a:r>
-              <a:rPr lang="x-none" b="1" smtClean="0"/>
-              <a:t>PODOBNEJ </a:t>
-            </a:r>
-            <a:r>
-              <a:rPr lang="x-none" b="1" smtClean="0"/>
-              <a:t>TEMATYCE</a:t>
+              <a:t>2. APLIKACJE O PODOBNEJ TEMATYCE</a:t>
             </a:r>
             <a:r>
               <a:rPr lang="pl-PL" b="1" dirty="0" smtClean="0"/>
@@ -5098,19 +5746,131 @@
             </a:r>
             <a:r>
               <a:rPr lang="pl-PL" dirty="0" smtClean="0"/>
-              <a:t>Dziennik alergika </a:t>
+              <a:t>Dziennik alergika 					</a:t>
+            </a:r>
+            <a:r>
+              <a:rPr lang="x-none" smtClean="0"/>
+              <a:t>	</a:t>
+            </a:r>
+            <a:r>
+              <a:rPr lang="pl-PL" dirty="0" smtClean="0"/>
+              <a:t>14</a:t>
+            </a:r>
+          </a:p>
+          <a:p>
+            <a:pPr>
+              <a:buNone/>
+            </a:pPr>
+            <a:r>
+              <a:rPr lang="pl-PL" dirty="0" smtClean="0"/>
+              <a:t>	2.2.  Apsik!  							16</a:t>
+            </a:r>
+            <a:endParaRPr lang="pl-PL" b="1" dirty="0" smtClean="0"/>
+          </a:p>
+          <a:p>
+            <a:pPr>
+              <a:buNone/>
+            </a:pPr>
+            <a:r>
+              <a:rPr lang="pl-PL" dirty="0" smtClean="0"/>
+              <a:t>	2.3.  Alergia 							18</a:t>
+            </a:r>
+            <a:endParaRPr lang="pl-PL" b="1" dirty="0" smtClean="0"/>
+          </a:p>
+          <a:p>
+            <a:pPr>
+              <a:buNone/>
+            </a:pPr>
+            <a:r>
+              <a:rPr lang="pl-PL" b="1" dirty="0" smtClean="0"/>
+              <a:t>3. PROJEKT SYSTEMU							19</a:t>
+            </a:r>
+          </a:p>
+          <a:p>
+            <a:pPr>
+              <a:buNone/>
+            </a:pPr>
+            <a:r>
+              <a:rPr lang="pl-PL" dirty="0" smtClean="0"/>
+              <a:t>	3</a:t>
+            </a:r>
+            <a:r>
+              <a:rPr lang="x-none" smtClean="0"/>
+              <a:t>.1. </a:t>
+            </a:r>
+            <a:r>
+              <a:rPr lang="pl-PL" dirty="0" smtClean="0"/>
+              <a:t>Technologie 						</a:t>
+            </a:r>
+            <a:r>
+              <a:rPr lang="x-none" smtClean="0"/>
+              <a:t>	</a:t>
+            </a:r>
+            <a:r>
+              <a:rPr lang="pl-PL" dirty="0" smtClean="0"/>
+              <a:t>19</a:t>
+            </a:r>
+          </a:p>
+          <a:p>
+            <a:pPr>
+              <a:buNone/>
+            </a:pPr>
+            <a:r>
+              <a:rPr lang="pl-PL" dirty="0" smtClean="0"/>
+              <a:t>	3.2.  Budowa systemu 						20</a:t>
+            </a:r>
+            <a:endParaRPr lang="pl-PL" b="1" dirty="0" smtClean="0"/>
+          </a:p>
+          <a:p>
+            <a:pPr>
+              <a:buNone/>
+            </a:pPr>
+            <a:r>
+              <a:rPr lang="pl-PL" dirty="0" smtClean="0"/>
+              <a:t>	3.3.  Baza danych 							21</a:t>
+            </a:r>
+            <a:endParaRPr lang="pl-PL" b="1" dirty="0" smtClean="0"/>
+          </a:p>
+          <a:p>
+            <a:pPr>
+              <a:buNone/>
+            </a:pPr>
+            <a:r>
+              <a:rPr lang="pl-PL" b="1" dirty="0" smtClean="0"/>
+              <a:t>4. IMPLEMENTACJA SYSTEMU </a:t>
             </a:r>
             <a:r>
               <a:rPr lang="pl-PL" dirty="0" smtClean="0"/>
               <a:t>					</a:t>
             </a:r>
             <a:r>
+              <a:rPr lang="pl-PL" b="1" dirty="0" smtClean="0"/>
+              <a:t>	23</a:t>
+            </a:r>
+          </a:p>
+          <a:p>
+            <a:pPr>
+              <a:buNone/>
+            </a:pPr>
+            <a:r>
+              <a:rPr lang="pl-PL" dirty="0" smtClean="0"/>
+              <a:t>	4</a:t>
+            </a:r>
+            <a:r>
+              <a:rPr lang="x-none" smtClean="0"/>
+              <a:t>.1. </a:t>
+            </a:r>
+            <a:r>
+              <a:rPr lang="pl-PL" dirty="0" smtClean="0"/>
+              <a:t>Zarządzanie danymi 					</a:t>
+            </a:r>
+            <a:r>
               <a:rPr lang="x-none" smtClean="0"/>
               <a:t>	</a:t>
             </a:r>
             <a:r>
               <a:rPr lang="pl-PL" dirty="0" smtClean="0"/>
-              <a:t>14</a:t>
+              <a:t>23</a:t>
             </a:r>
           </a:p>
           <a:p>
@@ -5119,305 +5879,63 @@
             </a:pPr>
             <a:r>
               <a:rPr lang="pl-PL" dirty="0" smtClean="0"/>
-              <a:t>	2.2</a:t>
-            </a:r>
+              <a:t>	4.2.  Logika biznesowa 						24</a:t>
+            </a:r>
+            <a:endParaRPr lang="pl-PL" b="1" dirty="0" smtClean="0"/>
+          </a:p>
+          <a:p>
+            <a:pPr>
+              <a:buNone/>
+            </a:pPr>
             <a:r>
               <a:rPr lang="pl-PL" dirty="0" smtClean="0"/>
-              <a:t>.  Apsik</a:t>
-            </a:r>
+              <a:t>	4.3.  Implementacja Graficznego Interfejsu Użytkownika 			26</a:t>
+            </a:r>
+            <a:endParaRPr lang="pl-PL" b="1" dirty="0" smtClean="0"/>
+          </a:p>
+          <a:p>
+            <a:pPr>
+              <a:buNone/>
+            </a:pPr>
             <a:r>
               <a:rPr lang="pl-PL" dirty="0" smtClean="0"/>
-              <a:t>!  						</a:t>
+              <a:t>	4.4.  Testowanie 							28</a:t>
+            </a:r>
+            <a:endParaRPr lang="pl-PL" b="1" dirty="0" smtClean="0"/>
+          </a:p>
+          <a:p>
+            <a:pPr>
+              <a:buNone/>
+            </a:pPr>
+            <a:r>
+              <a:rPr lang="pl-PL" b="1" dirty="0" smtClean="0"/>
+              <a:t>6. PODSUMOWANIE </a:t>
             </a:r>
             <a:r>
               <a:rPr lang="pl-PL" dirty="0" smtClean="0"/>
-              <a:t>	16</a:t>
-            </a:r>
-            <a:endParaRPr lang="pl-PL" b="1" dirty="0" smtClean="0"/>
+              <a:t>						</a:t>
+            </a:r>
+            <a:r>
+              <a:rPr lang="pl-PL" b="1" dirty="0" smtClean="0"/>
+              <a:t>	30</a:t>
+            </a:r>
           </a:p>
           <a:p>
             <a:pPr>
               <a:buNone/>
             </a:pPr>
             <a:r>
-              <a:rPr lang="pl-PL" dirty="0" smtClean="0"/>
-              <a:t>	2.3</a:t>
-            </a:r>
-            <a:r>
-              <a:rPr lang="pl-PL" dirty="0" smtClean="0"/>
-              <a:t>.  </a:t>
-            </a:r>
-            <a:r>
-              <a:rPr lang="pl-PL" dirty="0" smtClean="0"/>
-              <a:t>Alergia 						</a:t>
-            </a:r>
-            <a:r>
-              <a:rPr lang="pl-PL" dirty="0" smtClean="0"/>
-              <a:t>	18</a:t>
-            </a:r>
-            <a:endParaRPr lang="pl-PL" b="1" dirty="0" smtClean="0"/>
-          </a:p>
-          <a:p>
-            <a:pPr>
-              <a:buNone/>
-            </a:pPr>
-            <a:r>
               <a:rPr lang="pl-PL" b="1" dirty="0" smtClean="0"/>
-              <a:t>3. PROJEKT </a:t>
-            </a:r>
-            <a:r>
-              <a:rPr lang="pl-PL" b="1" dirty="0" smtClean="0"/>
-              <a:t>SYSTEMU						</a:t>
-            </a:r>
-            <a:r>
-              <a:rPr lang="pl-PL" b="1" dirty="0" smtClean="0"/>
-              <a:t>	19</a:t>
-            </a:r>
-          </a:p>
-          <a:p>
-            <a:pPr>
-              <a:buNone/>
-            </a:pPr>
+              <a:t>BIBLIOGRAFIA						</a:t>
+            </a:r>
             <a:r>
               <a:rPr lang="pl-PL" dirty="0" smtClean="0"/>
               <a:t>	</a:t>
             </a:r>
             <a:r>
-              <a:rPr lang="pl-PL" dirty="0" smtClean="0"/>
-              <a:t>3</a:t>
-            </a:r>
-            <a:r>
-              <a:rPr lang="x-none" smtClean="0"/>
-              <a:t>.1</a:t>
-            </a:r>
-            <a:r>
-              <a:rPr lang="x-none" smtClean="0"/>
-              <a:t>. </a:t>
-            </a:r>
-            <a:r>
-              <a:rPr lang="pl-PL" dirty="0" smtClean="0"/>
-              <a:t>Technologie 						</a:t>
-            </a:r>
-            <a:r>
-              <a:rPr lang="x-none" smtClean="0"/>
-              <a:t>	</a:t>
-            </a:r>
-            <a:r>
-              <a:rPr lang="pl-PL" dirty="0" smtClean="0"/>
-              <a:t>19</a:t>
-            </a:r>
-          </a:p>
-          <a:p>
-            <a:pPr>
-              <a:buNone/>
-            </a:pPr>
-            <a:r>
-              <a:rPr lang="pl-PL" dirty="0" smtClean="0"/>
-              <a:t>	3.2</a:t>
-            </a:r>
-            <a:r>
-              <a:rPr lang="pl-PL" dirty="0" smtClean="0"/>
-              <a:t>.  Budowa systemu </a:t>
-            </a:r>
-            <a:r>
-              <a:rPr lang="pl-PL" dirty="0" smtClean="0"/>
-              <a:t>					</a:t>
-            </a:r>
-            <a:r>
-              <a:rPr lang="pl-PL" dirty="0" smtClean="0"/>
-              <a:t>	20</a:t>
-            </a:r>
-            <a:endParaRPr lang="pl-PL" b="1" dirty="0" smtClean="0"/>
-          </a:p>
-          <a:p>
-            <a:pPr>
-              <a:buNone/>
-            </a:pPr>
-            <a:r>
-              <a:rPr lang="pl-PL" dirty="0" smtClean="0"/>
-              <a:t>	3.3</a:t>
-            </a:r>
-            <a:r>
-              <a:rPr lang="pl-PL" dirty="0" smtClean="0"/>
-              <a:t>.  Baza </a:t>
-            </a:r>
-            <a:r>
-              <a:rPr lang="pl-PL" dirty="0" smtClean="0"/>
-              <a:t>danych 						</a:t>
-            </a:r>
-            <a:r>
-              <a:rPr lang="pl-PL" dirty="0" smtClean="0"/>
-              <a:t>	21</a:t>
-            </a:r>
-            <a:endParaRPr lang="pl-PL" b="1" dirty="0" smtClean="0"/>
-          </a:p>
-          <a:p>
-            <a:pPr>
-              <a:buNone/>
-            </a:pPr>
-            <a:r>
-              <a:rPr lang="pl-PL" b="1" dirty="0" smtClean="0"/>
-              <a:t>4. IMPLEMENTACJA </a:t>
-            </a:r>
-            <a:r>
-              <a:rPr lang="pl-PL" b="1" dirty="0" smtClean="0"/>
-              <a:t>SYSTEMU </a:t>
-            </a:r>
-            <a:r>
-              <a:rPr lang="pl-PL" dirty="0" smtClean="0"/>
-              <a:t>					</a:t>
-            </a:r>
-            <a:r>
-              <a:rPr lang="pl-PL" b="1" dirty="0" smtClean="0"/>
-              <a:t>	23</a:t>
-            </a:r>
-          </a:p>
-          <a:p>
-            <a:pPr>
-              <a:buNone/>
-            </a:pPr>
-            <a:r>
-              <a:rPr lang="pl-PL" dirty="0" smtClean="0"/>
-              <a:t>	</a:t>
-            </a:r>
-            <a:r>
-              <a:rPr lang="pl-PL" dirty="0" smtClean="0"/>
-              <a:t>4</a:t>
-            </a:r>
-            <a:r>
-              <a:rPr lang="x-none" smtClean="0"/>
-              <a:t>.1</a:t>
-            </a:r>
-            <a:r>
-              <a:rPr lang="x-none" smtClean="0"/>
-              <a:t>. </a:t>
-            </a:r>
-            <a:r>
-              <a:rPr lang="pl-PL" dirty="0" smtClean="0"/>
-              <a:t>Zarządzanie </a:t>
-            </a:r>
-            <a:r>
-              <a:rPr lang="pl-PL" dirty="0" smtClean="0"/>
-              <a:t>danymi 					</a:t>
-            </a:r>
-            <a:r>
-              <a:rPr lang="x-none" smtClean="0"/>
-              <a:t>	</a:t>
-            </a:r>
-            <a:r>
-              <a:rPr lang="pl-PL" dirty="0" smtClean="0"/>
-              <a:t>23</a:t>
-            </a:r>
-          </a:p>
-          <a:p>
-            <a:pPr>
-              <a:buNone/>
-            </a:pPr>
-            <a:r>
-              <a:rPr lang="pl-PL" dirty="0" smtClean="0"/>
-              <a:t>	4.2.  </a:t>
-            </a:r>
-            <a:r>
-              <a:rPr lang="pl-PL" dirty="0" smtClean="0"/>
-              <a:t>Logika biznesowa </a:t>
-            </a:r>
-            <a:r>
-              <a:rPr lang="pl-PL" dirty="0" smtClean="0"/>
-              <a:t>					</a:t>
-            </a:r>
-            <a:r>
-              <a:rPr lang="pl-PL" dirty="0" smtClean="0"/>
-              <a:t>	24</a:t>
-            </a:r>
-            <a:endParaRPr lang="pl-PL" b="1" dirty="0" smtClean="0"/>
-          </a:p>
-          <a:p>
-            <a:pPr>
-              <a:buNone/>
-            </a:pPr>
-            <a:r>
-              <a:rPr lang="pl-PL" dirty="0" smtClean="0"/>
-              <a:t>	4.3.  </a:t>
-            </a:r>
-            <a:r>
-              <a:rPr lang="pl-PL" dirty="0" smtClean="0"/>
-              <a:t>Implementacja Graficznego Interfejsu Użytkownika </a:t>
-            </a:r>
-            <a:r>
-              <a:rPr lang="pl-PL" dirty="0" smtClean="0"/>
-              <a:t>		</a:t>
-            </a:r>
-            <a:r>
-              <a:rPr lang="pl-PL" dirty="0" smtClean="0"/>
-              <a:t>	26</a:t>
-            </a:r>
-            <a:endParaRPr lang="pl-PL" b="1" dirty="0" smtClean="0"/>
-          </a:p>
-          <a:p>
-            <a:pPr>
-              <a:buNone/>
-            </a:pPr>
-            <a:r>
-              <a:rPr lang="pl-PL" dirty="0" smtClean="0"/>
-              <a:t>	4.4.  </a:t>
-            </a:r>
-            <a:r>
-              <a:rPr lang="pl-PL" dirty="0" smtClean="0"/>
-              <a:t>Testowanie </a:t>
-            </a:r>
-            <a:r>
-              <a:rPr lang="pl-PL" dirty="0" smtClean="0"/>
-              <a:t>						</a:t>
-            </a:r>
-            <a:r>
-              <a:rPr lang="pl-PL" dirty="0" smtClean="0"/>
-              <a:t>	28</a:t>
-            </a:r>
-            <a:endParaRPr lang="pl-PL" b="1" dirty="0" smtClean="0"/>
-          </a:p>
-          <a:p>
-            <a:pPr>
-              <a:buNone/>
-            </a:pPr>
-            <a:r>
-              <a:rPr lang="pl-PL" b="1" dirty="0" smtClean="0"/>
-              <a:t>6. </a:t>
-            </a:r>
-            <a:r>
-              <a:rPr lang="pl-PL" b="1" dirty="0" smtClean="0"/>
-              <a:t>PODSUMOWANIE </a:t>
-            </a:r>
-            <a:r>
-              <a:rPr lang="pl-PL" dirty="0" smtClean="0"/>
-              <a:t>						</a:t>
-            </a:r>
-            <a:r>
-              <a:rPr lang="pl-PL" b="1" dirty="0" smtClean="0"/>
-              <a:t>	</a:t>
-            </a:r>
-            <a:r>
-              <a:rPr lang="pl-PL" b="1" dirty="0" smtClean="0"/>
-              <a:t>30</a:t>
-            </a:r>
-            <a:endParaRPr lang="pl-PL" b="1" dirty="0" smtClean="0"/>
-          </a:p>
-          <a:p>
-            <a:pPr>
-              <a:buNone/>
-            </a:pPr>
-            <a:r>
-              <a:rPr lang="pl-PL" b="1" dirty="0" smtClean="0"/>
-              <a:t>BIBLIOGRAFIA						</a:t>
-            </a:r>
-            <a:r>
-              <a:rPr lang="pl-PL" dirty="0" smtClean="0"/>
-              <a:t>	</a:t>
-            </a:r>
-            <a:r>
               <a:rPr lang="pl-PL" b="1" dirty="0" smtClean="0"/>
               <a:t>32</a:t>
             </a:r>
-            <a:endParaRPr lang="pl-PL" b="1" dirty="0" smtClean="0"/>
           </a:p>
         </p:txBody>
       </p:sp>
@@ -5506,19 +6024,11 @@
             </a:pPr>
             <a:r>
               <a:rPr lang="pl-PL" dirty="0" smtClean="0"/>
-              <a:t>	</a:t>
-            </a:r>
-            <a:r>
-              <a:rPr lang="pl-PL" dirty="0" smtClean="0"/>
-              <a:t>	</a:t>
+              <a:t>		</a:t>
             </a:r>
             <a:r>
               <a:rPr lang="pl-PL" sz="2900" dirty="0" smtClean="0"/>
-              <a:t>Celem </a:t>
-            </a:r>
-            <a:r>
-              <a:rPr lang="pl-PL" sz="2900" dirty="0" smtClean="0"/>
-              <a:t>pracy jest </a:t>
+              <a:t>Celem pracy jest </a:t>
             </a:r>
             <a:r>
               <a:rPr lang="pl-PL" sz="2900" b="1" dirty="0" smtClean="0"/>
@@ -5528,7 +6038,6 @@
               <a:rPr lang="pl-PL" sz="2900" dirty="0" smtClean="0"/>
               <a:t>, w którym może on zapisywać zjadane przez niego posiłki, przekąski, a następnie wprowadzanie ich do planu dnia o dowolnej godzinie i w dowolnym miejscu. </a:t>
             </a:r>
-            <a:endParaRPr lang="pl-PL" sz="2900" dirty="0" smtClean="0"/>
           </a:p>
           <a:p>
             <a:pPr>
@@ -5536,15 +6045,7 @@
             </a:pPr>
             <a:r>
               <a:rPr lang="pl-PL" sz="2900" dirty="0" smtClean="0"/>
-              <a:t>	</a:t>
-            </a:r>
-            <a:r>
-              <a:rPr lang="pl-PL" sz="2900" dirty="0" smtClean="0"/>
-              <a:t>	Ponieważ </a:t>
-            </a:r>
-            <a:r>
-              <a:rPr lang="pl-PL" sz="2900" dirty="0" smtClean="0"/>
-              <a:t>problem alergii nie ogranicza się tylko do spożywanych posiłków, </a:t>
+              <a:t>		Ponieważ problem alergii nie ogranicza się tylko do spożywanych posiłków, </a:t>
             </a:r>
             <a:r>
               <a:rPr lang="pl-PL" sz="2900" b="1" dirty="0" smtClean="0"/>
@@ -5552,36 +6053,16 @@
             </a:r>
             <a:r>
               <a:rPr lang="pl-PL" sz="2900" dirty="0" smtClean="0"/>
-              <a:t>, z jakimi użytkownik miał kontakt. Zapis ten wykonujemy identycznie jak poprzedni</a:t>
-            </a:r>
+              <a:t>, z jakimi użytkownik miał kontakt. Zapis ten wykonujemy identycznie jak poprzedni.</a:t>
+            </a:r>
+          </a:p>
+          <a:p>
+            <a:pPr>
+              <a:buNone/>
+            </a:pPr>
             <a:r>
               <a:rPr lang="pl-PL" sz="2900" dirty="0" smtClean="0"/>
-              <a:t>.</a:t>
-            </a:r>
-          </a:p>
-          <a:p>
-            <a:pPr>
-              <a:buNone/>
-            </a:pPr>
-            <a:r>
-              <a:rPr lang="pl-PL" sz="2900" dirty="0" smtClean="0"/>
-              <a:t>	</a:t>
-            </a:r>
-            <a:r>
-              <a:rPr lang="pl-PL" sz="2900" dirty="0" smtClean="0"/>
-              <a:t>	Dodatkową </a:t>
-            </a:r>
-            <a:r>
-              <a:rPr lang="pl-PL" sz="2900" dirty="0" smtClean="0"/>
-              <a:t>funkcjonalnością </a:t>
-            </a:r>
-            <a:r>
-              <a:rPr lang="pl-PL" sz="2900" dirty="0" smtClean="0"/>
-              <a:t>aplikacji </a:t>
-            </a:r>
-            <a:r>
-              <a:rPr lang="pl-PL" sz="2900" dirty="0" smtClean="0"/>
-              <a:t>jest </a:t>
+              <a:t>		Dodatkową funkcjonalnością aplikacji jest </a:t>
             </a:r>
             <a:r>
               <a:rPr lang="pl-PL" sz="2900" b="1" dirty="0" smtClean="0"/>
@@ -5645,6 +6126,36 @@
           <a:noFill/>
         </p:spPr>
       </p:pic>
+      <p:sp>
+        <p:nvSpPr>
+          <p:cNvPr id="6" name="pole tekstowe 5"/>
+          <p:cNvSpPr txBox="1"/>
+          <p:nvPr/>
+        </p:nvSpPr>
+        <p:spPr>
+          <a:xfrm>
+            <a:off x="8853536" y="6488668"/>
+            <a:ext cx="290464" cy="369332"/>
+          </a:xfrm>
+          <a:prstGeom prst="rect">
+            <a:avLst/>
+          </a:prstGeom>
+          <a:noFill/>
+        </p:spPr>
+        <p:txBody>
+          <a:bodyPr wrap="none" rtlCol="0">
+            <a:spAutoFit/>
+          </a:bodyPr>
+          <a:lstStyle/>
+          <a:p>
+            <a:r>
+              <a:rPr lang="pl-PL" dirty="0" smtClean="0"/>
+              <a:t>3</a:t>
+            </a:r>
+            <a:endParaRPr lang="pl-PL" dirty="0"/>
+          </a:p>
+        </p:txBody>
+      </p:sp>
     </p:spTree>
   </p:cSld>
   <p:clrMapOvr>
@@ -5879,6 +6390,36 @@
           <a:effectLst/>
         </p:spPr>
       </p:pic>
+      <p:sp>
+        <p:nvSpPr>
+          <p:cNvPr id="8" name="pole tekstowe 7"/>
+          <p:cNvSpPr txBox="1"/>
+          <p:nvPr/>
+        </p:nvSpPr>
+        <p:spPr>
+          <a:xfrm>
+            <a:off x="8837506" y="6488668"/>
+            <a:ext cx="306494" cy="369332"/>
+          </a:xfrm>
+          <a:prstGeom prst="rect">
+            <a:avLst/>
+          </a:prstGeom>
+          <a:noFill/>
+        </p:spPr>
+        <p:txBody>
+          <a:bodyPr wrap="none" rtlCol="0">
+            <a:spAutoFit/>
+          </a:bodyPr>
+          <a:lstStyle/>
+          <a:p>
+            <a:r>
+              <a:rPr lang="pl-PL" dirty="0" smtClean="0"/>
+              <a:t>4</a:t>
+            </a:r>
+            <a:endParaRPr lang="pl-PL" dirty="0"/>
+          </a:p>
+        </p:txBody>
+      </p:sp>
     </p:spTree>
   </p:cSld>
   <p:clrMapOvr>
@@ -5975,15 +6516,7 @@
             </a:pPr>
             <a:r>
               <a:rPr lang="pl-PL" sz="1200" dirty="0" smtClean="0"/>
-              <a:t>Jedną z popularniejszych aplikacji tego typu jest aplikacja o nazwie „Apsik!”. </a:t>
-            </a:r>
-            <a:r>
-              <a:rPr lang="pl-PL" sz="1200" dirty="0" smtClean="0"/>
-              <a:t>Oferuje ona więcej możliwości w porównaniu do poprzedniej </a:t>
-            </a:r>
-            <a:r>
-              <a:rPr lang="pl-PL" sz="1200" dirty="0" smtClean="0"/>
-              <a:t>aplikacji, między innymi Kalendarz pyleń, Mapę pyleń oraz Dziennik. </a:t>
+              <a:t>Jedną z popularniejszych aplikacji tego typu jest aplikacja o nazwie „Apsik!”. Oferuje ona więcej możliwości w porównaniu do poprzedniej aplikacji, między innymi Kalendarz pyleń, Mapę pyleń oraz Dziennik. </a:t>
             </a:r>
             <a:endParaRPr lang="pl-PL" sz="1200" dirty="0"/>
           </a:p>
@@ -6121,6 +6654,36 @@
           <a:effectLst/>
         </p:spPr>
       </p:pic>
+      <p:sp>
+        <p:nvSpPr>
+          <p:cNvPr id="8" name="pole tekstowe 7"/>
+          <p:cNvSpPr txBox="1"/>
+          <p:nvPr/>
+        </p:nvSpPr>
+        <p:spPr>
+          <a:xfrm>
+            <a:off x="8850330" y="6488668"/>
+            <a:ext cx="293670" cy="369332"/>
+          </a:xfrm>
+          <a:prstGeom prst="rect">
+            <a:avLst/>
+          </a:prstGeom>
+          <a:noFill/>
+        </p:spPr>
+        <p:txBody>
+          <a:bodyPr wrap="none" rtlCol="0">
+            <a:spAutoFit/>
+          </a:bodyPr>
+          <a:lstStyle/>
+          <a:p>
+            <a:r>
+              <a:rPr lang="pl-PL" dirty="0" smtClean="0"/>
+              <a:t>5</a:t>
+            </a:r>
+            <a:endParaRPr lang="pl-PL" dirty="0"/>
+          </a:p>
+        </p:txBody>
+      </p:sp>
     </p:spTree>
   </p:cSld>
   <p:clrMapOvr>
@@ -6282,6 +6845,36 @@
           <a:effectLst/>
         </p:spPr>
       </p:pic>
+      <p:sp>
+        <p:nvSpPr>
+          <p:cNvPr id="6" name="pole tekstowe 5"/>
+          <p:cNvSpPr txBox="1"/>
+          <p:nvPr/>
+        </p:nvSpPr>
+        <p:spPr>
+          <a:xfrm>
+            <a:off x="8834300" y="6488668"/>
+            <a:ext cx="309700" cy="369332"/>
+          </a:xfrm>
+          <a:prstGeom prst="rect">
+            <a:avLst/>
+          </a:prstGeom>
+          <a:noFill/>
+        </p:spPr>
+        <p:txBody>
+          <a:bodyPr wrap="none" rtlCol="0">
+            <a:spAutoFit/>
+          </a:bodyPr>
+          <a:lstStyle/>
+          <a:p>
+            <a:r>
+              <a:rPr lang="pl-PL" dirty="0" smtClean="0"/>
+              <a:t>6</a:t>
+            </a:r>
+            <a:endParaRPr lang="pl-PL" dirty="0"/>
+          </a:p>
+        </p:txBody>
+      </p:sp>
     </p:spTree>
   </p:cSld>
   <p:clrMapOvr>
@@ -6365,11 +6958,7 @@
             </a:pPr>
             <a:r>
               <a:rPr lang="pl-PL" sz="1300" dirty="0" smtClean="0"/>
-              <a:t>Natomiast kliknięcie w wybrany wiersz powoduje otworzenie okna z właściwościami</a:t>
-            </a:r>
-            <a:r>
-              <a:rPr lang="pl-PL" sz="1300" dirty="0" smtClean="0"/>
-              <a:t>.</a:t>
+              <a:t>Natomiast kliknięcie w wybrany wiersz powoduje otworzenie okna z właściwościami.</a:t>
             </a:r>
           </a:p>
           <a:p>
@@ -6476,6 +7065,36 @@
           <a:effectLst/>
         </p:spPr>
       </p:pic>
+      <p:sp>
+        <p:nvSpPr>
+          <p:cNvPr id="6" name="pole tekstowe 5"/>
+          <p:cNvSpPr txBox="1"/>
+          <p:nvPr/>
+        </p:nvSpPr>
+        <p:spPr>
+          <a:xfrm>
+            <a:off x="8847124" y="6488668"/>
+            <a:ext cx="296876" cy="369332"/>
+          </a:xfrm>
+          <a:prstGeom prst="rect">
+            <a:avLst/>
+          </a:prstGeom>
+          <a:noFill/>
+        </p:spPr>
+        <p:txBody>
+          <a:bodyPr wrap="none" rtlCol="0">
+            <a:spAutoFit/>
+          </a:bodyPr>
+          <a:lstStyle/>
+          <a:p>
+            <a:r>
+              <a:rPr lang="pl-PL" dirty="0" smtClean="0"/>
+              <a:t>7</a:t>
+            </a:r>
+            <a:endParaRPr lang="pl-PL" dirty="0"/>
+          </a:p>
+        </p:txBody>
+      </p:sp>
     </p:spTree>
   </p:cSld>
   <p:clrMapOvr>
@@ -6544,7 +7163,6 @@
               <a:rPr lang="pl-PL" sz="1300" dirty="0" smtClean="0"/>
               <a:t>.  Działanie tego fragmentu aplikacji wygląda tak samo jak w wyżej wymienionej części .</a:t>
             </a:r>
-            <a:endParaRPr lang="pl-PL" sz="1300" dirty="0" smtClean="0"/>
           </a:p>
           <a:p>
             <a:endParaRPr lang="pl-PL" sz="1500" dirty="0"/>
@@ -6650,6 +7268,36 @@
           <a:effectLst/>
         </p:spPr>
       </p:pic>
+      <p:sp>
+        <p:nvSpPr>
+          <p:cNvPr id="6" name="pole tekstowe 5"/>
+          <p:cNvSpPr txBox="1"/>
+          <p:nvPr/>
+        </p:nvSpPr>
+        <p:spPr>
+          <a:xfrm>
+            <a:off x="8835902" y="6488668"/>
+            <a:ext cx="308098" cy="369332"/>
+          </a:xfrm>
+          <a:prstGeom prst="rect">
+            <a:avLst/>
+          </a:prstGeom>
+          <a:noFill/>
+        </p:spPr>
+        <p:txBody>
+          <a:bodyPr wrap="none" rtlCol="0">
+            <a:spAutoFit/>
+          </a:bodyPr>
+          <a:lstStyle/>
+          <a:p>
+            <a:r>
+              <a:rPr lang="pl-PL" dirty="0" smtClean="0"/>
+              <a:t>8</a:t>
+            </a:r>
+            <a:endParaRPr lang="pl-PL" dirty="0"/>
+          </a:p>
+        </p:txBody>
+      </p:sp>
     </p:spTree>
   </p:cSld>
   <p:clrMapOvr>
@@ -6773,6 +7421,36 @@
           <a:effectLst/>
         </p:spPr>
       </p:pic>
+      <p:sp>
+        <p:nvSpPr>
+          <p:cNvPr id="5" name="pole tekstowe 4"/>
+          <p:cNvSpPr txBox="1"/>
+          <p:nvPr/>
+        </p:nvSpPr>
+        <p:spPr>
+          <a:xfrm>
+            <a:off x="8832696" y="6488668"/>
+            <a:ext cx="311304" cy="369332"/>
+          </a:xfrm>
+          <a:prstGeom prst="rect">
+            <a:avLst/>
+          </a:prstGeom>
+          <a:noFill/>
+        </p:spPr>
+        <p:txBody>
+          <a:bodyPr wrap="none" rtlCol="0">
+            <a:spAutoFit/>
+          </a:bodyPr>
+          <a:lstStyle/>
+          <a:p>
+            <a:r>
+              <a:rPr lang="pl-PL" dirty="0" smtClean="0"/>
+              <a:t>9</a:t>
+            </a:r>
+            <a:endParaRPr lang="pl-PL" dirty="0"/>
+          </a:p>
+        </p:txBody>
+      </p:sp>
     </p:spTree>
   </p:cSld>
   <p:clrMapOvr>

</xml_diff>

<commit_message>
Added adding a user to the database
</commit_message>
<xml_diff>
--- a/Prezentacja Praca Inż.pptx
+++ b/Prezentacja Praca Inż.pptx
@@ -1,26 +1,31 @@
 
 <file path=ppt/presentation.xml><?xml version="1.0" encoding="utf-8"?>
-<p:presentation xmlns:a="http://schemas.openxmlformats.org/drawingml/2006/main" xmlns:r="http://schemas.openxmlformats.org/officeDocument/2006/relationships" xmlns:p="http://schemas.openxmlformats.org/presentationml/2006/main" saveSubsetFonts="1">
+<p:presentation xmlns:a="http://schemas.openxmlformats.org/drawingml/2006/main" xmlns:r="http://schemas.openxmlformats.org/officeDocument/2006/relationships" xmlns:p="http://schemas.openxmlformats.org/presentationml/2006/main">
   <p:sldMasterIdLst>
-    <p:sldMasterId id="2147483660" r:id="rId1"/>
+    <p:sldMasterId id="2147483648" r:id="rId1"/>
   </p:sldMasterIdLst>
   <p:sldIdLst>
-    <p:sldId id="256" r:id="rId2"/>
-    <p:sldId id="257" r:id="rId3"/>
-    <p:sldId id="258" r:id="rId4"/>
-    <p:sldId id="259" r:id="rId5"/>
-    <p:sldId id="260" r:id="rId6"/>
-    <p:sldId id="261" r:id="rId7"/>
-    <p:sldId id="262" r:id="rId8"/>
-    <p:sldId id="263" r:id="rId9"/>
-    <p:sldId id="264" r:id="rId10"/>
-    <p:sldId id="268" r:id="rId11"/>
-    <p:sldId id="265" r:id="rId12"/>
-    <p:sldId id="266" r:id="rId13"/>
-    <p:sldId id="267" r:id="rId14"/>
-    <p:sldId id="269" r:id="rId15"/>
-    <p:sldId id="270" r:id="rId16"/>
-    <p:sldId id="271" r:id="rId17"/>
+    <p:sldId id="256" r:id="rId3"/>
+    <p:sldId id="257" r:id="rId4"/>
+    <p:sldId id="258" r:id="rId5"/>
+    <p:sldId id="259" r:id="rId6"/>
+    <p:sldId id="260" r:id="rId7"/>
+    <p:sldId id="261" r:id="rId8"/>
+    <p:sldId id="262" r:id="rId9"/>
+    <p:sldId id="263" r:id="rId10"/>
+    <p:sldId id="264" r:id="rId11"/>
+    <p:sldId id="268" r:id="rId12"/>
+    <p:sldId id="265" r:id="rId13"/>
+    <p:sldId id="266" r:id="rId14"/>
+    <p:sldId id="267" r:id="rId15"/>
+    <p:sldId id="269" r:id="rId16"/>
+    <p:sldId id="276" r:id="rId17"/>
+    <p:sldId id="278" r:id="rId18"/>
+    <p:sldId id="279" r:id="rId19"/>
+    <p:sldId id="280" r:id="rId20"/>
+    <p:sldId id="281" r:id="rId21"/>
+    <p:sldId id="270" r:id="rId22"/>
+    <p:sldId id="271" r:id="rId23"/>
   </p:sldIdLst>
   <p:sldSz cx="9144000" cy="6858000" type="screen4x3"/>
   <p:notesSz cx="6858000" cy="9144000"/>
@@ -151,7 +156,7 @@
             <a:spLocks noGrp="1"/>
           </p:cNvSpPr>
           <p:nvPr>
-            <p:ph type="ctrTitle"/>
+            <p:ph type="ctrTitle" hasCustomPrompt="1"/>
           </p:nvPr>
         </p:nvSpPr>
         <p:spPr>
@@ -224,7 +229,7 @@
             <a:spLocks noGrp="1"/>
           </p:cNvSpPr>
           <p:nvPr>
-            <p:ph type="subTitle" idx="1"/>
+            <p:ph type="subTitle" idx="1" hasCustomPrompt="1"/>
           </p:nvPr>
         </p:nvSpPr>
         <p:spPr>
@@ -295,8 +300,6 @@
           <a:p>
             <a:fld id="{E2699B8C-B7F7-4D4D-90D9-FF159D88763D}" type="datetimeFigureOut">
               <a:rPr lang="pl-PL" smtClean="0"/>
-              <a:pPr/>
-              <a:t>18.01.2022</a:t>
             </a:fld>
             <a:endParaRPr lang="pl-PL"/>
           </a:p>
@@ -338,8 +341,6 @@
           <a:p>
             <a:fld id="{ABB6616C-FD9B-4419-A183-8B942468E50F}" type="slidenum">
               <a:rPr lang="pl-PL" smtClean="0"/>
-              <a:pPr/>
-              <a:t>‹#›</a:t>
             </a:fld>
             <a:endParaRPr lang="pl-PL"/>
           </a:p>
@@ -377,7 +378,7 @@
             <a:spLocks noGrp="1"/>
           </p:cNvSpPr>
           <p:nvPr>
-            <p:ph type="title"/>
+            <p:ph type="title" hasCustomPrompt="1"/>
           </p:nvPr>
         </p:nvSpPr>
         <p:spPr/>
@@ -400,7 +401,7 @@
             <a:spLocks noGrp="1"/>
           </p:cNvSpPr>
           <p:nvPr>
-            <p:ph type="body" orient="vert" idx="1"/>
+            <p:ph type="body" orient="vert" idx="1" hasCustomPrompt="1"/>
           </p:nvPr>
         </p:nvSpPr>
         <p:spPr/>
@@ -413,6 +414,7 @@
               <a:rPr lang="pl-PL" smtClean="0"/>
               <a:t>Kliknij, aby edytować style wzorca tekstu</a:t>
             </a:r>
+            <a:endParaRPr lang="pl-PL" smtClean="0"/>
           </a:p>
           <a:p>
             <a:pPr lvl="1" eaLnBrk="1" latinLnBrk="0" hangingPunct="1"/>
@@ -420,6 +422,7 @@
               <a:rPr lang="pl-PL" smtClean="0"/>
               <a:t>Drugi poziom</a:t>
             </a:r>
+            <a:endParaRPr lang="pl-PL" smtClean="0"/>
           </a:p>
           <a:p>
             <a:pPr lvl="2" eaLnBrk="1" latinLnBrk="0" hangingPunct="1"/>
@@ -427,6 +430,7 @@
               <a:rPr lang="pl-PL" smtClean="0"/>
               <a:t>Trzeci poziom</a:t>
             </a:r>
+            <a:endParaRPr lang="pl-PL" smtClean="0"/>
           </a:p>
           <a:p>
             <a:pPr lvl="3" eaLnBrk="1" latinLnBrk="0" hangingPunct="1"/>
@@ -434,6 +438,7 @@
               <a:rPr lang="pl-PL" smtClean="0"/>
               <a:t>Czwarty poziom</a:t>
             </a:r>
+            <a:endParaRPr lang="pl-PL" smtClean="0"/>
           </a:p>
           <a:p>
             <a:pPr lvl="4" eaLnBrk="1" latinLnBrk="0" hangingPunct="1"/>
@@ -462,8 +467,6 @@
           <a:p>
             <a:fld id="{E2699B8C-B7F7-4D4D-90D9-FF159D88763D}" type="datetimeFigureOut">
               <a:rPr lang="pl-PL" smtClean="0"/>
-              <a:pPr/>
-              <a:t>18.01.2022</a:t>
             </a:fld>
             <a:endParaRPr lang="pl-PL"/>
           </a:p>
@@ -505,8 +508,6 @@
           <a:p>
             <a:fld id="{ABB6616C-FD9B-4419-A183-8B942468E50F}" type="slidenum">
               <a:rPr lang="pl-PL" smtClean="0"/>
-              <a:pPr/>
-              <a:t>‹#›</a:t>
             </a:fld>
             <a:endParaRPr lang="pl-PL"/>
           </a:p>
@@ -544,7 +545,7 @@
             <a:spLocks noGrp="1"/>
           </p:cNvSpPr>
           <p:nvPr>
-            <p:ph type="title" orient="vert"/>
+            <p:ph type="title" orient="vert" hasCustomPrompt="1"/>
           </p:nvPr>
         </p:nvSpPr>
         <p:spPr>
@@ -572,7 +573,7 @@
             <a:spLocks noGrp="1"/>
           </p:cNvSpPr>
           <p:nvPr>
-            <p:ph type="body" orient="vert" idx="1"/>
+            <p:ph type="body" orient="vert" idx="1" hasCustomPrompt="1"/>
           </p:nvPr>
         </p:nvSpPr>
         <p:spPr>
@@ -590,6 +591,7 @@
               <a:rPr lang="pl-PL" smtClean="0"/>
               <a:t>Kliknij, aby edytować style wzorca tekstu</a:t>
             </a:r>
+            <a:endParaRPr lang="pl-PL" smtClean="0"/>
           </a:p>
           <a:p>
             <a:pPr lvl="1" eaLnBrk="1" latinLnBrk="0" hangingPunct="1"/>
@@ -597,6 +599,7 @@
               <a:rPr lang="pl-PL" smtClean="0"/>
               <a:t>Drugi poziom</a:t>
             </a:r>
+            <a:endParaRPr lang="pl-PL" smtClean="0"/>
           </a:p>
           <a:p>
             <a:pPr lvl="2" eaLnBrk="1" latinLnBrk="0" hangingPunct="1"/>
@@ -604,6 +607,7 @@
               <a:rPr lang="pl-PL" smtClean="0"/>
               <a:t>Trzeci poziom</a:t>
             </a:r>
+            <a:endParaRPr lang="pl-PL" smtClean="0"/>
           </a:p>
           <a:p>
             <a:pPr lvl="3" eaLnBrk="1" latinLnBrk="0" hangingPunct="1"/>
@@ -611,6 +615,7 @@
               <a:rPr lang="pl-PL" smtClean="0"/>
               <a:t>Czwarty poziom</a:t>
             </a:r>
+            <a:endParaRPr lang="pl-PL" smtClean="0"/>
           </a:p>
           <a:p>
             <a:pPr lvl="4" eaLnBrk="1" latinLnBrk="0" hangingPunct="1"/>
@@ -639,8 +644,6 @@
           <a:p>
             <a:fld id="{E2699B8C-B7F7-4D4D-90D9-FF159D88763D}" type="datetimeFigureOut">
               <a:rPr lang="pl-PL" smtClean="0"/>
-              <a:pPr/>
-              <a:t>18.01.2022</a:t>
             </a:fld>
             <a:endParaRPr lang="pl-PL"/>
           </a:p>
@@ -682,8 +685,6 @@
           <a:p>
             <a:fld id="{ABB6616C-FD9B-4419-A183-8B942468E50F}" type="slidenum">
               <a:rPr lang="pl-PL" smtClean="0"/>
-              <a:pPr/>
-              <a:t>‹#›</a:t>
             </a:fld>
             <a:endParaRPr lang="pl-PL"/>
           </a:p>
@@ -721,7 +722,7 @@
             <a:spLocks noGrp="1"/>
           </p:cNvSpPr>
           <p:nvPr>
-            <p:ph type="title"/>
+            <p:ph type="title" hasCustomPrompt="1"/>
           </p:nvPr>
         </p:nvSpPr>
         <p:spPr/>
@@ -744,7 +745,7 @@
             <a:spLocks noGrp="1"/>
           </p:cNvSpPr>
           <p:nvPr>
-            <p:ph idx="1"/>
+            <p:ph idx="1" hasCustomPrompt="1"/>
           </p:nvPr>
         </p:nvSpPr>
         <p:spPr/>
@@ -757,6 +758,7 @@
               <a:rPr lang="pl-PL" smtClean="0"/>
               <a:t>Kliknij, aby edytować style wzorca tekstu</a:t>
             </a:r>
+            <a:endParaRPr lang="pl-PL" smtClean="0"/>
           </a:p>
           <a:p>
             <a:pPr lvl="1" eaLnBrk="1" latinLnBrk="0" hangingPunct="1"/>
@@ -764,6 +766,7 @@
               <a:rPr lang="pl-PL" smtClean="0"/>
               <a:t>Drugi poziom</a:t>
             </a:r>
+            <a:endParaRPr lang="pl-PL" smtClean="0"/>
           </a:p>
           <a:p>
             <a:pPr lvl="2" eaLnBrk="1" latinLnBrk="0" hangingPunct="1"/>
@@ -771,6 +774,7 @@
               <a:rPr lang="pl-PL" smtClean="0"/>
               <a:t>Trzeci poziom</a:t>
             </a:r>
+            <a:endParaRPr lang="pl-PL" smtClean="0"/>
           </a:p>
           <a:p>
             <a:pPr lvl="3" eaLnBrk="1" latinLnBrk="0" hangingPunct="1"/>
@@ -778,6 +782,7 @@
               <a:rPr lang="pl-PL" smtClean="0"/>
               <a:t>Czwarty poziom</a:t>
             </a:r>
+            <a:endParaRPr lang="pl-PL" smtClean="0"/>
           </a:p>
           <a:p>
             <a:pPr lvl="4" eaLnBrk="1" latinLnBrk="0" hangingPunct="1"/>
@@ -806,8 +811,6 @@
           <a:p>
             <a:fld id="{E2699B8C-B7F7-4D4D-90D9-FF159D88763D}" type="datetimeFigureOut">
               <a:rPr lang="pl-PL" smtClean="0"/>
-              <a:pPr/>
-              <a:t>18.01.2022</a:t>
             </a:fld>
             <a:endParaRPr lang="pl-PL"/>
           </a:p>
@@ -849,8 +852,6 @@
           <a:p>
             <a:fld id="{ABB6616C-FD9B-4419-A183-8B942468E50F}" type="slidenum">
               <a:rPr lang="pl-PL" smtClean="0"/>
-              <a:pPr/>
-              <a:t>‹#›</a:t>
             </a:fld>
             <a:endParaRPr lang="pl-PL"/>
           </a:p>
@@ -893,7 +894,7 @@
             <a:spLocks noGrp="1"/>
           </p:cNvSpPr>
           <p:nvPr>
-            <p:ph type="title"/>
+            <p:ph type="title" hasCustomPrompt="1"/>
           </p:nvPr>
         </p:nvSpPr>
         <p:spPr>
@@ -963,7 +964,7 @@
             <a:spLocks noGrp="1"/>
           </p:cNvSpPr>
           <p:nvPr>
-            <p:ph type="body" idx="1"/>
+            <p:ph type="body" idx="1" hasCustomPrompt="1"/>
           </p:nvPr>
         </p:nvSpPr>
         <p:spPr>
@@ -1030,6 +1031,7 @@
               <a:rPr kumimoji="0" lang="pl-PL" smtClean="0"/>
               <a:t>Kliknij, aby edytować style wzorca tekstu</a:t>
             </a:r>
+            <a:endParaRPr kumimoji="0" lang="pl-PL" smtClean="0"/>
           </a:p>
         </p:txBody>
       </p:sp>
@@ -1050,8 +1052,6 @@
           <a:p>
             <a:fld id="{E2699B8C-B7F7-4D4D-90D9-FF159D88763D}" type="datetimeFigureOut">
               <a:rPr lang="pl-PL" smtClean="0"/>
-              <a:pPr/>
-              <a:t>18.01.2022</a:t>
             </a:fld>
             <a:endParaRPr lang="pl-PL"/>
           </a:p>
@@ -1093,8 +1093,6 @@
           <a:p>
             <a:fld id="{ABB6616C-FD9B-4419-A183-8B942468E50F}" type="slidenum">
               <a:rPr lang="pl-PL" smtClean="0"/>
-              <a:pPr/>
-              <a:t>‹#›</a:t>
             </a:fld>
             <a:endParaRPr lang="pl-PL"/>
           </a:p>
@@ -1132,7 +1130,7 @@
             <a:spLocks noGrp="1"/>
           </p:cNvSpPr>
           <p:nvPr>
-            <p:ph type="title"/>
+            <p:ph type="title" hasCustomPrompt="1"/>
           </p:nvPr>
         </p:nvSpPr>
         <p:spPr>
@@ -1160,7 +1158,7 @@
             <a:spLocks noGrp="1"/>
           </p:cNvSpPr>
           <p:nvPr>
-            <p:ph sz="half" idx="1"/>
+            <p:ph sz="half" idx="1" hasCustomPrompt="1"/>
           </p:nvPr>
         </p:nvSpPr>
         <p:spPr>
@@ -1194,6 +1192,7 @@
               <a:rPr lang="pl-PL" smtClean="0"/>
               <a:t>Kliknij, aby edytować style wzorca tekstu</a:t>
             </a:r>
+            <a:endParaRPr lang="pl-PL" smtClean="0"/>
           </a:p>
           <a:p>
             <a:pPr lvl="1" eaLnBrk="1" latinLnBrk="0" hangingPunct="1"/>
@@ -1201,6 +1200,7 @@
               <a:rPr lang="pl-PL" smtClean="0"/>
               <a:t>Drugi poziom</a:t>
             </a:r>
+            <a:endParaRPr lang="pl-PL" smtClean="0"/>
           </a:p>
           <a:p>
             <a:pPr lvl="2" eaLnBrk="1" latinLnBrk="0" hangingPunct="1"/>
@@ -1208,6 +1208,7 @@
               <a:rPr lang="pl-PL" smtClean="0"/>
               <a:t>Trzeci poziom</a:t>
             </a:r>
+            <a:endParaRPr lang="pl-PL" smtClean="0"/>
           </a:p>
           <a:p>
             <a:pPr lvl="3" eaLnBrk="1" latinLnBrk="0" hangingPunct="1"/>
@@ -1215,6 +1216,7 @@
               <a:rPr lang="pl-PL" smtClean="0"/>
               <a:t>Czwarty poziom</a:t>
             </a:r>
+            <a:endParaRPr lang="pl-PL" smtClean="0"/>
           </a:p>
           <a:p>
             <a:pPr lvl="4" eaLnBrk="1" latinLnBrk="0" hangingPunct="1"/>
@@ -1233,7 +1235,7 @@
             <a:spLocks noGrp="1"/>
           </p:cNvSpPr>
           <p:nvPr>
-            <p:ph sz="half" idx="2"/>
+            <p:ph sz="half" idx="2" hasCustomPrompt="1"/>
           </p:nvPr>
         </p:nvSpPr>
         <p:spPr>
@@ -1267,6 +1269,7 @@
               <a:rPr lang="pl-PL" smtClean="0"/>
               <a:t>Kliknij, aby edytować style wzorca tekstu</a:t>
             </a:r>
+            <a:endParaRPr lang="pl-PL" smtClean="0"/>
           </a:p>
           <a:p>
             <a:pPr lvl="1" eaLnBrk="1" latinLnBrk="0" hangingPunct="1"/>
@@ -1274,6 +1277,7 @@
               <a:rPr lang="pl-PL" smtClean="0"/>
               <a:t>Drugi poziom</a:t>
             </a:r>
+            <a:endParaRPr lang="pl-PL" smtClean="0"/>
           </a:p>
           <a:p>
             <a:pPr lvl="2" eaLnBrk="1" latinLnBrk="0" hangingPunct="1"/>
@@ -1281,6 +1285,7 @@
               <a:rPr lang="pl-PL" smtClean="0"/>
               <a:t>Trzeci poziom</a:t>
             </a:r>
+            <a:endParaRPr lang="pl-PL" smtClean="0"/>
           </a:p>
           <a:p>
             <a:pPr lvl="3" eaLnBrk="1" latinLnBrk="0" hangingPunct="1"/>
@@ -1288,6 +1293,7 @@
               <a:rPr lang="pl-PL" smtClean="0"/>
               <a:t>Czwarty poziom</a:t>
             </a:r>
+            <a:endParaRPr lang="pl-PL" smtClean="0"/>
           </a:p>
           <a:p>
             <a:pPr lvl="4" eaLnBrk="1" latinLnBrk="0" hangingPunct="1"/>
@@ -1316,8 +1322,6 @@
           <a:p>
             <a:fld id="{E2699B8C-B7F7-4D4D-90D9-FF159D88763D}" type="datetimeFigureOut">
               <a:rPr lang="pl-PL" smtClean="0"/>
-              <a:pPr/>
-              <a:t>18.01.2022</a:t>
             </a:fld>
             <a:endParaRPr lang="pl-PL"/>
           </a:p>
@@ -1359,8 +1363,6 @@
           <a:p>
             <a:fld id="{ABB6616C-FD9B-4419-A183-8B942468E50F}" type="slidenum">
               <a:rPr lang="pl-PL" smtClean="0"/>
-              <a:pPr/>
-              <a:t>‹#›</a:t>
             </a:fld>
             <a:endParaRPr lang="pl-PL"/>
           </a:p>
@@ -1398,7 +1400,7 @@
             <a:spLocks noGrp="1"/>
           </p:cNvSpPr>
           <p:nvPr>
-            <p:ph type="title"/>
+            <p:ph type="title" hasCustomPrompt="1"/>
           </p:nvPr>
         </p:nvSpPr>
         <p:spPr>
@@ -1430,7 +1432,7 @@
             <a:spLocks noGrp="1"/>
           </p:cNvSpPr>
           <p:nvPr>
-            <p:ph type="body" idx="1"/>
+            <p:ph type="body" idx="1" hasCustomPrompt="1"/>
           </p:nvPr>
         </p:nvSpPr>
         <p:spPr>
@@ -1476,6 +1478,7 @@
               <a:rPr kumimoji="0" lang="pl-PL" smtClean="0"/>
               <a:t>Kliknij, aby edytować style wzorca tekstu</a:t>
             </a:r>
+            <a:endParaRPr kumimoji="0" lang="pl-PL" smtClean="0"/>
           </a:p>
         </p:txBody>
       </p:sp>
@@ -1486,7 +1489,7 @@
             <a:spLocks noGrp="1"/>
           </p:cNvSpPr>
           <p:nvPr>
-            <p:ph type="body" sz="half" idx="3"/>
+            <p:ph type="body" sz="half" idx="3" hasCustomPrompt="1"/>
           </p:nvPr>
         </p:nvSpPr>
         <p:spPr>
@@ -1530,6 +1533,7 @@
               <a:rPr kumimoji="0" lang="pl-PL" smtClean="0"/>
               <a:t>Kliknij, aby edytować style wzorca tekstu</a:t>
             </a:r>
+            <a:endParaRPr kumimoji="0" lang="pl-PL" smtClean="0"/>
           </a:p>
         </p:txBody>
       </p:sp>
@@ -1540,7 +1544,7 @@
             <a:spLocks noGrp="1"/>
           </p:cNvSpPr>
           <p:nvPr>
-            <p:ph sz="quarter" idx="2"/>
+            <p:ph sz="quarter" idx="2" hasCustomPrompt="1"/>
           </p:nvPr>
         </p:nvSpPr>
         <p:spPr>
@@ -1574,6 +1578,7 @@
               <a:rPr lang="pl-PL" smtClean="0"/>
               <a:t>Kliknij, aby edytować style wzorca tekstu</a:t>
             </a:r>
+            <a:endParaRPr lang="pl-PL" smtClean="0"/>
           </a:p>
           <a:p>
             <a:pPr lvl="1" eaLnBrk="1" latinLnBrk="0" hangingPunct="1"/>
@@ -1581,6 +1586,7 @@
               <a:rPr lang="pl-PL" smtClean="0"/>
               <a:t>Drugi poziom</a:t>
             </a:r>
+            <a:endParaRPr lang="pl-PL" smtClean="0"/>
           </a:p>
           <a:p>
             <a:pPr lvl="2" eaLnBrk="1" latinLnBrk="0" hangingPunct="1"/>
@@ -1588,6 +1594,7 @@
               <a:rPr lang="pl-PL" smtClean="0"/>
               <a:t>Trzeci poziom</a:t>
             </a:r>
+            <a:endParaRPr lang="pl-PL" smtClean="0"/>
           </a:p>
           <a:p>
             <a:pPr lvl="3" eaLnBrk="1" latinLnBrk="0" hangingPunct="1"/>
@@ -1595,6 +1602,7 @@
               <a:rPr lang="pl-PL" smtClean="0"/>
               <a:t>Czwarty poziom</a:t>
             </a:r>
+            <a:endParaRPr lang="pl-PL" smtClean="0"/>
           </a:p>
           <a:p>
             <a:pPr lvl="4" eaLnBrk="1" latinLnBrk="0" hangingPunct="1"/>
@@ -1613,7 +1621,7 @@
             <a:spLocks noGrp="1"/>
           </p:cNvSpPr>
           <p:nvPr>
-            <p:ph sz="quarter" idx="4"/>
+            <p:ph sz="quarter" idx="4" hasCustomPrompt="1"/>
           </p:nvPr>
         </p:nvSpPr>
         <p:spPr>
@@ -1647,6 +1655,7 @@
               <a:rPr lang="pl-PL" smtClean="0"/>
               <a:t>Kliknij, aby edytować style wzorca tekstu</a:t>
             </a:r>
+            <a:endParaRPr lang="pl-PL" smtClean="0"/>
           </a:p>
           <a:p>
             <a:pPr lvl="1" eaLnBrk="1" latinLnBrk="0" hangingPunct="1"/>
@@ -1654,6 +1663,7 @@
               <a:rPr lang="pl-PL" smtClean="0"/>
               <a:t>Drugi poziom</a:t>
             </a:r>
+            <a:endParaRPr lang="pl-PL" smtClean="0"/>
           </a:p>
           <a:p>
             <a:pPr lvl="2" eaLnBrk="1" latinLnBrk="0" hangingPunct="1"/>
@@ -1661,6 +1671,7 @@
               <a:rPr lang="pl-PL" smtClean="0"/>
               <a:t>Trzeci poziom</a:t>
             </a:r>
+            <a:endParaRPr lang="pl-PL" smtClean="0"/>
           </a:p>
           <a:p>
             <a:pPr lvl="3" eaLnBrk="1" latinLnBrk="0" hangingPunct="1"/>
@@ -1668,6 +1679,7 @@
               <a:rPr lang="pl-PL" smtClean="0"/>
               <a:t>Czwarty poziom</a:t>
             </a:r>
+            <a:endParaRPr lang="pl-PL" smtClean="0"/>
           </a:p>
           <a:p>
             <a:pPr lvl="4" eaLnBrk="1" latinLnBrk="0" hangingPunct="1"/>
@@ -1696,8 +1708,6 @@
           <a:p>
             <a:fld id="{E2699B8C-B7F7-4D4D-90D9-FF159D88763D}" type="datetimeFigureOut">
               <a:rPr lang="pl-PL" smtClean="0"/>
-              <a:pPr/>
-              <a:t>18.01.2022</a:t>
             </a:fld>
             <a:endParaRPr lang="pl-PL"/>
           </a:p>
@@ -1739,8 +1749,6 @@
           <a:p>
             <a:fld id="{ABB6616C-FD9B-4419-A183-8B942468E50F}" type="slidenum">
               <a:rPr lang="pl-PL" smtClean="0"/>
-              <a:pPr/>
-              <a:t>‹#›</a:t>
             </a:fld>
             <a:endParaRPr lang="pl-PL"/>
           </a:p>
@@ -1778,7 +1786,7 @@
             <a:spLocks noGrp="1"/>
           </p:cNvSpPr>
           <p:nvPr>
-            <p:ph type="title"/>
+            <p:ph type="title" hasCustomPrompt="1"/>
           </p:nvPr>
         </p:nvSpPr>
         <p:spPr>
@@ -1848,8 +1856,6 @@
           <a:p>
             <a:fld id="{E2699B8C-B7F7-4D4D-90D9-FF159D88763D}" type="datetimeFigureOut">
               <a:rPr lang="pl-PL" smtClean="0"/>
-              <a:pPr/>
-              <a:t>18.01.2022</a:t>
             </a:fld>
             <a:endParaRPr lang="pl-PL"/>
           </a:p>
@@ -1891,8 +1897,6 @@
           <a:p>
             <a:fld id="{ABB6616C-FD9B-4419-A183-8B942468E50F}" type="slidenum">
               <a:rPr lang="pl-PL" smtClean="0"/>
-              <a:pPr/>
-              <a:t>‹#›</a:t>
             </a:fld>
             <a:endParaRPr lang="pl-PL"/>
           </a:p>
@@ -1940,8 +1944,6 @@
           <a:p>
             <a:fld id="{E2699B8C-B7F7-4D4D-90D9-FF159D88763D}" type="datetimeFigureOut">
               <a:rPr lang="pl-PL" smtClean="0"/>
-              <a:pPr/>
-              <a:t>18.01.2022</a:t>
             </a:fld>
             <a:endParaRPr lang="pl-PL"/>
           </a:p>
@@ -1983,8 +1985,6 @@
           <a:p>
             <a:fld id="{ABB6616C-FD9B-4419-A183-8B942468E50F}" type="slidenum">
               <a:rPr lang="pl-PL" smtClean="0"/>
-              <a:pPr/>
-              <a:t>‹#›</a:t>
             </a:fld>
             <a:endParaRPr lang="pl-PL"/>
           </a:p>
@@ -2022,7 +2022,7 @@
             <a:spLocks noGrp="1"/>
           </p:cNvSpPr>
           <p:nvPr>
-            <p:ph type="title"/>
+            <p:ph type="title" hasCustomPrompt="1"/>
           </p:nvPr>
         </p:nvSpPr>
         <p:spPr>
@@ -2071,7 +2071,7 @@
             <a:spLocks noGrp="1"/>
           </p:cNvSpPr>
           <p:nvPr>
-            <p:ph type="body" idx="2"/>
+            <p:ph type="body" idx="2" hasCustomPrompt="1"/>
           </p:nvPr>
         </p:nvSpPr>
         <p:spPr>
@@ -2110,6 +2110,7 @@
               <a:rPr kumimoji="0" lang="pl-PL" smtClean="0"/>
               <a:t>Kliknij, aby edytować style wzorca tekstu</a:t>
             </a:r>
+            <a:endParaRPr kumimoji="0" lang="pl-PL" smtClean="0"/>
           </a:p>
         </p:txBody>
       </p:sp>
@@ -2120,7 +2121,7 @@
             <a:spLocks noGrp="1"/>
           </p:cNvSpPr>
           <p:nvPr>
-            <p:ph sz="half" idx="1"/>
+            <p:ph sz="half" idx="1" hasCustomPrompt="1"/>
           </p:nvPr>
         </p:nvSpPr>
         <p:spPr>
@@ -2154,6 +2155,7 @@
               <a:rPr lang="pl-PL" smtClean="0"/>
               <a:t>Kliknij, aby edytować style wzorca tekstu</a:t>
             </a:r>
+            <a:endParaRPr lang="pl-PL" smtClean="0"/>
           </a:p>
           <a:p>
             <a:pPr lvl="1" eaLnBrk="1" latinLnBrk="0" hangingPunct="1"/>
@@ -2161,6 +2163,7 @@
               <a:rPr lang="pl-PL" smtClean="0"/>
               <a:t>Drugi poziom</a:t>
             </a:r>
+            <a:endParaRPr lang="pl-PL" smtClean="0"/>
           </a:p>
           <a:p>
             <a:pPr lvl="2" eaLnBrk="1" latinLnBrk="0" hangingPunct="1"/>
@@ -2168,6 +2171,7 @@
               <a:rPr lang="pl-PL" smtClean="0"/>
               <a:t>Trzeci poziom</a:t>
             </a:r>
+            <a:endParaRPr lang="pl-PL" smtClean="0"/>
           </a:p>
           <a:p>
             <a:pPr lvl="3" eaLnBrk="1" latinLnBrk="0" hangingPunct="1"/>
@@ -2175,6 +2179,7 @@
               <a:rPr lang="pl-PL" smtClean="0"/>
               <a:t>Czwarty poziom</a:t>
             </a:r>
+            <a:endParaRPr lang="pl-PL" smtClean="0"/>
           </a:p>
           <a:p>
             <a:pPr lvl="4" eaLnBrk="1" latinLnBrk="0" hangingPunct="1"/>
@@ -2203,8 +2208,6 @@
           <a:p>
             <a:fld id="{E2699B8C-B7F7-4D4D-90D9-FF159D88763D}" type="datetimeFigureOut">
               <a:rPr lang="pl-PL" smtClean="0"/>
-              <a:pPr/>
-              <a:t>18.01.2022</a:t>
             </a:fld>
             <a:endParaRPr lang="pl-PL"/>
           </a:p>
@@ -2246,8 +2249,6 @@
           <a:p>
             <a:fld id="{ABB6616C-FD9B-4419-A183-8B942468E50F}" type="slidenum">
               <a:rPr lang="pl-PL" smtClean="0"/>
-              <a:pPr/>
-              <a:t>‹#›</a:t>
             </a:fld>
             <a:endParaRPr lang="pl-PL"/>
           </a:p>
@@ -2262,7 +2263,7 @@
 </file>
 
 <file path=ppt/slideLayouts/slideLayout9.xml><?xml version="1.0" encoding="utf-8"?>
-<p:sldLayout xmlns:a="http://schemas.openxmlformats.org/drawingml/2006/main" xmlns:r="http://schemas.openxmlformats.org/officeDocument/2006/relationships" xmlns:p="http://schemas.openxmlformats.org/presentationml/2006/main" showMasterSp="0" type="picTx" preserve="1">
+<p:sldLayout xmlns:a="http://schemas.openxmlformats.org/drawingml/2006/main" xmlns:r="http://schemas.openxmlformats.org/officeDocument/2006/relationships" xmlns:p="http://schemas.openxmlformats.org/presentationml/2006/main" type="picTx" preserve="1" showMasterSp="0">
   <p:cSld name="Obraz z podpisem">
     <p:spTree>
       <p:nvGrpSpPr>
@@ -2397,7 +2398,7 @@
             <a:spLocks noGrp="1"/>
           </p:cNvSpPr>
           <p:nvPr>
-            <p:ph type="title"/>
+            <p:ph type="title" hasCustomPrompt="1"/>
           </p:nvPr>
         </p:nvSpPr>
         <p:spPr>
@@ -2434,7 +2435,7 @@
             <a:spLocks noGrp="1"/>
           </p:cNvSpPr>
           <p:nvPr>
-            <p:ph type="body" sz="half" idx="2"/>
+            <p:ph type="body" sz="half" idx="2" hasCustomPrompt="1"/>
           </p:nvPr>
         </p:nvSpPr>
         <p:spPr>
@@ -2473,6 +2474,7 @@
               <a:rPr kumimoji="0" lang="pl-PL" smtClean="0"/>
               <a:t>Kliknij, aby edytować style wzorca tekstu</a:t>
             </a:r>
+            <a:endParaRPr kumimoji="0" lang="pl-PL" smtClean="0"/>
           </a:p>
         </p:txBody>
       </p:sp>
@@ -2493,8 +2495,6 @@
           <a:p>
             <a:fld id="{E2699B8C-B7F7-4D4D-90D9-FF159D88763D}" type="datetimeFigureOut">
               <a:rPr lang="pl-PL" smtClean="0"/>
-              <a:pPr/>
-              <a:t>18.01.2022</a:t>
             </a:fld>
             <a:endParaRPr lang="pl-PL"/>
           </a:p>
@@ -2541,8 +2541,6 @@
           <a:p>
             <a:fld id="{ABB6616C-FD9B-4419-A183-8B942468E50F}" type="slidenum">
               <a:rPr lang="pl-PL" smtClean="0"/>
-              <a:pPr/>
-              <a:t>‹#›</a:t>
             </a:fld>
             <a:endParaRPr lang="pl-PL"/>
           </a:p>
@@ -2555,7 +2553,7 @@
             <a:spLocks noGrp="1"/>
           </p:cNvSpPr>
           <p:nvPr>
-            <p:ph type="pic" idx="1"/>
+            <p:ph type="pic" idx="1" hasCustomPrompt="1"/>
           </p:nvPr>
         </p:nvSpPr>
         <p:spPr>
@@ -2597,9 +2595,7 @@
       <p:sp>
         <p:nvSpPr>
           <p:cNvPr id="10" name="Dowolny kształt 9"/>
-          <p:cNvSpPr>
-            <a:spLocks/>
-          </p:cNvSpPr>
+          <p:cNvSpPr/>
           <p:nvPr/>
         </p:nvSpPr>
         <p:spPr bwMode="auto">
@@ -2740,9 +2736,7 @@
       <p:sp>
         <p:nvSpPr>
           <p:cNvPr id="11" name="Dowolny kształt 10"/>
-          <p:cNvSpPr>
-            <a:spLocks/>
-          </p:cNvSpPr>
+          <p:cNvSpPr/>
           <p:nvPr/>
         </p:nvSpPr>
         <p:spPr bwMode="auto">
@@ -2883,9 +2877,7 @@
       <p:sp>
         <p:nvSpPr>
           <p:cNvPr id="7" name="Dowolny kształt 6"/>
-          <p:cNvSpPr>
-            <a:spLocks/>
-          </p:cNvSpPr>
+          <p:cNvSpPr/>
           <p:nvPr/>
         </p:nvSpPr>
         <p:spPr bwMode="auto">
@@ -3026,9 +3018,7 @@
       <p:sp>
         <p:nvSpPr>
           <p:cNvPr id="8" name="Dowolny kształt 7"/>
-          <p:cNvSpPr>
-            <a:spLocks/>
-          </p:cNvSpPr>
+          <p:cNvSpPr/>
           <p:nvPr/>
         </p:nvSpPr>
         <p:spPr bwMode="auto">
@@ -3199,6 +3189,7 @@
               <a:rPr kumimoji="0" lang="pl-PL" smtClean="0"/>
               <a:t>Kliknij, aby edytować style wzorca tekstu</a:t>
             </a:r>
+            <a:endParaRPr kumimoji="0" lang="pl-PL" smtClean="0"/>
           </a:p>
           <a:p>
             <a:pPr lvl="1" eaLnBrk="1" latinLnBrk="0" hangingPunct="1"/>
@@ -3206,6 +3197,7 @@
               <a:rPr kumimoji="0" lang="pl-PL" smtClean="0"/>
               <a:t>Drugi poziom</a:t>
             </a:r>
+            <a:endParaRPr kumimoji="0" lang="pl-PL" smtClean="0"/>
           </a:p>
           <a:p>
             <a:pPr lvl="2" eaLnBrk="1" latinLnBrk="0" hangingPunct="1"/>
@@ -3213,6 +3205,7 @@
               <a:rPr kumimoji="0" lang="pl-PL" smtClean="0"/>
               <a:t>Trzeci poziom</a:t>
             </a:r>
+            <a:endParaRPr kumimoji="0" lang="pl-PL" smtClean="0"/>
           </a:p>
           <a:p>
             <a:pPr lvl="3" eaLnBrk="1" latinLnBrk="0" hangingPunct="1"/>
@@ -3220,6 +3213,7 @@
               <a:rPr kumimoji="0" lang="pl-PL" smtClean="0"/>
               <a:t>Czwarty poziom</a:t>
             </a:r>
+            <a:endParaRPr kumimoji="0" lang="pl-PL" smtClean="0"/>
           </a:p>
           <a:p>
             <a:pPr lvl="4" eaLnBrk="1" latinLnBrk="0" hangingPunct="1"/>
@@ -3266,8 +3260,6 @@
           <a:p>
             <a:fld id="{E2699B8C-B7F7-4D4D-90D9-FF159D88763D}" type="datetimeFigureOut">
               <a:rPr lang="pl-PL" smtClean="0"/>
-              <a:pPr/>
-              <a:t>18.01.2022</a:t>
             </a:fld>
             <a:endParaRPr lang="pl-PL"/>
           </a:p>
@@ -3345,8 +3337,6 @@
           <a:p>
             <a:fld id="{ABB6616C-FD9B-4419-A183-8B942468E50F}" type="slidenum">
               <a:rPr lang="pl-PL" smtClean="0"/>
-              <a:pPr/>
-              <a:t>‹#›</a:t>
             </a:fld>
             <a:endParaRPr lang="pl-PL"/>
           </a:p>
@@ -3369,9 +3359,7 @@
         <p:sp>
           <p:nvSpPr>
             <p:cNvPr id="12" name="Dowolny kształt 11"/>
-            <p:cNvSpPr>
-              <a:spLocks/>
-            </p:cNvSpPr>
+            <p:cNvSpPr/>
             <p:nvPr/>
           </p:nvSpPr>
           <p:spPr bwMode="auto">
@@ -3471,9 +3459,7 @@
         <p:sp>
           <p:nvSpPr>
             <p:cNvPr id="13" name="Dowolny kształt 12"/>
-            <p:cNvSpPr>
-              <a:spLocks/>
-            </p:cNvSpPr>
+            <p:cNvSpPr/>
             <p:nvPr/>
           </p:nvSpPr>
           <p:spPr bwMode="auto">
@@ -3570,17 +3556,17 @@
   </p:cSld>
   <p:clrMap bg1="lt1" tx1="dk1" bg2="lt2" tx2="dk2" accent1="accent1" accent2="accent2" accent3="accent3" accent4="accent4" accent5="accent5" accent6="accent6" hlink="hlink" folHlink="folHlink"/>
   <p:sldLayoutIdLst>
-    <p:sldLayoutId id="2147483661" r:id="rId1"/>
-    <p:sldLayoutId id="2147483662" r:id="rId2"/>
-    <p:sldLayoutId id="2147483663" r:id="rId3"/>
-    <p:sldLayoutId id="2147483664" r:id="rId4"/>
-    <p:sldLayoutId id="2147483665" r:id="rId5"/>
-    <p:sldLayoutId id="2147483666" r:id="rId6"/>
-    <p:sldLayoutId id="2147483667" r:id="rId7"/>
-    <p:sldLayoutId id="2147483668" r:id="rId8"/>
-    <p:sldLayoutId id="2147483669" r:id="rId9"/>
-    <p:sldLayoutId id="2147483670" r:id="rId10"/>
-    <p:sldLayoutId id="2147483671" r:id="rId11"/>
+    <p:sldLayoutId id="2147483649" r:id="rId1"/>
+    <p:sldLayoutId id="2147483650" r:id="rId2"/>
+    <p:sldLayoutId id="2147483651" r:id="rId3"/>
+    <p:sldLayoutId id="2147483652" r:id="rId4"/>
+    <p:sldLayoutId id="2147483653" r:id="rId5"/>
+    <p:sldLayoutId id="2147483654" r:id="rId6"/>
+    <p:sldLayoutId id="2147483655" r:id="rId7"/>
+    <p:sldLayoutId id="2147483656" r:id="rId8"/>
+    <p:sldLayoutId id="2147483657" r:id="rId9"/>
+    <p:sldLayoutId id="2147483658" r:id="rId10"/>
+    <p:sldLayoutId id="2147483659" r:id="rId11"/>
   </p:sldLayoutIdLst>
   <p:txStyles>
     <p:titleStyle>
@@ -3612,7 +3598,7 @@
           <a:schemeClr val="accent3"/>
         </a:buClr>
         <a:buSzPct val="95000"/>
-        <a:buFont typeface="Wingdings 2"/>
+        <a:buFont typeface="Wingdings 2" panose="05020102010507070707"/>
         <a:buChar char=""/>
         <a:defRPr kumimoji="0" sz="2600" kern="1200">
           <a:solidFill>
@@ -3623,7 +3609,7 @@
           <a:cs typeface="+mn-cs"/>
         </a:defRPr>
       </a:lvl1pPr>
-      <a:lvl2pPr marL="640080" indent="-246888" algn="l" rtl="0" eaLnBrk="1" latinLnBrk="0" hangingPunct="1">
+      <a:lvl2pPr marL="640080" indent="-247015" algn="l" rtl="0" eaLnBrk="1" latinLnBrk="0" hangingPunct="1">
         <a:spcBef>
           <a:spcPct val="20000"/>
         </a:spcBef>
@@ -3631,7 +3617,7 @@
           <a:schemeClr val="accent1"/>
         </a:buClr>
         <a:buSzPct val="85000"/>
-        <a:buFont typeface="Wingdings 2"/>
+        <a:buFont typeface="Wingdings 2" panose="05020102010507070707"/>
         <a:buChar char=""/>
         <a:defRPr kumimoji="0" sz="2400" kern="1200">
           <a:solidFill>
@@ -3642,7 +3628,7 @@
           <a:cs typeface="+mn-cs"/>
         </a:defRPr>
       </a:lvl2pPr>
-      <a:lvl3pPr marL="914400" indent="-246888" algn="l" rtl="0" eaLnBrk="1" latinLnBrk="0" hangingPunct="1">
+      <a:lvl3pPr marL="914400" indent="-247015" algn="l" rtl="0" eaLnBrk="1" latinLnBrk="0" hangingPunct="1">
         <a:spcBef>
           <a:spcPct val="20000"/>
         </a:spcBef>
@@ -3650,7 +3636,7 @@
           <a:schemeClr val="accent2"/>
         </a:buClr>
         <a:buSzPct val="70000"/>
-        <a:buFont typeface="Wingdings 2"/>
+        <a:buFont typeface="Wingdings 2" panose="05020102010507070707"/>
         <a:buChar char=""/>
         <a:defRPr kumimoji="0" sz="2100" kern="1200">
           <a:solidFill>
@@ -3661,7 +3647,7 @@
           <a:cs typeface="+mn-cs"/>
         </a:defRPr>
       </a:lvl3pPr>
-      <a:lvl4pPr marL="1188720" indent="-210312" algn="l" rtl="0" eaLnBrk="1" latinLnBrk="0" hangingPunct="1">
+      <a:lvl4pPr marL="1188720" indent="-210185" algn="l" rtl="0" eaLnBrk="1" latinLnBrk="0" hangingPunct="1">
         <a:spcBef>
           <a:spcPct val="20000"/>
         </a:spcBef>
@@ -3669,7 +3655,7 @@
           <a:schemeClr val="accent3"/>
         </a:buClr>
         <a:buSzPct val="65000"/>
-        <a:buFont typeface="Wingdings 2"/>
+        <a:buFont typeface="Wingdings 2" panose="05020102010507070707"/>
         <a:buChar char=""/>
         <a:defRPr kumimoji="0" sz="2000" kern="1200">
           <a:solidFill>
@@ -3680,7 +3666,7 @@
           <a:cs typeface="+mn-cs"/>
         </a:defRPr>
       </a:lvl4pPr>
-      <a:lvl5pPr marL="1463040" indent="-210312" algn="l" rtl="0" eaLnBrk="1" latinLnBrk="0" hangingPunct="1">
+      <a:lvl5pPr marL="1463040" indent="-210185" algn="l" rtl="0" eaLnBrk="1" latinLnBrk="0" hangingPunct="1">
         <a:spcBef>
           <a:spcPct val="20000"/>
         </a:spcBef>
@@ -3688,7 +3674,7 @@
           <a:schemeClr val="accent4"/>
         </a:buClr>
         <a:buSzPct val="65000"/>
-        <a:buFont typeface="Wingdings 2"/>
+        <a:buFont typeface="Wingdings 2" panose="05020102010507070707"/>
         <a:buChar char=""/>
         <a:defRPr kumimoji="0" sz="2000" kern="1200">
           <a:solidFill>
@@ -3699,7 +3685,7 @@
           <a:cs typeface="+mn-cs"/>
         </a:defRPr>
       </a:lvl5pPr>
-      <a:lvl6pPr marL="1737360" indent="-210312" algn="l" rtl="0" eaLnBrk="1" latinLnBrk="0" hangingPunct="1">
+      <a:lvl6pPr marL="1737360" indent="-210185" algn="l" rtl="0" eaLnBrk="1" latinLnBrk="0" hangingPunct="1">
         <a:spcBef>
           <a:spcPct val="20000"/>
         </a:spcBef>
@@ -3707,7 +3693,7 @@
           <a:schemeClr val="accent5"/>
         </a:buClr>
         <a:buSzPct val="80000"/>
-        <a:buFont typeface="Wingdings 2"/>
+        <a:buFont typeface="Wingdings 2" panose="05020102010507070707"/>
         <a:buChar char=""/>
         <a:defRPr kumimoji="0" sz="1800" kern="1200">
           <a:solidFill>
@@ -3726,7 +3712,7 @@
           <a:schemeClr val="accent6"/>
         </a:buClr>
         <a:buSzPct val="80000"/>
-        <a:buFont typeface="Wingdings 2"/>
+        <a:buFont typeface="Wingdings 2" panose="05020102010507070707"/>
         <a:buChar char=""/>
         <a:defRPr kumimoji="0" sz="1600" kern="1200" baseline="0">
           <a:solidFill>
@@ -3960,7 +3946,7 @@
           <p:nvPr/>
         </p:nvPicPr>
         <p:blipFill>
-          <a:blip r:embed="rId2"/>
+          <a:blip r:embed="rId1"/>
           <a:srcRect/>
           <a:stretch>
             <a:fillRect/>
@@ -3986,7 +3972,7 @@
       </p:pic>
       <p:sp>
         <p:nvSpPr>
-          <p:cNvPr id="6" name="pole tekstowe 5"/>
+          <p:cNvPr id="6" name="Pole tekstowe 5"/>
           <p:cNvSpPr txBox="1"/>
           <p:nvPr/>
         </p:nvSpPr>
@@ -4010,6 +3996,7 @@
               <a:rPr lang="pl-PL" dirty="0"/>
               <a:t>Opiekun pracy dyplomowej:</a:t>
             </a:r>
+            <a:endParaRPr lang="pl-PL" dirty="0"/>
           </a:p>
           <a:p>
             <a:pPr algn="ctr"/>
@@ -4034,7 +4021,7 @@
       </p:sp>
       <p:sp>
         <p:nvSpPr>
-          <p:cNvPr id="7" name="pole tekstowe 6"/>
+          <p:cNvPr id="7" name="Pole tekstowe 6"/>
           <p:cNvSpPr txBox="1"/>
           <p:nvPr/>
         </p:nvSpPr>
@@ -4064,7 +4051,7 @@
       </p:sp>
       <p:sp>
         <p:nvSpPr>
-          <p:cNvPr id="8" name="pole tekstowe 7"/>
+          <p:cNvPr id="8" name="Pole tekstowe 7"/>
           <p:cNvSpPr txBox="1"/>
           <p:nvPr/>
         </p:nvSpPr>
@@ -4088,6 +4075,7 @@
               <a:rPr lang="pl-PL" dirty="0"/>
               <a:t>Wydziału Elektrotechniki, Automatyki i Informatyki </a:t>
             </a:r>
+            <a:endParaRPr lang="pl-PL" dirty="0"/>
           </a:p>
         </p:txBody>
       </p:sp>
@@ -4191,6 +4179,7 @@
               <a:rPr lang="pl-PL" sz="1300" dirty="0" smtClean="0"/>
               <a:t>”, a pozycja zostanie dodana do listy.</a:t>
             </a:r>
+            <a:endParaRPr lang="pl-PL" sz="1300" dirty="0" smtClean="0"/>
           </a:p>
           <a:p>
             <a:endParaRPr lang="pl-PL" sz="1500" dirty="0"/>
@@ -4200,6 +4189,39 @@
       <p:pic>
         <p:nvPicPr>
           <p:cNvPr id="36870" name="Picture 6"/>
+          <p:cNvPicPr>
+            <a:picLocks noChangeAspect="1" noChangeArrowheads="1"/>
+          </p:cNvPicPr>
+          <p:nvPr/>
+        </p:nvPicPr>
+        <p:blipFill>
+          <a:blip r:embed="rId1"/>
+          <a:srcRect/>
+          <a:stretch>
+            <a:fillRect/>
+          </a:stretch>
+        </p:blipFill>
+        <p:spPr bwMode="auto">
+          <a:xfrm>
+            <a:off x="3286116" y="2143116"/>
+            <a:ext cx="2458731" cy="4222461"/>
+          </a:xfrm>
+          <a:prstGeom prst="rect">
+            <a:avLst/>
+          </a:prstGeom>
+          <a:noFill/>
+          <a:ln w="9525">
+            <a:noFill/>
+            <a:miter lim="800000"/>
+            <a:headEnd/>
+            <a:tailEnd/>
+          </a:ln>
+          <a:effectLst/>
+        </p:spPr>
+      </p:pic>
+      <p:pic>
+        <p:nvPicPr>
+          <p:cNvPr id="36871" name="Picture 7"/>
           <p:cNvPicPr>
             <a:picLocks noChangeAspect="1" noChangeArrowheads="1"/>
           </p:cNvPicPr>
@@ -4214,8 +4236,8 @@
         </p:blipFill>
         <p:spPr bwMode="auto">
           <a:xfrm>
-            <a:off x="3286116" y="2143116"/>
-            <a:ext cx="2458731" cy="4222461"/>
+            <a:off x="6215074" y="4286256"/>
+            <a:ext cx="2000264" cy="2188841"/>
           </a:xfrm>
           <a:prstGeom prst="rect">
             <a:avLst/>
@@ -4232,7 +4254,7 @@
       </p:pic>
       <p:pic>
         <p:nvPicPr>
-          <p:cNvPr id="36871" name="Picture 7"/>
+          <p:cNvPr id="36872" name="Picture 8"/>
           <p:cNvPicPr>
             <a:picLocks noChangeAspect="1" noChangeArrowheads="1"/>
           </p:cNvPicPr>
@@ -4247,8 +4269,8 @@
         </p:blipFill>
         <p:spPr bwMode="auto">
           <a:xfrm>
-            <a:off x="6215074" y="4286256"/>
-            <a:ext cx="2000264" cy="2188841"/>
+            <a:off x="428596" y="2143116"/>
+            <a:ext cx="2437420" cy="4214842"/>
           </a:xfrm>
           <a:prstGeom prst="rect">
             <a:avLst/>
@@ -4265,7 +4287,7 @@
       </p:pic>
       <p:pic>
         <p:nvPicPr>
-          <p:cNvPr id="36872" name="Picture 8"/>
+          <p:cNvPr id="36873" name="Picture 9"/>
           <p:cNvPicPr>
             <a:picLocks noChangeAspect="1" noChangeArrowheads="1"/>
           </p:cNvPicPr>
@@ -4280,8 +4302,8 @@
         </p:blipFill>
         <p:spPr bwMode="auto">
           <a:xfrm>
-            <a:off x="428596" y="2143116"/>
-            <a:ext cx="2437420" cy="4214842"/>
+            <a:off x="6215074" y="2000240"/>
+            <a:ext cx="1954436" cy="2143140"/>
           </a:xfrm>
           <a:prstGeom prst="rect">
             <a:avLst/>
@@ -4296,42 +4318,9 @@
           <a:effectLst/>
         </p:spPr>
       </p:pic>
-      <p:pic>
-        <p:nvPicPr>
-          <p:cNvPr id="36873" name="Picture 9"/>
-          <p:cNvPicPr>
-            <a:picLocks noChangeAspect="1" noChangeArrowheads="1"/>
-          </p:cNvPicPr>
-          <p:nvPr/>
-        </p:nvPicPr>
-        <p:blipFill>
-          <a:blip r:embed="rId5"/>
-          <a:srcRect/>
-          <a:stretch>
-            <a:fillRect/>
-          </a:stretch>
-        </p:blipFill>
-        <p:spPr bwMode="auto">
-          <a:xfrm>
-            <a:off x="6215074" y="2000240"/>
-            <a:ext cx="1954436" cy="2143140"/>
-          </a:xfrm>
-          <a:prstGeom prst="rect">
-            <a:avLst/>
-          </a:prstGeom>
-          <a:noFill/>
-          <a:ln w="9525">
-            <a:noFill/>
-            <a:miter lim="800000"/>
-            <a:headEnd/>
-            <a:tailEnd/>
-          </a:ln>
-          <a:effectLst/>
-        </p:spPr>
-      </p:pic>
-      <p:sp>
-        <p:nvSpPr>
-          <p:cNvPr id="7" name="pole tekstowe 6"/>
+      <p:sp>
+        <p:nvSpPr>
+          <p:cNvPr id="7" name="Pole tekstowe 6"/>
           <p:cNvSpPr txBox="1"/>
           <p:nvPr/>
         </p:nvSpPr>
@@ -4451,6 +4440,7 @@
               <a:rPr lang="pl-PL" sz="1300" dirty="0" smtClean="0"/>
               <a:t>. Po kliknięciu w przycisk zostajemy przeniesieni do fragmentu tworzącego wiersz.</a:t>
             </a:r>
+            <a:endParaRPr lang="pl-PL" sz="1300" dirty="0" smtClean="0"/>
           </a:p>
           <a:p>
             <a:endParaRPr lang="pl-PL" sz="1500" dirty="0"/>
@@ -4460,6 +4450,39 @@
       <p:pic>
         <p:nvPicPr>
           <p:cNvPr id="5121" name="Picture 1"/>
+          <p:cNvPicPr>
+            <a:picLocks noChangeAspect="1" noChangeArrowheads="1"/>
+          </p:cNvPicPr>
+          <p:nvPr/>
+        </p:nvPicPr>
+        <p:blipFill>
+          <a:blip r:embed="rId1"/>
+          <a:srcRect/>
+          <a:stretch>
+            <a:fillRect/>
+          </a:stretch>
+        </p:blipFill>
+        <p:spPr bwMode="auto">
+          <a:xfrm>
+            <a:off x="571472" y="2214554"/>
+            <a:ext cx="2506534" cy="4357721"/>
+          </a:xfrm>
+          <a:prstGeom prst="rect">
+            <a:avLst/>
+          </a:prstGeom>
+          <a:noFill/>
+          <a:ln w="9525">
+            <a:noFill/>
+            <a:miter lim="800000"/>
+            <a:headEnd/>
+            <a:tailEnd/>
+          </a:ln>
+          <a:effectLst/>
+        </p:spPr>
+      </p:pic>
+      <p:pic>
+        <p:nvPicPr>
+          <p:cNvPr id="5122" name="Picture 2"/>
           <p:cNvPicPr>
             <a:picLocks noChangeAspect="1" noChangeArrowheads="1"/>
           </p:cNvPicPr>
@@ -4474,8 +4497,8 @@
         </p:blipFill>
         <p:spPr bwMode="auto">
           <a:xfrm>
-            <a:off x="571472" y="2214554"/>
-            <a:ext cx="2506534" cy="4357721"/>
+            <a:off x="3500430" y="2214554"/>
+            <a:ext cx="2499764" cy="4357697"/>
           </a:xfrm>
           <a:prstGeom prst="rect">
             <a:avLst/>
@@ -4490,42 +4513,9 @@
           <a:effectLst/>
         </p:spPr>
       </p:pic>
-      <p:pic>
-        <p:nvPicPr>
-          <p:cNvPr id="5122" name="Picture 2"/>
-          <p:cNvPicPr>
-            <a:picLocks noChangeAspect="1" noChangeArrowheads="1"/>
-          </p:cNvPicPr>
-          <p:nvPr/>
-        </p:nvPicPr>
-        <p:blipFill>
-          <a:blip r:embed="rId3"/>
-          <a:srcRect/>
-          <a:stretch>
-            <a:fillRect/>
-          </a:stretch>
-        </p:blipFill>
-        <p:spPr bwMode="auto">
-          <a:xfrm>
-            <a:off x="3500430" y="2214554"/>
-            <a:ext cx="2499764" cy="4357697"/>
-          </a:xfrm>
-          <a:prstGeom prst="rect">
-            <a:avLst/>
-          </a:prstGeom>
-          <a:noFill/>
-          <a:ln w="9525">
-            <a:noFill/>
-            <a:miter lim="800000"/>
-            <a:headEnd/>
-            <a:tailEnd/>
-          </a:ln>
-          <a:effectLst/>
-        </p:spPr>
-      </p:pic>
-      <p:sp>
-        <p:nvSpPr>
-          <p:cNvPr id="5" name="pole tekstowe 4"/>
+      <p:sp>
+        <p:nvSpPr>
+          <p:cNvPr id="5" name="Pole tekstowe 4"/>
           <p:cNvSpPr txBox="1"/>
           <p:nvPr/>
         </p:nvSpPr>
@@ -4621,6 +4611,7 @@
               <a:rPr lang="pl-PL" sz="1300" dirty="0" smtClean="0"/>
               <a:t>Po dodaniu pozycji do alergii, istnieje możliwość dodania komentarza, który pełni funkcję pomocniczą, w przypadku ponownego kontaktu z alergenem. Listę można sortować według typów pozycji. Po kliknięciu w pozycje, następuje przeniesienie do fragmentu zawierającego wszystkie informacje. Usunięcie alergii odbywa się poprzek kliknięcie w ikonę kosza.</a:t>
             </a:r>
+            <a:endParaRPr lang="pl-PL" sz="1300" dirty="0" smtClean="0"/>
           </a:p>
           <a:p>
             <a:endParaRPr lang="pl-PL" sz="1500" dirty="0"/>
@@ -4630,6 +4621,39 @@
       <p:pic>
         <p:nvPicPr>
           <p:cNvPr id="34818" name="Picture 2"/>
+          <p:cNvPicPr>
+            <a:picLocks noChangeAspect="1" noChangeArrowheads="1"/>
+          </p:cNvPicPr>
+          <p:nvPr/>
+        </p:nvPicPr>
+        <p:blipFill>
+          <a:blip r:embed="rId1"/>
+          <a:srcRect/>
+          <a:stretch>
+            <a:fillRect/>
+          </a:stretch>
+        </p:blipFill>
+        <p:spPr bwMode="auto">
+          <a:xfrm>
+            <a:off x="500034" y="2143116"/>
+            <a:ext cx="2643640" cy="4548198"/>
+          </a:xfrm>
+          <a:prstGeom prst="rect">
+            <a:avLst/>
+          </a:prstGeom>
+          <a:noFill/>
+          <a:ln w="9525">
+            <a:noFill/>
+            <a:miter lim="800000"/>
+            <a:headEnd/>
+            <a:tailEnd/>
+          </a:ln>
+          <a:effectLst/>
+        </p:spPr>
+      </p:pic>
+      <p:pic>
+        <p:nvPicPr>
+          <p:cNvPr id="34820" name="Picture 4"/>
           <p:cNvPicPr>
             <a:picLocks noChangeAspect="1" noChangeArrowheads="1"/>
           </p:cNvPicPr>
@@ -4644,8 +4668,8 @@
         </p:blipFill>
         <p:spPr bwMode="auto">
           <a:xfrm>
-            <a:off x="500034" y="2143116"/>
-            <a:ext cx="2643640" cy="4548198"/>
+            <a:off x="3357553" y="2143116"/>
+            <a:ext cx="2572759" cy="4500594"/>
           </a:xfrm>
           <a:prstGeom prst="rect">
             <a:avLst/>
@@ -4662,7 +4686,7 @@
       </p:pic>
       <p:pic>
         <p:nvPicPr>
-          <p:cNvPr id="34820" name="Picture 4"/>
+          <p:cNvPr id="34821" name="Picture 5"/>
           <p:cNvPicPr>
             <a:picLocks noChangeAspect="1" noChangeArrowheads="1"/>
           </p:cNvPicPr>
@@ -4677,8 +4701,8 @@
         </p:blipFill>
         <p:spPr bwMode="auto">
           <a:xfrm>
-            <a:off x="3357553" y="2143116"/>
-            <a:ext cx="2572759" cy="4500594"/>
+            <a:off x="6143636" y="2143116"/>
+            <a:ext cx="2601280" cy="4515029"/>
           </a:xfrm>
           <a:prstGeom prst="rect">
             <a:avLst/>
@@ -4693,42 +4717,9 @@
           <a:effectLst/>
         </p:spPr>
       </p:pic>
-      <p:pic>
-        <p:nvPicPr>
-          <p:cNvPr id="34821" name="Picture 5"/>
-          <p:cNvPicPr>
-            <a:picLocks noChangeAspect="1" noChangeArrowheads="1"/>
-          </p:cNvPicPr>
-          <p:nvPr/>
-        </p:nvPicPr>
-        <p:blipFill>
-          <a:blip r:embed="rId4"/>
-          <a:srcRect/>
-          <a:stretch>
-            <a:fillRect/>
-          </a:stretch>
-        </p:blipFill>
-        <p:spPr bwMode="auto">
-          <a:xfrm>
-            <a:off x="6143636" y="2143116"/>
-            <a:ext cx="2601280" cy="4515029"/>
-          </a:xfrm>
-          <a:prstGeom prst="rect">
-            <a:avLst/>
-          </a:prstGeom>
-          <a:noFill/>
-          <a:ln w="9525">
-            <a:noFill/>
-            <a:miter lim="800000"/>
-            <a:headEnd/>
-            <a:tailEnd/>
-          </a:ln>
-          <a:effectLst/>
-        </p:spPr>
-      </p:pic>
-      <p:sp>
-        <p:nvSpPr>
-          <p:cNvPr id="6" name="pole tekstowe 5"/>
+      <p:sp>
+        <p:nvSpPr>
+          <p:cNvPr id="6" name="Pole tekstowe 5"/>
           <p:cNvSpPr txBox="1"/>
           <p:nvPr/>
         </p:nvSpPr>
@@ -4810,6 +4801,7 @@
               <a:rPr lang="pl-PL" b="1" i="1" dirty="0" smtClean="0"/>
               <a:t>Profile</a:t>
             </a:r>
+            <a:endParaRPr lang="pl-PL" b="1" i="1" dirty="0" smtClean="0"/>
           </a:p>
           <a:p>
             <a:pPr>
@@ -4823,6 +4815,7 @@
               <a:rPr lang="pl-PL" sz="1300" dirty="0" smtClean="0"/>
               <a:t>W profilu możemy  zmieniać podstawowe dane takie jak hasło, email lub numer telefonu. Nie mam możliwości zmiany nazwy użytkownika ponieważ jest ona przypisana na stałe do konta. W lewym dolnym rogu odnajdziemy liczbę wierszy w poszczególnych listach, natomiast w prawym górnym rogu umieszczony został przycisk służący do wylogowania z aplikacji.</a:t>
             </a:r>
+            <a:endParaRPr lang="pl-PL" sz="1300" dirty="0" smtClean="0"/>
           </a:p>
           <a:p>
             <a:endParaRPr lang="pl-PL" sz="1500" dirty="0"/>
@@ -4832,6 +4825,39 @@
       <p:pic>
         <p:nvPicPr>
           <p:cNvPr id="35842" name="Picture 2"/>
+          <p:cNvPicPr>
+            <a:picLocks noChangeAspect="1" noChangeArrowheads="1"/>
+          </p:cNvPicPr>
+          <p:nvPr/>
+        </p:nvPicPr>
+        <p:blipFill>
+          <a:blip r:embed="rId1"/>
+          <a:srcRect/>
+          <a:stretch>
+            <a:fillRect/>
+          </a:stretch>
+        </p:blipFill>
+        <p:spPr bwMode="auto">
+          <a:xfrm>
+            <a:off x="1357290" y="2000240"/>
+            <a:ext cx="2723656" cy="4724412"/>
+          </a:xfrm>
+          <a:prstGeom prst="rect">
+            <a:avLst/>
+          </a:prstGeom>
+          <a:noFill/>
+          <a:ln w="9525">
+            <a:noFill/>
+            <a:miter lim="800000"/>
+            <a:headEnd/>
+            <a:tailEnd/>
+          </a:ln>
+          <a:effectLst/>
+        </p:spPr>
+      </p:pic>
+      <p:pic>
+        <p:nvPicPr>
+          <p:cNvPr id="3073" name="Picture 1"/>
           <p:cNvPicPr>
             <a:picLocks noChangeAspect="1" noChangeArrowheads="1"/>
           </p:cNvPicPr>
@@ -4846,8 +4872,8 @@
         </p:blipFill>
         <p:spPr bwMode="auto">
           <a:xfrm>
-            <a:off x="1357290" y="2000240"/>
-            <a:ext cx="2723656" cy="4724412"/>
+            <a:off x="5187253" y="2000240"/>
+            <a:ext cx="2670895" cy="4643470"/>
           </a:xfrm>
           <a:prstGeom prst="rect">
             <a:avLst/>
@@ -4862,42 +4888,9 @@
           <a:effectLst/>
         </p:spPr>
       </p:pic>
-      <p:pic>
-        <p:nvPicPr>
-          <p:cNvPr id="3073" name="Picture 1"/>
-          <p:cNvPicPr>
-            <a:picLocks noChangeAspect="1" noChangeArrowheads="1"/>
-          </p:cNvPicPr>
-          <p:nvPr/>
-        </p:nvPicPr>
-        <p:blipFill>
-          <a:blip r:embed="rId3"/>
-          <a:srcRect/>
-          <a:stretch>
-            <a:fillRect/>
-          </a:stretch>
-        </p:blipFill>
-        <p:spPr bwMode="auto">
-          <a:xfrm>
-            <a:off x="5187253" y="2000240"/>
-            <a:ext cx="2670895" cy="4643470"/>
-          </a:xfrm>
-          <a:prstGeom prst="rect">
-            <a:avLst/>
-          </a:prstGeom>
-          <a:noFill/>
-          <a:ln w="9525">
-            <a:noFill/>
-            <a:miter lim="800000"/>
-            <a:headEnd/>
-            <a:tailEnd/>
-          </a:ln>
-          <a:effectLst/>
-        </p:spPr>
-      </p:pic>
-      <p:sp>
-        <p:nvSpPr>
-          <p:cNvPr id="5" name="pole tekstowe 4"/>
+      <p:sp>
+        <p:nvSpPr>
+          <p:cNvPr id="5" name="Pole tekstowe 4"/>
           <p:cNvSpPr txBox="1"/>
           <p:nvPr/>
         </p:nvSpPr>
@@ -4979,6 +4972,7 @@
               <a:rPr lang="pl-PL" b="1" i="1" dirty="0" smtClean="0"/>
               <a:t>Ikony </a:t>
             </a:r>
+            <a:endParaRPr lang="pl-PL" b="1" i="1" dirty="0" smtClean="0"/>
           </a:p>
           <a:p>
             <a:pPr>
@@ -4988,6 +4982,7 @@
               <a:rPr lang="pl-PL" sz="1300" dirty="0" smtClean="0"/>
               <a:t>W aplikacji zostały użyte ikony, wspomagające rozpoznanie użytkownikowi aktualny stan aplikacji.  Wyświetlane są zależnie od stanu aplikacji.</a:t>
             </a:r>
+            <a:endParaRPr lang="pl-PL" sz="1300" dirty="0" smtClean="0"/>
           </a:p>
           <a:p>
             <a:endParaRPr lang="pl-PL" sz="1500" dirty="0"/>
@@ -4997,6 +4992,39 @@
       <p:pic>
         <p:nvPicPr>
           <p:cNvPr id="37890" name="Picture 2"/>
+          <p:cNvPicPr>
+            <a:picLocks noChangeAspect="1" noChangeArrowheads="1"/>
+          </p:cNvPicPr>
+          <p:nvPr/>
+        </p:nvPicPr>
+        <p:blipFill>
+          <a:blip r:embed="rId1"/>
+          <a:srcRect/>
+          <a:stretch>
+            <a:fillRect/>
+          </a:stretch>
+        </p:blipFill>
+        <p:spPr bwMode="auto">
+          <a:xfrm>
+            <a:off x="428597" y="1857364"/>
+            <a:ext cx="2500330" cy="4385714"/>
+          </a:xfrm>
+          <a:prstGeom prst="rect">
+            <a:avLst/>
+          </a:prstGeom>
+          <a:noFill/>
+          <a:ln w="9525">
+            <a:noFill/>
+            <a:miter lim="800000"/>
+            <a:headEnd/>
+            <a:tailEnd/>
+          </a:ln>
+          <a:effectLst/>
+        </p:spPr>
+      </p:pic>
+      <p:pic>
+        <p:nvPicPr>
+          <p:cNvPr id="37891" name="Picture 3"/>
           <p:cNvPicPr>
             <a:picLocks noChangeAspect="1" noChangeArrowheads="1"/>
           </p:cNvPicPr>
@@ -5011,8 +5039,8 @@
         </p:blipFill>
         <p:spPr bwMode="auto">
           <a:xfrm>
-            <a:off x="428597" y="1857364"/>
-            <a:ext cx="2500330" cy="4385714"/>
+            <a:off x="3214678" y="1857364"/>
+            <a:ext cx="2512255" cy="4357718"/>
           </a:xfrm>
           <a:prstGeom prst="rect">
             <a:avLst/>
@@ -5029,7 +5057,7 @@
       </p:pic>
       <p:pic>
         <p:nvPicPr>
-          <p:cNvPr id="37891" name="Picture 3"/>
+          <p:cNvPr id="37892" name="Picture 4"/>
           <p:cNvPicPr>
             <a:picLocks noChangeAspect="1" noChangeArrowheads="1"/>
           </p:cNvPicPr>
@@ -5044,8 +5072,8 @@
         </p:blipFill>
         <p:spPr bwMode="auto">
           <a:xfrm>
-            <a:off x="3214678" y="1857364"/>
-            <a:ext cx="2512255" cy="4357718"/>
+            <a:off x="6000760" y="1857364"/>
+            <a:ext cx="2484671" cy="4348174"/>
           </a:xfrm>
           <a:prstGeom prst="rect">
             <a:avLst/>
@@ -5060,42 +5088,9 @@
           <a:effectLst/>
         </p:spPr>
       </p:pic>
-      <p:pic>
-        <p:nvPicPr>
-          <p:cNvPr id="37892" name="Picture 4"/>
-          <p:cNvPicPr>
-            <a:picLocks noChangeAspect="1" noChangeArrowheads="1"/>
-          </p:cNvPicPr>
-          <p:nvPr/>
-        </p:nvPicPr>
-        <p:blipFill>
-          <a:blip r:embed="rId4"/>
-          <a:srcRect/>
-          <a:stretch>
-            <a:fillRect/>
-          </a:stretch>
-        </p:blipFill>
-        <p:spPr bwMode="auto">
-          <a:xfrm>
-            <a:off x="6000760" y="1857364"/>
-            <a:ext cx="2484671" cy="4348174"/>
-          </a:xfrm>
-          <a:prstGeom prst="rect">
-            <a:avLst/>
-          </a:prstGeom>
-          <a:noFill/>
-          <a:ln w="9525">
-            <a:noFill/>
-            <a:miter lim="800000"/>
-            <a:headEnd/>
-            <a:tailEnd/>
-          </a:ln>
-          <a:effectLst/>
-        </p:spPr>
-      </p:pic>
-      <p:sp>
-        <p:nvSpPr>
-          <p:cNvPr id="6" name="pole tekstowe 5"/>
+      <p:sp>
+        <p:nvSpPr>
+          <p:cNvPr id="6" name="Pole tekstowe 5"/>
           <p:cNvSpPr txBox="1"/>
           <p:nvPr/>
         </p:nvSpPr>
@@ -5150,55 +5145,102 @@
       </p:grpSpPr>
       <p:sp>
         <p:nvSpPr>
-          <p:cNvPr id="2" name="Tytuł 1"/>
-          <p:cNvSpPr>
-            <a:spLocks noGrp="1"/>
-          </p:cNvSpPr>
-          <p:nvPr>
-            <p:ph type="title"/>
-          </p:nvPr>
-        </p:nvSpPr>
-        <p:spPr/>
-        <p:txBody>
-          <a:bodyPr/>
+          <p:cNvPr id="3" name="Symbol zastępczy zawartości 2"/>
+          <p:cNvSpPr>
+            <a:spLocks noGrp="1"/>
+          </p:cNvSpPr>
+          <p:nvPr>
+            <p:ph sz="half" idx="1"/>
+          </p:nvPr>
+        </p:nvSpPr>
+        <p:spPr>
+          <a:xfrm>
+            <a:off x="428625" y="857250"/>
+            <a:ext cx="7758430" cy="3588385"/>
+          </a:xfrm>
+        </p:spPr>
+        <p:txBody>
+          <a:bodyPr>
+            <a:normAutofit/>
+          </a:bodyPr>
+          <a:lstStyle/>
+          <a:p>
+            <a:pPr marL="0" indent="0">
+              <a:buNone/>
+            </a:pPr>
+            <a:r>
+              <a:rPr lang="pl-PL" b="1" i="1" dirty="0" smtClean="0"/>
+              <a:t>Technologie </a:t>
+            </a:r>
+            <a:endParaRPr lang="pl-PL" b="1" i="1" dirty="0" smtClean="0"/>
+          </a:p>
+          <a:p>
+            <a:pPr marL="0" indent="0">
+              <a:buNone/>
+            </a:pPr>
+            <a:r>
+              <a:rPr lang="pl-PL" sz="1500" dirty="0"/>
+              <a:t>Do stworzenia serwera użyty został jeden z najpopularniejszych freameworków „Spring Boot”. Został wybrany ponieważ oferuje on szybkie i bezproblemowe  napisanie aplikacji, w krótkim czacie. Spowodowane jest to brakiem dodatkowych konfiguracji podczas instalacji oraz sporą ilością bibliotek oferowanych przez szkielet.</a:t>
+            </a:r>
+            <a:endParaRPr lang="pl-PL" sz="1500" dirty="0"/>
+          </a:p>
+          <a:p>
+            <a:pPr marL="0" indent="0">
+              <a:buNone/>
+            </a:pPr>
+            <a:r>
+              <a:rPr lang="pl-PL" sz="1500" dirty="0"/>
+              <a:t>Jedną z ważniejszych technologii zastosowanej podczas tworzenia systemu jest „Firebase”, czyli platforma mobilna. Dzięki niej możliwe było szybkie oraz bezproblemowe stworzenie systemu rejestracji oraz logowania. Firebase oferuje bardzo rozbudowane funkcjonalności oraz narzędzia przydatne podczas tworzenia aplikacji. </a:t>
+            </a:r>
+            <a:endParaRPr lang="pl-PL" sz="1500" dirty="0"/>
+          </a:p>
+          <a:p>
+            <a:pPr marL="0" indent="0">
+              <a:buNone/>
+            </a:pPr>
+            <a:r>
+              <a:rPr lang="pl-PL" sz="1500" dirty="0"/>
+              <a:t>Dane użytkowników przechowywane są w bazie danych utworzonej za pomocą </a:t>
+            </a:r>
+            <a:endParaRPr lang="pl-PL" sz="1500" dirty="0"/>
+          </a:p>
+          <a:p>
+            <a:pPr marL="0" indent="0">
+              <a:buNone/>
+            </a:pPr>
+            <a:r>
+              <a:rPr lang="pl-PL" sz="1500" dirty="0"/>
+              <a:t>„MongoDB”. Jest to nierelacyjna baza danych, w której dane przechowywane są jako dokumenty w kolekcjach.</a:t>
+            </a:r>
+            <a:endParaRPr lang="pl-PL" sz="1500" dirty="0"/>
+          </a:p>
+        </p:txBody>
+      </p:sp>
+      <p:sp>
+        <p:nvSpPr>
+          <p:cNvPr id="6" name="Pole tekstowe 5"/>
+          <p:cNvSpPr txBox="1"/>
+          <p:nvPr/>
+        </p:nvSpPr>
+        <p:spPr>
+          <a:xfrm>
+            <a:off x="8765370" y="6488668"/>
+            <a:ext cx="378630" cy="369332"/>
+          </a:xfrm>
+          <a:prstGeom prst="rect">
+            <a:avLst/>
+          </a:prstGeom>
+          <a:noFill/>
+        </p:spPr>
+        <p:txBody>
+          <a:bodyPr wrap="none" rtlCol="0">
+            <a:spAutoFit/>
+          </a:bodyPr>
           <a:lstStyle/>
           <a:p>
             <a:r>
               <a:rPr lang="pl-PL" dirty="0" smtClean="0"/>
-              <a:t>Podsumowanie</a:t>
-            </a:r>
-            <a:endParaRPr lang="pl-PL" dirty="0"/>
-          </a:p>
-        </p:txBody>
-      </p:sp>
-      <p:sp>
-        <p:nvSpPr>
-          <p:cNvPr id="3" name="Symbol zastępczy zawartości 2"/>
-          <p:cNvSpPr>
-            <a:spLocks noGrp="1"/>
-          </p:cNvSpPr>
-          <p:nvPr>
-            <p:ph sz="half" idx="1"/>
-          </p:nvPr>
-        </p:nvSpPr>
-        <p:spPr>
-          <a:xfrm>
-            <a:off x="457200" y="1920085"/>
-            <a:ext cx="8472518" cy="1437477"/>
-          </a:xfrm>
-        </p:spPr>
-        <p:txBody>
-          <a:bodyPr>
-            <a:normAutofit fontScale="92500" lnSpcReduction="10000"/>
-          </a:bodyPr>
-          <a:lstStyle/>
-          <a:p>
-            <a:pPr>
-              <a:buNone/>
-            </a:pPr>
-            <a:r>
-              <a:rPr lang="pl-PL" dirty="0" smtClean="0"/>
-              <a:t>Po zapoznaniu się z obecnie dostępnym aplikacjami oraz wymaganiami alergików, stworzona została aplikacja która oferuje rozwiązania niedostępne dotychczas. Wszystkie założenia zostały zrealizowane. </a:t>
+              <a:t>14</a:t>
             </a:r>
             <a:endParaRPr lang="pl-PL" dirty="0"/>
           </a:p>
@@ -5206,69 +5248,76 @@
       </p:sp>
       <p:pic>
         <p:nvPicPr>
-          <p:cNvPr id="1025" name="Picture 1"/>
+          <p:cNvPr id="2" name="Obraz 1"/>
           <p:cNvPicPr>
-            <a:picLocks noGrp="1" noChangeAspect="1" noChangeArrowheads="1"/>
+            <a:picLocks noChangeAspect="1"/>
           </p:cNvPicPr>
-          <p:nvPr>
-            <p:ph sz="half" idx="2"/>
-          </p:nvPr>
+          <p:nvPr/>
         </p:nvPicPr>
         <p:blipFill>
-          <a:blip r:embed="rId2"/>
-          <a:srcRect/>
+          <a:blip r:embed="rId1"/>
           <a:stretch>
             <a:fillRect/>
           </a:stretch>
         </p:blipFill>
-        <p:spPr bwMode="auto">
-          <a:xfrm>
-            <a:off x="1928794" y="3786190"/>
-            <a:ext cx="5173444" cy="2279665"/>
+        <p:spPr>
+          <a:xfrm>
+            <a:off x="755650" y="4221480"/>
+            <a:ext cx="2985135" cy="908050"/>
           </a:xfrm>
           <a:prstGeom prst="rect">
             <a:avLst/>
           </a:prstGeom>
-          <a:noFill/>
-          <a:ln w="9525">
-            <a:noFill/>
-            <a:miter lim="800000"/>
-            <a:headEnd/>
-            <a:tailEnd/>
-          </a:ln>
-          <a:effectLst/>
         </p:spPr>
       </p:pic>
-      <p:sp>
-        <p:nvSpPr>
-          <p:cNvPr id="7" name="pole tekstowe 6"/>
-          <p:cNvSpPr txBox="1"/>
+      <p:pic>
+        <p:nvPicPr>
+          <p:cNvPr id="5" name="Obraz 4"/>
+          <p:cNvPicPr>
+            <a:picLocks noChangeAspect="1"/>
+          </p:cNvPicPr>
           <p:nvPr/>
-        </p:nvSpPr>
+        </p:nvPicPr>
+        <p:blipFill>
+          <a:blip r:embed="rId2"/>
+          <a:stretch>
+            <a:fillRect/>
+          </a:stretch>
+        </p:blipFill>
         <p:spPr>
           <a:xfrm>
-            <a:off x="8781593" y="6488668"/>
-            <a:ext cx="362407" cy="369332"/>
+            <a:off x="5219700" y="4077335"/>
+            <a:ext cx="2882265" cy="1059815"/>
           </a:xfrm>
           <a:prstGeom prst="rect">
             <a:avLst/>
           </a:prstGeom>
-          <a:noFill/>
-        </p:spPr>
-        <p:txBody>
-          <a:bodyPr wrap="none" rtlCol="0">
-            <a:spAutoFit/>
-          </a:bodyPr>
-          <a:lstStyle/>
-          <a:p>
-            <a:r>
-              <a:rPr lang="pl-PL" dirty="0" smtClean="0"/>
-              <a:t>15</a:t>
-            </a:r>
-            <a:endParaRPr lang="pl-PL" dirty="0"/>
-          </a:p>
-        </p:txBody>
-      </p:sp>
+        </p:spPr>
+      </p:pic>
+      <p:pic>
+        <p:nvPicPr>
+          <p:cNvPr id="8" name="Obraz 7"/>
+          <p:cNvPicPr>
+            <a:picLocks noChangeAspect="1"/>
+          </p:cNvPicPr>
+          <p:nvPr/>
+        </p:nvPicPr>
+        <p:blipFill>
+          <a:blip r:embed="rId3"/>
+          <a:stretch>
+            <a:fillRect/>
+          </a:stretch>
+        </p:blipFill>
+        <p:spPr>
+          <a:xfrm>
+            <a:off x="2843530" y="5445125"/>
+            <a:ext cx="3043555" cy="949325"/>
+          </a:xfrm>
+          <a:prstGeom prst="rect">
+            <a:avLst/>
+          </a:prstGeom>
+        </p:spPr>
+      </p:pic>
     </p:spTree>
   </p:cSld>
   <p:clrMapOvr>
@@ -5296,27 +5345,160 @@
       </p:grpSpPr>
       <p:sp>
         <p:nvSpPr>
-          <p:cNvPr id="2" name="Tytuł 1"/>
-          <p:cNvSpPr>
-            <a:spLocks noGrp="1"/>
-          </p:cNvSpPr>
-          <p:nvPr>
-            <p:ph type="title"/>
-          </p:nvPr>
-        </p:nvSpPr>
-        <p:spPr/>
-        <p:txBody>
-          <a:bodyPr/>
+          <p:cNvPr id="3" name="Symbol zastępczy zawartości 2"/>
+          <p:cNvSpPr>
+            <a:spLocks noGrp="1"/>
+          </p:cNvSpPr>
+          <p:nvPr>
+            <p:ph sz="half" idx="1"/>
+          </p:nvPr>
+        </p:nvSpPr>
+        <p:spPr>
+          <a:xfrm>
+            <a:off x="539750" y="764385"/>
+            <a:ext cx="4038600" cy="4434840"/>
+          </a:xfrm>
+        </p:spPr>
+        <p:txBody>
+          <a:bodyPr>
+            <a:normAutofit/>
+          </a:bodyPr>
+          <a:lstStyle/>
+          <a:p>
+            <a:pPr marL="0" indent="0">
+              <a:buNone/>
+            </a:pPr>
+            <a:r>
+              <a:rPr lang="pl-PL" b="1" i="1" dirty="0" smtClean="0"/>
+              <a:t>Funkcjonalności </a:t>
+            </a:r>
+            <a:endParaRPr lang="pl-PL" b="1" i="1" dirty="0" smtClean="0"/>
+          </a:p>
+          <a:p>
+            <a:pPr marL="0" indent="0">
+              <a:buNone/>
+            </a:pPr>
+            <a:r>
+              <a:rPr lang="pl-PL" sz="1500" dirty="0"/>
+              <a:t>Rejestracja konta oraz logowanie</a:t>
+            </a:r>
+            <a:endParaRPr lang="pl-PL" sz="1500" dirty="0"/>
+          </a:p>
+        </p:txBody>
+      </p:sp>
+      <p:sp>
+        <p:nvSpPr>
+          <p:cNvPr id="6" name="Pole tekstowe 5"/>
+          <p:cNvSpPr txBox="1"/>
+          <p:nvPr/>
+        </p:nvSpPr>
+        <p:spPr>
+          <a:xfrm>
+            <a:off x="8765370" y="6488668"/>
+            <a:ext cx="378630" cy="369332"/>
+          </a:xfrm>
+          <a:prstGeom prst="rect">
+            <a:avLst/>
+          </a:prstGeom>
+          <a:noFill/>
+        </p:spPr>
+        <p:txBody>
+          <a:bodyPr wrap="none" rtlCol="0">
+            <a:spAutoFit/>
+          </a:bodyPr>
           <a:lstStyle/>
           <a:p>
             <a:r>
               <a:rPr lang="pl-PL" dirty="0" smtClean="0"/>
-              <a:t>Bibliografia</a:t>
+              <a:t>14</a:t>
             </a:r>
             <a:endParaRPr lang="pl-PL" dirty="0"/>
           </a:p>
         </p:txBody>
       </p:sp>
+      <p:pic>
+        <p:nvPicPr>
+          <p:cNvPr id="-2147482603" name="Obraz -2147482604"/>
+          <p:cNvPicPr>
+            <a:picLocks noChangeAspect="1"/>
+          </p:cNvPicPr>
+          <p:nvPr/>
+        </p:nvPicPr>
+        <p:blipFill>
+          <a:blip r:embed="rId1"/>
+          <a:stretch>
+            <a:fillRect/>
+          </a:stretch>
+        </p:blipFill>
+        <p:spPr>
+          <a:xfrm>
+            <a:off x="2339658" y="1917065"/>
+            <a:ext cx="4803775" cy="2228850"/>
+          </a:xfrm>
+          <a:prstGeom prst="rect">
+            <a:avLst/>
+          </a:prstGeom>
+          <a:noFill/>
+          <a:ln w="9525">
+            <a:noFill/>
+          </a:ln>
+        </p:spPr>
+      </p:pic>
+      <p:pic>
+        <p:nvPicPr>
+          <p:cNvPr id="-2147482602" name="Symbol zastępczy zawartości -2147482603"/>
+          <p:cNvPicPr>
+            <a:picLocks noChangeAspect="1"/>
+          </p:cNvPicPr>
+          <p:nvPr>
+            <p:ph sz="half" idx="2"/>
+          </p:nvPr>
+        </p:nvPicPr>
+        <p:blipFill>
+          <a:blip r:embed="rId2"/>
+          <a:stretch>
+            <a:fillRect/>
+          </a:stretch>
+        </p:blipFill>
+        <p:spPr>
+          <a:xfrm>
+            <a:off x="2339975" y="4581525"/>
+            <a:ext cx="4805680" cy="1789430"/>
+          </a:xfrm>
+          <a:prstGeom prst="rect">
+            <a:avLst/>
+          </a:prstGeom>
+          <a:noFill/>
+          <a:ln w="9525">
+            <a:noFill/>
+          </a:ln>
+        </p:spPr>
+      </p:pic>
+    </p:spTree>
+  </p:cSld>
+  <p:clrMapOvr>
+    <a:masterClrMapping/>
+  </p:clrMapOvr>
+</p:sld>
+</file>
+
+<file path=ppt/slides/slide17.xml><?xml version="1.0" encoding="utf-8"?>
+<p:sld xmlns:a="http://schemas.openxmlformats.org/drawingml/2006/main" xmlns:r="http://schemas.openxmlformats.org/officeDocument/2006/relationships" xmlns:p="http://schemas.openxmlformats.org/presentationml/2006/main">
+  <p:cSld>
+    <p:spTree>
+      <p:nvGrpSpPr>
+        <p:cNvPr id="1" name=""/>
+        <p:cNvGrpSpPr/>
+        <p:nvPr/>
+      </p:nvGrpSpPr>
+      <p:grpSpPr>
+        <a:xfrm>
+          <a:off x="0" y="0"/>
+          <a:ext cx="0" cy="0"/>
+          <a:chOff x="0" y="0"/>
+          <a:chExt cx="0" cy="0"/>
+        </a:xfrm>
+      </p:grpSpPr>
       <p:sp>
         <p:nvSpPr>
           <p:cNvPr id="3" name="Symbol zastępczy zawartości 2"/>
@@ -5329,221 +5511,353 @@
         </p:nvSpPr>
         <p:spPr>
           <a:xfrm>
-            <a:off x="457200" y="1920085"/>
-            <a:ext cx="8543956" cy="4434840"/>
+            <a:off x="539750" y="764385"/>
+            <a:ext cx="4038600" cy="4434840"/>
           </a:xfrm>
         </p:spPr>
         <p:txBody>
           <a:bodyPr>
-            <a:normAutofit fontScale="92500" lnSpcReduction="20000"/>
+            <a:normAutofit/>
           </a:bodyPr>
           <a:lstStyle/>
           <a:p>
-            <a:pPr>
+            <a:pPr marL="0" indent="0">
               <a:buNone/>
             </a:pPr>
             <a:r>
+              <a:rPr lang="pl-PL" b="1" i="1" dirty="0" smtClean="0"/>
+              <a:t>Funkcjonalności </a:t>
+            </a:r>
+            <a:endParaRPr lang="pl-PL" b="1" i="1" dirty="0" smtClean="0"/>
+          </a:p>
+          <a:p>
+            <a:pPr marL="0" indent="0">
+              <a:buNone/>
+            </a:pPr>
+            <a:r>
+              <a:rPr lang="pl-PL" sz="1500" dirty="0"/>
+              <a:t>Dodawanie oraz usuwanie pozycji </a:t>
+            </a:r>
+            <a:endParaRPr lang="pl-PL" sz="1500" dirty="0"/>
+          </a:p>
+        </p:txBody>
+      </p:sp>
+      <p:sp>
+        <p:nvSpPr>
+          <p:cNvPr id="6" name="Pole tekstowe 5"/>
+          <p:cNvSpPr txBox="1"/>
+          <p:nvPr/>
+        </p:nvSpPr>
+        <p:spPr>
+          <a:xfrm>
+            <a:off x="8765370" y="6488668"/>
+            <a:ext cx="378630" cy="369332"/>
+          </a:xfrm>
+          <a:prstGeom prst="rect">
+            <a:avLst/>
+          </a:prstGeom>
+          <a:noFill/>
+        </p:spPr>
+        <p:txBody>
+          <a:bodyPr wrap="none" rtlCol="0">
+            <a:spAutoFit/>
+          </a:bodyPr>
+          <a:lstStyle/>
+          <a:p>
+            <a:r>
               <a:rPr lang="pl-PL" dirty="0" smtClean="0"/>
-              <a:t>1.  </a:t>
-            </a:r>
-            <a:r>
-              <a:rPr lang="pl-PL" dirty="0" err="1" smtClean="0"/>
-              <a:t>Statista</a:t>
-            </a:r>
+              <a:t>14</a:t>
+            </a:r>
+            <a:endParaRPr lang="pl-PL" dirty="0"/>
+          </a:p>
+        </p:txBody>
+      </p:sp>
+      <p:pic>
+        <p:nvPicPr>
+          <p:cNvPr id="-2147482607" name="Symbol zastępczy zawartości -2147482608"/>
+          <p:cNvPicPr>
+            <a:picLocks noChangeAspect="1"/>
+          </p:cNvPicPr>
+          <p:nvPr>
+            <p:ph sz="half" idx="2"/>
+          </p:nvPr>
+        </p:nvPicPr>
+        <p:blipFill>
+          <a:blip r:embed="rId1"/>
+          <a:stretch>
+            <a:fillRect/>
+          </a:stretch>
+        </p:blipFill>
+        <p:spPr>
+          <a:xfrm>
+            <a:off x="1187450" y="1557020"/>
+            <a:ext cx="6414135" cy="4719320"/>
+          </a:xfrm>
+          <a:prstGeom prst="rect">
+            <a:avLst/>
+          </a:prstGeom>
+          <a:noFill/>
+          <a:ln w="9525">
+            <a:noFill/>
+          </a:ln>
+        </p:spPr>
+      </p:pic>
+    </p:spTree>
+  </p:cSld>
+  <p:clrMapOvr>
+    <a:masterClrMapping/>
+  </p:clrMapOvr>
+</p:sld>
+</file>
+
+<file path=ppt/slides/slide18.xml><?xml version="1.0" encoding="utf-8"?>
+<p:sld xmlns:a="http://schemas.openxmlformats.org/drawingml/2006/main" xmlns:r="http://schemas.openxmlformats.org/officeDocument/2006/relationships" xmlns:p="http://schemas.openxmlformats.org/presentationml/2006/main">
+  <p:cSld>
+    <p:spTree>
+      <p:nvGrpSpPr>
+        <p:cNvPr id="1" name=""/>
+        <p:cNvGrpSpPr/>
+        <p:nvPr/>
+      </p:nvGrpSpPr>
+      <p:grpSpPr>
+        <a:xfrm>
+          <a:off x="0" y="0"/>
+          <a:ext cx="0" cy="0"/>
+          <a:chOff x="0" y="0"/>
+          <a:chExt cx="0" cy="0"/>
+        </a:xfrm>
+      </p:grpSpPr>
+      <p:sp>
+        <p:nvSpPr>
+          <p:cNvPr id="3" name="Symbol zastępczy zawartości 2"/>
+          <p:cNvSpPr>
+            <a:spLocks noGrp="1"/>
+          </p:cNvSpPr>
+          <p:nvPr>
+            <p:ph sz="half" idx="1"/>
+          </p:nvPr>
+        </p:nvSpPr>
+        <p:spPr>
+          <a:xfrm>
+            <a:off x="539750" y="764385"/>
+            <a:ext cx="4038600" cy="4434840"/>
+          </a:xfrm>
+        </p:spPr>
+        <p:txBody>
+          <a:bodyPr>
+            <a:normAutofit/>
+          </a:bodyPr>
+          <a:lstStyle/>
+          <a:p>
+            <a:pPr marL="0" indent="0">
+              <a:buNone/>
+            </a:pPr>
+            <a:r>
+              <a:rPr lang="pl-PL" b="1" i="1" dirty="0" smtClean="0"/>
+              <a:t>Funkcjonalności </a:t>
+            </a:r>
+            <a:endParaRPr lang="pl-PL" b="1" i="1" dirty="0" smtClean="0"/>
+          </a:p>
+          <a:p>
+            <a:pPr marL="0" indent="0">
+              <a:buNone/>
+            </a:pPr>
+            <a:r>
+              <a:rPr lang="pl-PL" sz="1500" dirty="0"/>
+              <a:t>Dodawanie oraz usuwanie pozycji z listy alregii</a:t>
+            </a:r>
+            <a:endParaRPr lang="pl-PL" sz="1500" dirty="0"/>
+          </a:p>
+        </p:txBody>
+      </p:sp>
+      <p:sp>
+        <p:nvSpPr>
+          <p:cNvPr id="6" name="Pole tekstowe 5"/>
+          <p:cNvSpPr txBox="1"/>
+          <p:nvPr/>
+        </p:nvSpPr>
+        <p:spPr>
+          <a:xfrm>
+            <a:off x="8765370" y="6488668"/>
+            <a:ext cx="378630" cy="369332"/>
+          </a:xfrm>
+          <a:prstGeom prst="rect">
+            <a:avLst/>
+          </a:prstGeom>
+          <a:noFill/>
+        </p:spPr>
+        <p:txBody>
+          <a:bodyPr wrap="none" rtlCol="0">
+            <a:spAutoFit/>
+          </a:bodyPr>
+          <a:lstStyle/>
+          <a:p>
             <a:r>
               <a:rPr lang="pl-PL" dirty="0" smtClean="0"/>
-              <a:t> [dostęp: 12 grudnia 2022]</a:t>
-            </a:r>
-          </a:p>
-          <a:p>
-            <a:pPr>
+              <a:t>14</a:t>
+            </a:r>
+            <a:endParaRPr lang="pl-PL" dirty="0"/>
+          </a:p>
+        </p:txBody>
+      </p:sp>
+      <p:pic>
+        <p:nvPicPr>
+          <p:cNvPr id="-2147482605" name="Symbol zastępczy zawartości -2147482606"/>
+          <p:cNvPicPr>
+            <a:picLocks noChangeAspect="1"/>
+          </p:cNvPicPr>
+          <p:nvPr>
+            <p:ph sz="half" idx="2"/>
+          </p:nvPr>
+        </p:nvPicPr>
+        <p:blipFill>
+          <a:blip r:embed="rId1"/>
+          <a:stretch>
+            <a:fillRect/>
+          </a:stretch>
+        </p:blipFill>
+        <p:spPr>
+          <a:xfrm>
+            <a:off x="1812925" y="1632585"/>
+            <a:ext cx="5591175" cy="5043805"/>
+          </a:xfrm>
+          <a:prstGeom prst="rect">
+            <a:avLst/>
+          </a:prstGeom>
+          <a:noFill/>
+          <a:ln w="9525">
+            <a:noFill/>
+          </a:ln>
+        </p:spPr>
+      </p:pic>
+    </p:spTree>
+  </p:cSld>
+  <p:clrMapOvr>
+    <a:masterClrMapping/>
+  </p:clrMapOvr>
+</p:sld>
+</file>
+
+<file path=ppt/slides/slide19.xml><?xml version="1.0" encoding="utf-8"?>
+<p:sld xmlns:a="http://schemas.openxmlformats.org/drawingml/2006/main" xmlns:r="http://schemas.openxmlformats.org/officeDocument/2006/relationships" xmlns:p="http://schemas.openxmlformats.org/presentationml/2006/main">
+  <p:cSld>
+    <p:spTree>
+      <p:nvGrpSpPr>
+        <p:cNvPr id="1" name=""/>
+        <p:cNvGrpSpPr/>
+        <p:nvPr/>
+      </p:nvGrpSpPr>
+      <p:grpSpPr>
+        <a:xfrm>
+          <a:off x="0" y="0"/>
+          <a:ext cx="0" cy="0"/>
+          <a:chOff x="0" y="0"/>
+          <a:chExt cx="0" cy="0"/>
+        </a:xfrm>
+      </p:grpSpPr>
+      <p:sp>
+        <p:nvSpPr>
+          <p:cNvPr id="3" name="Symbol zastępczy zawartości 2"/>
+          <p:cNvSpPr>
+            <a:spLocks noGrp="1"/>
+          </p:cNvSpPr>
+          <p:nvPr>
+            <p:ph sz="half" idx="1"/>
+          </p:nvPr>
+        </p:nvSpPr>
+        <p:spPr>
+          <a:xfrm>
+            <a:off x="539750" y="764385"/>
+            <a:ext cx="4038600" cy="4434840"/>
+          </a:xfrm>
+        </p:spPr>
+        <p:txBody>
+          <a:bodyPr>
+            <a:normAutofit/>
+          </a:bodyPr>
+          <a:lstStyle/>
+          <a:p>
+            <a:pPr marL="0" indent="0">
               <a:buNone/>
             </a:pPr>
             <a:r>
-              <a:rPr lang="pl-PL" u="sng" dirty="0" smtClean="0">
-                <a:hlinkClick r:id="rId2"/>
-              </a:rPr>
-              <a:t>https://</a:t>
-            </a:r>
-            <a:r>
-              <a:rPr lang="pl-PL" u="sng" dirty="0" smtClean="0">
-                <a:hlinkClick r:id="rId2"/>
-              </a:rPr>
-              <a:t>www.statista.com/statistics/330695/number-of-smartphone-users-worldwide</a:t>
-            </a:r>
-            <a:r>
-              <a:rPr lang="pl-PL" u="sng" dirty="0" smtClean="0">
-                <a:hlinkClick r:id="rId2"/>
-              </a:rPr>
-              <a:t>/</a:t>
-            </a:r>
-            <a:endParaRPr lang="pl-PL" dirty="0" smtClean="0"/>
-          </a:p>
-          <a:p>
-            <a:pPr>
+              <a:rPr lang="pl-PL" b="1" i="1" dirty="0" smtClean="0"/>
+              <a:t>Funkcjonalności </a:t>
+            </a:r>
+            <a:endParaRPr lang="pl-PL" b="1" i="1" dirty="0" smtClean="0"/>
+          </a:p>
+          <a:p>
+            <a:pPr marL="0" indent="0">
               <a:buNone/>
             </a:pPr>
             <a:r>
+              <a:rPr lang="pl-PL" sz="1500" dirty="0"/>
+              <a:t>Tworzenie planu dnia</a:t>
+            </a:r>
+            <a:endParaRPr lang="pl-PL" sz="1500" dirty="0"/>
+          </a:p>
+        </p:txBody>
+      </p:sp>
+      <p:sp>
+        <p:nvSpPr>
+          <p:cNvPr id="6" name="Pole tekstowe 5"/>
+          <p:cNvSpPr txBox="1"/>
+          <p:nvPr/>
+        </p:nvSpPr>
+        <p:spPr>
+          <a:xfrm>
+            <a:off x="8765370" y="6488668"/>
+            <a:ext cx="378630" cy="369332"/>
+          </a:xfrm>
+          <a:prstGeom prst="rect">
+            <a:avLst/>
+          </a:prstGeom>
+          <a:noFill/>
+        </p:spPr>
+        <p:txBody>
+          <a:bodyPr wrap="none" rtlCol="0">
+            <a:spAutoFit/>
+          </a:bodyPr>
+          <a:lstStyle/>
+          <a:p>
+            <a:r>
               <a:rPr lang="pl-PL" dirty="0" smtClean="0"/>
-              <a:t>2.  </a:t>
-            </a:r>
-            <a:r>
-              <a:rPr lang="pl-PL" dirty="0" err="1" smtClean="0"/>
-              <a:t>Statista</a:t>
-            </a:r>
-            <a:r>
-              <a:rPr lang="pl-PL" dirty="0" smtClean="0"/>
-              <a:t> [dostęp: 12 grudnia 2022]</a:t>
-            </a:r>
-          </a:p>
-          <a:p>
-            <a:pPr>
-              <a:buNone/>
-            </a:pPr>
-            <a:r>
-              <a:rPr lang="pl-PL" dirty="0" smtClean="0">
-                <a:hlinkClick r:id="rId3"/>
-              </a:rPr>
-              <a:t>https</a:t>
-            </a:r>
-            <a:r>
-              <a:rPr lang="pl-PL" dirty="0" smtClean="0">
-                <a:hlinkClick r:id="rId3"/>
-              </a:rPr>
-              <a:t>://</a:t>
-            </a:r>
-            <a:r>
-              <a:rPr lang="pl-PL" dirty="0" smtClean="0">
-                <a:hlinkClick r:id="rId3"/>
-              </a:rPr>
-              <a:t>www.statista.com/statistics/734332/google-play-app-installs-per-year/</a:t>
-            </a:r>
-            <a:endParaRPr lang="pl-PL" dirty="0" smtClean="0"/>
-          </a:p>
-          <a:p>
-            <a:pPr>
-              <a:buNone/>
-            </a:pPr>
-            <a:r>
-              <a:rPr lang="pl-PL" u="sng" dirty="0" smtClean="0"/>
-              <a:t>3. </a:t>
-            </a:r>
-            <a:r>
-              <a:rPr lang="pl-PL" dirty="0" err="1" smtClean="0"/>
-              <a:t>Muntenescu</a:t>
-            </a:r>
-            <a:r>
-              <a:rPr lang="pl-PL" dirty="0" smtClean="0"/>
-              <a:t> </a:t>
-            </a:r>
-            <a:r>
-              <a:rPr lang="pl-PL" dirty="0" err="1" smtClean="0"/>
-              <a:t>Florina</a:t>
-            </a:r>
-            <a:r>
-              <a:rPr lang="pl-PL" dirty="0" smtClean="0"/>
-              <a:t>, </a:t>
-            </a:r>
-            <a:r>
-              <a:rPr lang="pl-PL" i="1" dirty="0" smtClean="0"/>
-              <a:t>Android </a:t>
-            </a:r>
-            <a:r>
-              <a:rPr lang="pl-PL" i="1" dirty="0" err="1" smtClean="0"/>
-              <a:t>Architecture</a:t>
-            </a:r>
-            <a:r>
-              <a:rPr lang="pl-PL" i="1" dirty="0" smtClean="0"/>
-              <a:t> </a:t>
-            </a:r>
-            <a:r>
-              <a:rPr lang="pl-PL" i="1" dirty="0" err="1" smtClean="0"/>
-              <a:t>Patterns</a:t>
-            </a:r>
-            <a:r>
-              <a:rPr lang="pl-PL" i="1" dirty="0" smtClean="0"/>
-              <a:t> Part 2: </a:t>
-            </a:r>
-            <a:r>
-              <a:rPr lang="pl-PL" i="1" dirty="0" err="1" smtClean="0"/>
-              <a:t>Model-View-Presenter</a:t>
-            </a:r>
-            <a:r>
-              <a:rPr lang="pl-PL" i="1" dirty="0" smtClean="0"/>
-              <a:t> </a:t>
-            </a:r>
-            <a:r>
-              <a:rPr lang="pl-PL" dirty="0" smtClean="0"/>
-              <a:t>[</a:t>
-            </a:r>
-            <a:r>
-              <a:rPr lang="pl-PL" dirty="0" smtClean="0"/>
-              <a:t>dostęp </a:t>
-            </a:r>
-            <a:r>
-              <a:rPr lang="pl-PL" dirty="0" smtClean="0"/>
-              <a:t>12 </a:t>
-            </a:r>
-            <a:r>
-              <a:rPr lang="pl-PL" dirty="0" smtClean="0"/>
-              <a:t>grudnia </a:t>
-            </a:r>
-            <a:r>
-              <a:rPr lang="pl-PL" dirty="0" smtClean="0"/>
-              <a:t>2022] </a:t>
-            </a:r>
-            <a:endParaRPr lang="pl-PL" dirty="0" smtClean="0"/>
-          </a:p>
-          <a:p>
-            <a:pPr>
-              <a:buNone/>
-            </a:pPr>
-            <a:r>
-              <a:rPr lang="pl-PL" dirty="0" smtClean="0"/>
-              <a:t>https://</a:t>
-            </a:r>
-            <a:r>
-              <a:rPr lang="pl-PL" dirty="0" smtClean="0"/>
-              <a:t>medium.com/upday-devs/android-architecture-p</a:t>
-            </a:r>
-          </a:p>
-          <a:p>
-            <a:pPr>
-              <a:buNone/>
-            </a:pPr>
-            <a:r>
-              <a:rPr lang="pl-PL" dirty="0" smtClean="0"/>
-              <a:t>atterns-part-2-model-viewpresenter-8a6faaae14a5</a:t>
-            </a:r>
-          </a:p>
-          <a:p>
-            <a:pPr>
-              <a:buNone/>
-            </a:pPr>
-            <a:r>
-              <a:rPr lang="pl-PL" dirty="0" smtClean="0"/>
-              <a:t>4.</a:t>
-            </a:r>
-            <a:r>
-              <a:rPr lang="pl-PL" dirty="0" smtClean="0"/>
-              <a:t> Griffiths, Down, </a:t>
-            </a:r>
-            <a:r>
-              <a:rPr lang="pl-PL" i="1" dirty="0" smtClean="0"/>
-              <a:t>Android: programowanie aplikacji</a:t>
-            </a:r>
-            <a:r>
-              <a:rPr lang="pl-PL" dirty="0" smtClean="0"/>
-              <a:t>, Gliwice, Helion, 2016, </a:t>
-            </a:r>
-            <a:r>
-              <a:rPr lang="pl-PL" dirty="0" smtClean="0"/>
-              <a:t>ISBN978-83-283-2063-5 </a:t>
+              <a:t>14</a:t>
             </a:r>
             <a:endParaRPr lang="pl-PL" dirty="0"/>
           </a:p>
         </p:txBody>
       </p:sp>
+      <p:pic>
+        <p:nvPicPr>
+          <p:cNvPr id="-2147482606" name="Symbol zastępczy zawartości -2147482607"/>
+          <p:cNvPicPr>
+            <a:picLocks noChangeAspect="1"/>
+          </p:cNvPicPr>
+          <p:nvPr>
+            <p:ph sz="half" idx="2"/>
+          </p:nvPr>
+        </p:nvPicPr>
+        <p:blipFill>
+          <a:blip r:embed="rId1"/>
+          <a:stretch>
+            <a:fillRect/>
+          </a:stretch>
+        </p:blipFill>
+        <p:spPr>
+          <a:xfrm>
+            <a:off x="1619885" y="1570990"/>
+            <a:ext cx="5852160" cy="4917440"/>
+          </a:xfrm>
+          <a:prstGeom prst="rect">
+            <a:avLst/>
+          </a:prstGeom>
+          <a:noFill/>
+          <a:ln w="9525">
+            <a:noFill/>
+          </a:ln>
+        </p:spPr>
+      </p:pic>
     </p:spTree>
   </p:cSld>
   <p:clrMapOvr>
@@ -5599,14 +5913,6 @@
               </a:rPr>
               <a:t>SPIS  TREŚCI</a:t>
             </a:r>
-            <a:r>
-              <a:rPr lang="pl-PL" sz="3200" b="1" dirty="0" smtClean="0">
-                <a:solidFill>
-                  <a:schemeClr val="tx1"/>
-                </a:solidFill>
-              </a:rPr>
-              <a:t/>
-            </a:r>
             <a:br>
               <a:rPr lang="pl-PL" sz="3200" b="1" dirty="0" smtClean="0">
                 <a:solidFill>
@@ -5651,6 +5957,7 @@
               <a:rPr lang="pl-PL" dirty="0" smtClean="0"/>
               <a:t> </a:t>
             </a:r>
+            <a:endParaRPr lang="pl-PL" dirty="0" smtClean="0"/>
           </a:p>
           <a:p>
             <a:pPr>
@@ -5660,6 +5967,7 @@
               <a:rPr lang="pl-PL" b="1" dirty="0" smtClean="0"/>
               <a:t>1. WSTĘP								11</a:t>
             </a:r>
+            <a:endParaRPr lang="pl-PL" b="1" dirty="0" smtClean="0"/>
           </a:p>
           <a:p>
             <a:pPr>
@@ -5685,6 +5993,7 @@
               <a:rPr lang="pl-PL" dirty="0" smtClean="0"/>
               <a:t>11</a:t>
             </a:r>
+            <a:endParaRPr lang="pl-PL" dirty="0" smtClean="0"/>
           </a:p>
           <a:p>
             <a:pPr>
@@ -5756,6 +6065,7 @@
               <a:rPr lang="pl-PL" dirty="0" smtClean="0"/>
               <a:t>14</a:t>
             </a:r>
+            <a:endParaRPr lang="pl-PL" dirty="0" smtClean="0"/>
           </a:p>
           <a:p>
             <a:pPr>
@@ -5785,6 +6095,7 @@
               <a:rPr lang="pl-PL" b="1" dirty="0" smtClean="0"/>
               <a:t>3. PROJEKT SYSTEMU							19</a:t>
             </a:r>
+            <a:endParaRPr lang="pl-PL" b="1" dirty="0" smtClean="0"/>
           </a:p>
           <a:p>
             <a:pPr>
@@ -5810,6 +6121,7 @@
               <a:rPr lang="pl-PL" dirty="0" smtClean="0"/>
               <a:t>19</a:t>
             </a:r>
+            <a:endParaRPr lang="pl-PL" dirty="0" smtClean="0"/>
           </a:p>
           <a:p>
             <a:pPr>
@@ -5827,7 +6139,17 @@
             </a:pPr>
             <a:r>
               <a:rPr lang="pl-PL" dirty="0" smtClean="0"/>
-              <a:t>	3.3.  Baza danych 							21</a:t>
+              <a:t>	3.3.  Baza danych 							20</a:t>
+            </a:r>
+            <a:endParaRPr lang="pl-PL" dirty="0" smtClean="0"/>
+          </a:p>
+          <a:p>
+            <a:pPr>
+              <a:buNone/>
+            </a:pPr>
+            <a:r>
+              <a:rPr lang="pl-PL" dirty="0" smtClean="0"/>
+              <a:t>	3.4   Funkcjonalności systemu						21</a:t>
             </a:r>
             <a:endParaRPr lang="pl-PL" b="1" dirty="0" smtClean="0"/>
           </a:p>
@@ -5847,6 +6169,7 @@
               <a:rPr lang="pl-PL" b="1" dirty="0" smtClean="0"/>
               <a:t>	23</a:t>
             </a:r>
+            <a:endParaRPr lang="pl-PL" b="1" dirty="0" smtClean="0"/>
           </a:p>
           <a:p>
             <a:pPr>
@@ -5872,6 +6195,7 @@
               <a:rPr lang="pl-PL" dirty="0" smtClean="0"/>
               <a:t>23</a:t>
             </a:r>
+            <a:endParaRPr lang="pl-PL" dirty="0" smtClean="0"/>
           </a:p>
           <a:p>
             <a:pPr>
@@ -5891,15 +6215,19 @@
               <a:rPr lang="pl-PL" dirty="0" smtClean="0"/>
               <a:t>	4.3.  Implementacja Graficznego Interfejsu Użytkownika 			26</a:t>
             </a:r>
-            <a:endParaRPr lang="pl-PL" b="1" dirty="0" smtClean="0"/>
+            <a:endParaRPr lang="pl-PL" dirty="0" smtClean="0"/>
           </a:p>
           <a:p>
             <a:pPr>
               <a:buNone/>
             </a:pPr>
             <a:r>
+              <a:rPr lang="pl-PL" sz="2900" b="1" dirty="0" smtClean="0"/>
+              <a:t>5.Testy		</a:t>
+            </a:r>
+            <a:r>
               <a:rPr lang="pl-PL" dirty="0" smtClean="0"/>
-              <a:t>	4.4.  Testowanie 							28</a:t>
+              <a:t>						28</a:t>
             </a:r>
             <a:endParaRPr lang="pl-PL" b="1" dirty="0" smtClean="0"/>
           </a:p>
@@ -5919,6 +6247,7 @@
               <a:rPr lang="pl-PL" b="1" dirty="0" smtClean="0"/>
               <a:t>	30</a:t>
             </a:r>
+            <a:endParaRPr lang="pl-PL" b="1" dirty="0" smtClean="0"/>
           </a:p>
           <a:p>
             <a:pPr>
@@ -5936,6 +6265,423 @@
               <a:rPr lang="pl-PL" b="1" dirty="0" smtClean="0"/>
               <a:t>32</a:t>
             </a:r>
+            <a:endParaRPr lang="pl-PL" b="1" dirty="0" smtClean="0"/>
+          </a:p>
+        </p:txBody>
+      </p:sp>
+    </p:spTree>
+  </p:cSld>
+  <p:clrMapOvr>
+    <a:masterClrMapping/>
+  </p:clrMapOvr>
+</p:sld>
+</file>
+
+<file path=ppt/slides/slide20.xml><?xml version="1.0" encoding="utf-8"?>
+<p:sld xmlns:a="http://schemas.openxmlformats.org/drawingml/2006/main" xmlns:r="http://schemas.openxmlformats.org/officeDocument/2006/relationships" xmlns:p="http://schemas.openxmlformats.org/presentationml/2006/main">
+  <p:cSld>
+    <p:spTree>
+      <p:nvGrpSpPr>
+        <p:cNvPr id="1" name=""/>
+        <p:cNvGrpSpPr/>
+        <p:nvPr/>
+      </p:nvGrpSpPr>
+      <p:grpSpPr>
+        <a:xfrm>
+          <a:off x="0" y="0"/>
+          <a:ext cx="0" cy="0"/>
+          <a:chOff x="0" y="0"/>
+          <a:chExt cx="0" cy="0"/>
+        </a:xfrm>
+      </p:grpSpPr>
+      <p:sp>
+        <p:nvSpPr>
+          <p:cNvPr id="2" name="Tytuł 1"/>
+          <p:cNvSpPr>
+            <a:spLocks noGrp="1"/>
+          </p:cNvSpPr>
+          <p:nvPr>
+            <p:ph type="title"/>
+          </p:nvPr>
+        </p:nvSpPr>
+        <p:spPr/>
+        <p:txBody>
+          <a:bodyPr/>
+          <a:lstStyle/>
+          <a:p>
+            <a:r>
+              <a:rPr lang="pl-PL" dirty="0" smtClean="0"/>
+              <a:t>Podsumowanie</a:t>
+            </a:r>
+            <a:endParaRPr lang="pl-PL" dirty="0"/>
+          </a:p>
+        </p:txBody>
+      </p:sp>
+      <p:sp>
+        <p:nvSpPr>
+          <p:cNvPr id="3" name="Symbol zastępczy zawartości 2"/>
+          <p:cNvSpPr>
+            <a:spLocks noGrp="1"/>
+          </p:cNvSpPr>
+          <p:nvPr>
+            <p:ph sz="half" idx="1"/>
+          </p:nvPr>
+        </p:nvSpPr>
+        <p:spPr>
+          <a:xfrm>
+            <a:off x="457200" y="1920085"/>
+            <a:ext cx="8472518" cy="1437477"/>
+          </a:xfrm>
+        </p:spPr>
+        <p:txBody>
+          <a:bodyPr>
+            <a:noAutofit/>
+          </a:bodyPr>
+          <a:lstStyle/>
+          <a:p>
+            <a:pPr>
+              <a:buNone/>
+            </a:pPr>
+            <a:r>
+              <a:rPr lang="pl-PL" sz="1800" dirty="0" smtClean="0"/>
+              <a:t>Po zapoznaniu się z obecnie dostępnym aplikacjami oraz wymaganiami alergików, stworzona została aplikacja która oferuje rozwiązania niedostępne dotychczas. Wszystkie założenia zostały zrealizowane. </a:t>
+            </a:r>
+            <a:endParaRPr lang="pl-PL" sz="1800" dirty="0" smtClean="0"/>
+          </a:p>
+        </p:txBody>
+      </p:sp>
+      <p:sp>
+        <p:nvSpPr>
+          <p:cNvPr id="7" name="Pole tekstowe 6"/>
+          <p:cNvSpPr txBox="1"/>
+          <p:nvPr/>
+        </p:nvSpPr>
+        <p:spPr>
+          <a:xfrm>
+            <a:off x="8781593" y="6488668"/>
+            <a:ext cx="362407" cy="369332"/>
+          </a:xfrm>
+          <a:prstGeom prst="rect">
+            <a:avLst/>
+          </a:prstGeom>
+          <a:noFill/>
+        </p:spPr>
+        <p:txBody>
+          <a:bodyPr wrap="none" rtlCol="0">
+            <a:spAutoFit/>
+          </a:bodyPr>
+          <a:lstStyle/>
+          <a:p>
+            <a:r>
+              <a:rPr lang="pl-PL" dirty="0" smtClean="0"/>
+              <a:t>15</a:t>
+            </a:r>
+            <a:endParaRPr lang="pl-PL" dirty="0"/>
+          </a:p>
+        </p:txBody>
+      </p:sp>
+      <p:pic>
+        <p:nvPicPr>
+          <p:cNvPr id="5" name="Symbol zastępczy zawartości 4"/>
+          <p:cNvPicPr>
+            <a:picLocks noChangeAspect="1"/>
+          </p:cNvPicPr>
+          <p:nvPr>
+            <p:ph sz="half" idx="2"/>
+          </p:nvPr>
+        </p:nvPicPr>
+        <p:blipFill>
+          <a:blip r:embed="rId1"/>
+          <a:stretch>
+            <a:fillRect/>
+          </a:stretch>
+        </p:blipFill>
+        <p:spPr>
+          <a:xfrm>
+            <a:off x="2123440" y="2924810"/>
+            <a:ext cx="4692015" cy="3700145"/>
+          </a:xfrm>
+          <a:prstGeom prst="rect">
+            <a:avLst/>
+          </a:prstGeom>
+        </p:spPr>
+      </p:pic>
+    </p:spTree>
+  </p:cSld>
+  <p:clrMapOvr>
+    <a:masterClrMapping/>
+  </p:clrMapOvr>
+</p:sld>
+</file>
+
+<file path=ppt/slides/slide21.xml><?xml version="1.0" encoding="utf-8"?>
+<p:sld xmlns:a="http://schemas.openxmlformats.org/drawingml/2006/main" xmlns:r="http://schemas.openxmlformats.org/officeDocument/2006/relationships" xmlns:p="http://schemas.openxmlformats.org/presentationml/2006/main">
+  <p:cSld>
+    <p:spTree>
+      <p:nvGrpSpPr>
+        <p:cNvPr id="1" name=""/>
+        <p:cNvGrpSpPr/>
+        <p:nvPr/>
+      </p:nvGrpSpPr>
+      <p:grpSpPr>
+        <a:xfrm>
+          <a:off x="0" y="0"/>
+          <a:ext cx="0" cy="0"/>
+          <a:chOff x="0" y="0"/>
+          <a:chExt cx="0" cy="0"/>
+        </a:xfrm>
+      </p:grpSpPr>
+      <p:sp>
+        <p:nvSpPr>
+          <p:cNvPr id="2" name="Tytuł 1"/>
+          <p:cNvSpPr>
+            <a:spLocks noGrp="1"/>
+          </p:cNvSpPr>
+          <p:nvPr>
+            <p:ph type="title"/>
+          </p:nvPr>
+        </p:nvSpPr>
+        <p:spPr/>
+        <p:txBody>
+          <a:bodyPr/>
+          <a:lstStyle/>
+          <a:p>
+            <a:r>
+              <a:rPr lang="pl-PL" dirty="0" smtClean="0"/>
+              <a:t>Bibliografia</a:t>
+            </a:r>
+            <a:endParaRPr lang="pl-PL" dirty="0"/>
+          </a:p>
+        </p:txBody>
+      </p:sp>
+      <p:sp>
+        <p:nvSpPr>
+          <p:cNvPr id="3" name="Symbol zastępczy zawartości 2"/>
+          <p:cNvSpPr>
+            <a:spLocks noGrp="1"/>
+          </p:cNvSpPr>
+          <p:nvPr>
+            <p:ph sz="half" idx="1"/>
+          </p:nvPr>
+        </p:nvSpPr>
+        <p:spPr>
+          <a:xfrm>
+            <a:off x="457200" y="1920085"/>
+            <a:ext cx="8543956" cy="4434840"/>
+          </a:xfrm>
+        </p:spPr>
+        <p:txBody>
+          <a:bodyPr>
+            <a:normAutofit fontScale="92500" lnSpcReduction="20000"/>
+          </a:bodyPr>
+          <a:lstStyle/>
+          <a:p>
+            <a:pPr>
+              <a:buNone/>
+            </a:pPr>
+            <a:r>
+              <a:rPr lang="pl-PL" dirty="0" smtClean="0"/>
+              <a:t>1.  </a:t>
+            </a:r>
+            <a:r>
+              <a:rPr lang="pl-PL" dirty="0" err="1" smtClean="0"/>
+              <a:t>Statista</a:t>
+            </a:r>
+            <a:r>
+              <a:rPr lang="pl-PL" dirty="0" smtClean="0"/>
+              <a:t> [dostęp: 12 grudnia 2022]</a:t>
+            </a:r>
+            <a:endParaRPr lang="pl-PL" dirty="0" smtClean="0"/>
+          </a:p>
+          <a:p>
+            <a:pPr>
+              <a:buNone/>
+            </a:pPr>
+            <a:r>
+              <a:rPr lang="pl-PL" u="sng" dirty="0" smtClean="0">
+                <a:hlinkClick r:id="rId1"/>
+              </a:rPr>
+              <a:t>https://</a:t>
+            </a:r>
+            <a:r>
+              <a:rPr lang="pl-PL" u="sng" dirty="0" smtClean="0">
+                <a:hlinkClick r:id="rId1"/>
+              </a:rPr>
+              <a:t>www.statista.com/statistics/330695/number-of-smartphone-users-worldwide</a:t>
+            </a:r>
+            <a:r>
+              <a:rPr lang="pl-PL" u="sng" dirty="0" smtClean="0">
+                <a:hlinkClick r:id="rId1"/>
+              </a:rPr>
+              <a:t>/</a:t>
+            </a:r>
+            <a:endParaRPr lang="pl-PL" dirty="0" smtClean="0"/>
+          </a:p>
+          <a:p>
+            <a:pPr>
+              <a:buNone/>
+            </a:pPr>
+            <a:r>
+              <a:rPr lang="pl-PL" dirty="0" smtClean="0"/>
+              <a:t>2.  </a:t>
+            </a:r>
+            <a:r>
+              <a:rPr lang="pl-PL" dirty="0" err="1" smtClean="0"/>
+              <a:t>Statista</a:t>
+            </a:r>
+            <a:r>
+              <a:rPr lang="pl-PL" dirty="0" smtClean="0"/>
+              <a:t> [dostęp: 12 grudnia 2022]</a:t>
+            </a:r>
+            <a:endParaRPr lang="pl-PL" dirty="0" smtClean="0"/>
+          </a:p>
+          <a:p>
+            <a:pPr>
+              <a:buNone/>
+            </a:pPr>
+            <a:r>
+              <a:rPr lang="pl-PL" dirty="0" smtClean="0">
+                <a:hlinkClick r:id="rId2"/>
+              </a:rPr>
+              <a:t>https</a:t>
+            </a:r>
+            <a:r>
+              <a:rPr lang="pl-PL" dirty="0" smtClean="0">
+                <a:hlinkClick r:id="rId2"/>
+              </a:rPr>
+              <a:t>://</a:t>
+            </a:r>
+            <a:r>
+              <a:rPr lang="pl-PL" dirty="0" smtClean="0">
+                <a:hlinkClick r:id="rId2"/>
+              </a:rPr>
+              <a:t>www.statista.com/statistics/734332/google-play-app-installs-per-year/</a:t>
+            </a:r>
+            <a:endParaRPr lang="pl-PL" dirty="0" smtClean="0"/>
+          </a:p>
+          <a:p>
+            <a:pPr>
+              <a:buNone/>
+            </a:pPr>
+            <a:r>
+              <a:rPr lang="pl-PL" u="sng" dirty="0" smtClean="0"/>
+              <a:t>3. </a:t>
+            </a:r>
+            <a:r>
+              <a:rPr lang="pl-PL" dirty="0" err="1" smtClean="0"/>
+              <a:t>Muntenescu</a:t>
+            </a:r>
+            <a:r>
+              <a:rPr lang="pl-PL" dirty="0" smtClean="0"/>
+              <a:t> </a:t>
+            </a:r>
+            <a:r>
+              <a:rPr lang="pl-PL" dirty="0" err="1" smtClean="0"/>
+              <a:t>Florina</a:t>
+            </a:r>
+            <a:r>
+              <a:rPr lang="pl-PL" dirty="0" smtClean="0"/>
+              <a:t>, </a:t>
+            </a:r>
+            <a:r>
+              <a:rPr lang="pl-PL" i="1" dirty="0" smtClean="0"/>
+              <a:t>Android </a:t>
+            </a:r>
+            <a:r>
+              <a:rPr lang="pl-PL" i="1" dirty="0" err="1" smtClean="0"/>
+              <a:t>Architecture</a:t>
+            </a:r>
+            <a:r>
+              <a:rPr lang="pl-PL" i="1" dirty="0" smtClean="0"/>
+              <a:t> </a:t>
+            </a:r>
+            <a:r>
+              <a:rPr lang="pl-PL" i="1" dirty="0" err="1" smtClean="0"/>
+              <a:t>Patterns</a:t>
+            </a:r>
+            <a:r>
+              <a:rPr lang="pl-PL" i="1" dirty="0" smtClean="0"/>
+              <a:t> Part 2: </a:t>
+            </a:r>
+            <a:r>
+              <a:rPr lang="pl-PL" i="1" dirty="0" err="1" smtClean="0"/>
+              <a:t>Model-View-Presenter</a:t>
+            </a:r>
+            <a:r>
+              <a:rPr lang="pl-PL" i="1" dirty="0" smtClean="0"/>
+              <a:t> </a:t>
+            </a:r>
+            <a:r>
+              <a:rPr lang="pl-PL" dirty="0" smtClean="0"/>
+              <a:t>[</a:t>
+            </a:r>
+            <a:r>
+              <a:rPr lang="pl-PL" dirty="0" smtClean="0"/>
+              <a:t>dostęp </a:t>
+            </a:r>
+            <a:r>
+              <a:rPr lang="pl-PL" dirty="0" smtClean="0"/>
+              <a:t>12 </a:t>
+            </a:r>
+            <a:r>
+              <a:rPr lang="pl-PL" dirty="0" smtClean="0"/>
+              <a:t>grudnia </a:t>
+            </a:r>
+            <a:r>
+              <a:rPr lang="pl-PL" dirty="0" smtClean="0"/>
+              <a:t>2022] </a:t>
+            </a:r>
+            <a:endParaRPr lang="pl-PL" dirty="0" smtClean="0"/>
+          </a:p>
+          <a:p>
+            <a:pPr>
+              <a:buNone/>
+            </a:pPr>
+            <a:r>
+              <a:rPr lang="pl-PL" dirty="0" smtClean="0"/>
+              <a:t>https://</a:t>
+            </a:r>
+            <a:r>
+              <a:rPr lang="pl-PL" dirty="0" smtClean="0"/>
+              <a:t>medium.com/upday-devs/android-architecture-p</a:t>
+            </a:r>
+            <a:endParaRPr lang="pl-PL" dirty="0" smtClean="0"/>
+          </a:p>
+          <a:p>
+            <a:pPr>
+              <a:buNone/>
+            </a:pPr>
+            <a:r>
+              <a:rPr lang="pl-PL" dirty="0" smtClean="0"/>
+              <a:t>atterns-part-2-model-viewpresenter-8a6faaae14a5</a:t>
+            </a:r>
+            <a:endParaRPr lang="pl-PL" dirty="0" smtClean="0"/>
+          </a:p>
+          <a:p>
+            <a:pPr>
+              <a:buNone/>
+            </a:pPr>
+            <a:r>
+              <a:rPr lang="pl-PL" dirty="0" smtClean="0"/>
+              <a:t>4.</a:t>
+            </a:r>
+            <a:r>
+              <a:rPr lang="pl-PL" dirty="0" smtClean="0"/>
+              <a:t> Griffiths, Down, </a:t>
+            </a:r>
+            <a:r>
+              <a:rPr lang="pl-PL" i="1" dirty="0" smtClean="0"/>
+              <a:t>Android: programowanie aplikacji</a:t>
+            </a:r>
+            <a:r>
+              <a:rPr lang="pl-PL" dirty="0" smtClean="0"/>
+              <a:t>, Gliwice, Helion, 2016, </a:t>
+            </a:r>
+            <a:r>
+              <a:rPr lang="pl-PL" dirty="0" smtClean="0"/>
+              <a:t>ISBN978-83-283-2063-5 </a:t>
+            </a:r>
+            <a:endParaRPr lang="pl-PL" dirty="0"/>
           </a:p>
         </p:txBody>
       </p:sp>
@@ -6015,7 +6761,7 @@
         </p:spPr>
         <p:txBody>
           <a:bodyPr>
-            <a:normAutofit fontScale="47500" lnSpcReduction="20000"/>
+            <a:normAutofit fontScale="77500" lnSpcReduction="20000"/>
           </a:bodyPr>
           <a:lstStyle/>
           <a:p>
@@ -6038,6 +6784,7 @@
               <a:rPr lang="pl-PL" sz="2900" dirty="0" smtClean="0"/>
               <a:t>, w którym może on zapisywać zjadane przez niego posiłki, przekąski, a następnie wprowadzanie ich do planu dnia o dowolnej godzinie i w dowolnym miejscu. </a:t>
             </a:r>
+            <a:endParaRPr lang="pl-PL" sz="2900" dirty="0" smtClean="0"/>
           </a:p>
           <a:p>
             <a:pPr>
@@ -6045,32 +6792,7 @@
             </a:pPr>
             <a:r>
               <a:rPr lang="pl-PL" sz="2900" dirty="0" smtClean="0"/>
-              <a:t>		Ponieważ problem alergii nie ogranicza się tylko do spożywanych posiłków, </a:t>
-            </a:r>
-            <a:r>
-              <a:rPr lang="pl-PL" sz="2900" b="1" dirty="0" smtClean="0"/>
-              <a:t>aplikacja pozwala na dodawanie zapisów w postaci chemii, zwierząt i roślin</a:t>
-            </a:r>
-            <a:r>
-              <a:rPr lang="pl-PL" sz="2900" dirty="0" smtClean="0"/>
-              <a:t>, z jakimi użytkownik miał kontakt. Zapis ten wykonujemy identycznie jak poprzedni.</a:t>
-            </a:r>
-          </a:p>
-          <a:p>
-            <a:pPr>
-              <a:buNone/>
-            </a:pPr>
-            <a:r>
-              <a:rPr lang="pl-PL" sz="2900" dirty="0" smtClean="0"/>
-              <a:t>		Dodatkową funkcjonalnością aplikacji jest </a:t>
-            </a:r>
-            <a:r>
-              <a:rPr lang="pl-PL" sz="2900" b="1" dirty="0" smtClean="0"/>
-              <a:t>możliwość dodawania wybranych zapisów do listy alergii,</a:t>
-            </a:r>
-            <a:r>
-              <a:rPr lang="pl-PL" sz="2900" dirty="0" smtClean="0"/>
-              <a:t> dzięki czemu użytkownik ma możliwość sprawdzenia uczulające go elementy. Za pomocą wprowadzonego  filtrowania danych z ww. listy wzrasta szybkość  wyszukiwania elementów. Jest to bardzo istotny dodatek, ponieważ w przypadkach zagrażających życiu ogromną wagę ma czas reakcji, często przed wystąpieniem objawów.</a:t>
+              <a:t>		</a:t>
             </a:r>
             <a:endParaRPr lang="pl-PL" sz="2900" dirty="0"/>
           </a:p>
@@ -6109,7 +6831,7 @@
           <p:nvPr/>
         </p:nvPicPr>
         <p:blipFill>
-          <a:blip r:embed="rId2" cstate="print"/>
+          <a:blip r:embed="rId1" cstate="print"/>
           <a:srcRect/>
           <a:stretch>
             <a:fillRect/>
@@ -6128,7 +6850,7 @@
       </p:pic>
       <p:sp>
         <p:nvSpPr>
-          <p:cNvPr id="6" name="pole tekstowe 5"/>
+          <p:cNvPr id="6" name="Pole tekstowe 5"/>
           <p:cNvSpPr txBox="1"/>
           <p:nvPr/>
         </p:nvSpPr>
@@ -6245,6 +6967,7 @@
               <a:rPr lang="pl-PL" dirty="0" smtClean="0"/>
               <a:t>„Dziennik Alergika”</a:t>
             </a:r>
+            <a:endParaRPr lang="pl-PL" dirty="0" smtClean="0"/>
           </a:p>
           <a:p>
             <a:pPr>
@@ -6261,6 +6984,39 @@
       <p:pic>
         <p:nvPicPr>
           <p:cNvPr id="28674" name="Picture 2"/>
+          <p:cNvPicPr>
+            <a:picLocks noChangeAspect="1" noChangeArrowheads="1"/>
+          </p:cNvPicPr>
+          <p:nvPr/>
+        </p:nvPicPr>
+        <p:blipFill>
+          <a:blip r:embed="rId1"/>
+          <a:srcRect/>
+          <a:stretch>
+            <a:fillRect/>
+          </a:stretch>
+        </p:blipFill>
+        <p:spPr bwMode="auto">
+          <a:xfrm>
+            <a:off x="428596" y="3000372"/>
+            <a:ext cx="1767041" cy="3714752"/>
+          </a:xfrm>
+          <a:prstGeom prst="rect">
+            <a:avLst/>
+          </a:prstGeom>
+          <a:noFill/>
+          <a:ln w="9525">
+            <a:noFill/>
+            <a:miter lim="800000"/>
+            <a:headEnd/>
+            <a:tailEnd/>
+          </a:ln>
+          <a:effectLst/>
+        </p:spPr>
+      </p:pic>
+      <p:pic>
+        <p:nvPicPr>
+          <p:cNvPr id="28675" name="Picture 3"/>
           <p:cNvPicPr>
             <a:picLocks noChangeAspect="1" noChangeArrowheads="1"/>
           </p:cNvPicPr>
@@ -6275,8 +7031,8 @@
         </p:blipFill>
         <p:spPr bwMode="auto">
           <a:xfrm>
-            <a:off x="428596" y="3000372"/>
-            <a:ext cx="1767041" cy="3714752"/>
+            <a:off x="2714612" y="3000372"/>
+            <a:ext cx="1753832" cy="3714776"/>
           </a:xfrm>
           <a:prstGeom prst="rect">
             <a:avLst/>
@@ -6293,7 +7049,7 @@
       </p:pic>
       <p:pic>
         <p:nvPicPr>
-          <p:cNvPr id="28675" name="Picture 3"/>
+          <p:cNvPr id="28676" name="Picture 4"/>
           <p:cNvPicPr>
             <a:picLocks noChangeAspect="1" noChangeArrowheads="1"/>
           </p:cNvPicPr>
@@ -6308,8 +7064,8 @@
         </p:blipFill>
         <p:spPr bwMode="auto">
           <a:xfrm>
-            <a:off x="2714612" y="3000372"/>
-            <a:ext cx="1753832" cy="3714776"/>
+            <a:off x="4857752" y="3000372"/>
+            <a:ext cx="1748911" cy="3714776"/>
           </a:xfrm>
           <a:prstGeom prst="rect">
             <a:avLst/>
@@ -6326,7 +7082,7 @@
       </p:pic>
       <p:pic>
         <p:nvPicPr>
-          <p:cNvPr id="28676" name="Picture 4"/>
+          <p:cNvPr id="28677" name="Picture 5"/>
           <p:cNvPicPr>
             <a:picLocks noChangeAspect="1" noChangeArrowheads="1"/>
           </p:cNvPicPr>
@@ -6341,8 +7097,8 @@
         </p:blipFill>
         <p:spPr bwMode="auto">
           <a:xfrm>
-            <a:off x="4857752" y="3000372"/>
-            <a:ext cx="1748911" cy="3714776"/>
+            <a:off x="7072330" y="3000372"/>
+            <a:ext cx="1736482" cy="3714752"/>
           </a:xfrm>
           <a:prstGeom prst="rect">
             <a:avLst/>
@@ -6357,42 +7113,9 @@
           <a:effectLst/>
         </p:spPr>
       </p:pic>
-      <p:pic>
-        <p:nvPicPr>
-          <p:cNvPr id="28677" name="Picture 5"/>
-          <p:cNvPicPr>
-            <a:picLocks noChangeAspect="1" noChangeArrowheads="1"/>
-          </p:cNvPicPr>
-          <p:nvPr/>
-        </p:nvPicPr>
-        <p:blipFill>
-          <a:blip r:embed="rId5"/>
-          <a:srcRect/>
-          <a:stretch>
-            <a:fillRect/>
-          </a:stretch>
-        </p:blipFill>
-        <p:spPr bwMode="auto">
-          <a:xfrm>
-            <a:off x="7072330" y="3000372"/>
-            <a:ext cx="1736482" cy="3714752"/>
-          </a:xfrm>
-          <a:prstGeom prst="rect">
-            <a:avLst/>
-          </a:prstGeom>
-          <a:noFill/>
-          <a:ln w="9525">
-            <a:noFill/>
-            <a:miter lim="800000"/>
-            <a:headEnd/>
-            <a:tailEnd/>
-          </a:ln>
-          <a:effectLst/>
-        </p:spPr>
-      </p:pic>
-      <p:sp>
-        <p:nvSpPr>
-          <p:cNvPr id="8" name="pole tekstowe 7"/>
+      <p:sp>
+        <p:nvSpPr>
+          <p:cNvPr id="8" name="Pole tekstowe 7"/>
           <p:cNvSpPr txBox="1"/>
           <p:nvPr/>
         </p:nvSpPr>
@@ -6509,6 +7232,7 @@
               <a:rPr lang="pl-PL" dirty="0" smtClean="0"/>
               <a:t>„Apsik!”</a:t>
             </a:r>
+            <a:endParaRPr lang="pl-PL" dirty="0" smtClean="0"/>
           </a:p>
           <a:p>
             <a:pPr>
@@ -6525,6 +7249,39 @@
       <p:pic>
         <p:nvPicPr>
           <p:cNvPr id="29698" name="Picture 2"/>
+          <p:cNvPicPr>
+            <a:picLocks noChangeAspect="1" noChangeArrowheads="1"/>
+          </p:cNvPicPr>
+          <p:nvPr/>
+        </p:nvPicPr>
+        <p:blipFill>
+          <a:blip r:embed="rId1" cstate="print"/>
+          <a:srcRect/>
+          <a:stretch>
+            <a:fillRect/>
+          </a:stretch>
+        </p:blipFill>
+        <p:spPr bwMode="auto">
+          <a:xfrm>
+            <a:off x="785786" y="3143248"/>
+            <a:ext cx="1502819" cy="3143272"/>
+          </a:xfrm>
+          <a:prstGeom prst="rect">
+            <a:avLst/>
+          </a:prstGeom>
+          <a:noFill/>
+          <a:ln w="9525">
+            <a:noFill/>
+            <a:miter lim="800000"/>
+            <a:headEnd/>
+            <a:tailEnd/>
+          </a:ln>
+          <a:effectLst/>
+        </p:spPr>
+      </p:pic>
+      <p:pic>
+        <p:nvPicPr>
+          <p:cNvPr id="29699" name="Picture 3"/>
           <p:cNvPicPr>
             <a:picLocks noChangeAspect="1" noChangeArrowheads="1"/>
           </p:cNvPicPr>
@@ -6539,8 +7296,8 @@
         </p:blipFill>
         <p:spPr bwMode="auto">
           <a:xfrm>
-            <a:off x="785786" y="3143248"/>
-            <a:ext cx="1502819" cy="3143272"/>
+            <a:off x="3000364" y="3143248"/>
+            <a:ext cx="1500198" cy="3141854"/>
           </a:xfrm>
           <a:prstGeom prst="rect">
             <a:avLst/>
@@ -6557,7 +7314,7 @@
       </p:pic>
       <p:pic>
         <p:nvPicPr>
-          <p:cNvPr id="29699" name="Picture 3"/>
+          <p:cNvPr id="29701" name="Picture 5"/>
           <p:cNvPicPr>
             <a:picLocks noChangeAspect="1" noChangeArrowheads="1"/>
           </p:cNvPicPr>
@@ -6572,8 +7329,8 @@
         </p:blipFill>
         <p:spPr bwMode="auto">
           <a:xfrm>
-            <a:off x="3000364" y="3143248"/>
-            <a:ext cx="1500198" cy="3141854"/>
+            <a:off x="5072066" y="3143248"/>
+            <a:ext cx="1500198" cy="3141853"/>
           </a:xfrm>
           <a:prstGeom prst="rect">
             <a:avLst/>
@@ -6590,7 +7347,7 @@
       </p:pic>
       <p:pic>
         <p:nvPicPr>
-          <p:cNvPr id="29701" name="Picture 5"/>
+          <p:cNvPr id="29702" name="Picture 6"/>
           <p:cNvPicPr>
             <a:picLocks noChangeAspect="1" noChangeArrowheads="1"/>
           </p:cNvPicPr>
@@ -6605,8 +7362,8 @@
         </p:blipFill>
         <p:spPr bwMode="auto">
           <a:xfrm>
-            <a:off x="5072066" y="3143248"/>
-            <a:ext cx="1500198" cy="3141853"/>
+            <a:off x="7072330" y="3143248"/>
+            <a:ext cx="1478529" cy="3143272"/>
           </a:xfrm>
           <a:prstGeom prst="rect">
             <a:avLst/>
@@ -6621,42 +7378,9 @@
           <a:effectLst/>
         </p:spPr>
       </p:pic>
-      <p:pic>
-        <p:nvPicPr>
-          <p:cNvPr id="29702" name="Picture 6"/>
-          <p:cNvPicPr>
-            <a:picLocks noChangeAspect="1" noChangeArrowheads="1"/>
-          </p:cNvPicPr>
-          <p:nvPr/>
-        </p:nvPicPr>
-        <p:blipFill>
-          <a:blip r:embed="rId5" cstate="print"/>
-          <a:srcRect/>
-          <a:stretch>
-            <a:fillRect/>
-          </a:stretch>
-        </p:blipFill>
-        <p:spPr bwMode="auto">
-          <a:xfrm>
-            <a:off x="7072330" y="3143248"/>
-            <a:ext cx="1478529" cy="3143272"/>
-          </a:xfrm>
-          <a:prstGeom prst="rect">
-            <a:avLst/>
-          </a:prstGeom>
-          <a:noFill/>
-          <a:ln w="9525">
-            <a:noFill/>
-            <a:miter lim="800000"/>
-            <a:headEnd/>
-            <a:tailEnd/>
-          </a:ln>
-          <a:effectLst/>
-        </p:spPr>
-      </p:pic>
-      <p:sp>
-        <p:nvSpPr>
-          <p:cNvPr id="8" name="pole tekstowe 7"/>
+      <p:sp>
+        <p:nvSpPr>
+          <p:cNvPr id="8" name="Pole tekstowe 7"/>
           <p:cNvSpPr txBox="1"/>
           <p:nvPr/>
         </p:nvSpPr>
@@ -6766,6 +7490,7 @@
               <a:rPr lang="pl-PL" dirty="0" smtClean="0"/>
               <a:t>Logowanie oraz Rejestracja</a:t>
             </a:r>
+            <a:endParaRPr lang="pl-PL" dirty="0" smtClean="0"/>
           </a:p>
           <a:p>
             <a:pPr>
@@ -6782,6 +7507,39 @@
       <p:pic>
         <p:nvPicPr>
           <p:cNvPr id="30722" name="Picture 2"/>
+          <p:cNvPicPr>
+            <a:picLocks noChangeAspect="1" noChangeArrowheads="1"/>
+          </p:cNvPicPr>
+          <p:nvPr/>
+        </p:nvPicPr>
+        <p:blipFill>
+          <a:blip r:embed="rId1"/>
+          <a:srcRect/>
+          <a:stretch>
+            <a:fillRect/>
+          </a:stretch>
+        </p:blipFill>
+        <p:spPr bwMode="auto">
+          <a:xfrm>
+            <a:off x="1785918" y="3143248"/>
+            <a:ext cx="1929709" cy="3338294"/>
+          </a:xfrm>
+          <a:prstGeom prst="rect">
+            <a:avLst/>
+          </a:prstGeom>
+          <a:noFill/>
+          <a:ln w="9525">
+            <a:noFill/>
+            <a:miter lim="800000"/>
+            <a:headEnd/>
+            <a:tailEnd/>
+          </a:ln>
+          <a:effectLst/>
+        </p:spPr>
+      </p:pic>
+      <p:pic>
+        <p:nvPicPr>
+          <p:cNvPr id="30723" name="Picture 3"/>
           <p:cNvPicPr>
             <a:picLocks noChangeAspect="1" noChangeArrowheads="1"/>
           </p:cNvPicPr>
@@ -6796,8 +7554,8 @@
         </p:blipFill>
         <p:spPr bwMode="auto">
           <a:xfrm>
-            <a:off x="1785918" y="3143248"/>
-            <a:ext cx="1929709" cy="3338294"/>
+            <a:off x="5000628" y="3143248"/>
+            <a:ext cx="1954261" cy="3357586"/>
           </a:xfrm>
           <a:prstGeom prst="rect">
             <a:avLst/>
@@ -6812,42 +7570,9 @@
           <a:effectLst/>
         </p:spPr>
       </p:pic>
-      <p:pic>
-        <p:nvPicPr>
-          <p:cNvPr id="30723" name="Picture 3"/>
-          <p:cNvPicPr>
-            <a:picLocks noChangeAspect="1" noChangeArrowheads="1"/>
-          </p:cNvPicPr>
-          <p:nvPr/>
-        </p:nvPicPr>
-        <p:blipFill>
-          <a:blip r:embed="rId3"/>
-          <a:srcRect/>
-          <a:stretch>
-            <a:fillRect/>
-          </a:stretch>
-        </p:blipFill>
-        <p:spPr bwMode="auto">
-          <a:xfrm>
-            <a:off x="5000628" y="3143248"/>
-            <a:ext cx="1954261" cy="3357586"/>
-          </a:xfrm>
-          <a:prstGeom prst="rect">
-            <a:avLst/>
-          </a:prstGeom>
-          <a:noFill/>
-          <a:ln w="9525">
-            <a:noFill/>
-            <a:miter lim="800000"/>
-            <a:headEnd/>
-            <a:tailEnd/>
-          </a:ln>
-          <a:effectLst/>
-        </p:spPr>
-      </p:pic>
-      <p:sp>
-        <p:nvSpPr>
-          <p:cNvPr id="6" name="pole tekstowe 5"/>
+      <p:sp>
+        <p:nvSpPr>
+          <p:cNvPr id="6" name="Pole tekstowe 5"/>
           <p:cNvSpPr txBox="1"/>
           <p:nvPr/>
         </p:nvSpPr>
@@ -6951,6 +7676,7 @@
               <a:rPr lang="pl-PL" sz="1300" dirty="0" smtClean="0"/>
               <a:t>.  Zapisywane wiersze zostają dodane do listy i wyświetlane są w kolejności ich dodania.</a:t>
             </a:r>
+            <a:endParaRPr lang="pl-PL" sz="1300" dirty="0" smtClean="0"/>
           </a:p>
           <a:p>
             <a:pPr>
@@ -6960,6 +7686,7 @@
               <a:rPr lang="pl-PL" sz="1300" dirty="0" smtClean="0"/>
               <a:t>Natomiast kliknięcie w wybrany wiersz powoduje otworzenie okna z właściwościami.</a:t>
             </a:r>
+            <a:endParaRPr lang="pl-PL" sz="1300" dirty="0" smtClean="0"/>
           </a:p>
           <a:p>
             <a:endParaRPr lang="pl-PL" sz="1500" dirty="0"/>
@@ -6969,6 +7696,39 @@
       <p:pic>
         <p:nvPicPr>
           <p:cNvPr id="31746" name="Picture 2"/>
+          <p:cNvPicPr>
+            <a:picLocks noChangeAspect="1" noChangeArrowheads="1"/>
+          </p:cNvPicPr>
+          <p:nvPr/>
+        </p:nvPicPr>
+        <p:blipFill>
+          <a:blip r:embed="rId1"/>
+          <a:srcRect/>
+          <a:stretch>
+            <a:fillRect/>
+          </a:stretch>
+        </p:blipFill>
+        <p:spPr bwMode="auto">
+          <a:xfrm>
+            <a:off x="857224" y="2214554"/>
+            <a:ext cx="2311811" cy="4010031"/>
+          </a:xfrm>
+          <a:prstGeom prst="rect">
+            <a:avLst/>
+          </a:prstGeom>
+          <a:noFill/>
+          <a:ln w="9525">
+            <a:noFill/>
+            <a:miter lim="800000"/>
+            <a:headEnd/>
+            <a:tailEnd/>
+          </a:ln>
+          <a:effectLst/>
+        </p:spPr>
+      </p:pic>
+      <p:pic>
+        <p:nvPicPr>
+          <p:cNvPr id="31747" name="Picture 3"/>
           <p:cNvPicPr>
             <a:picLocks noChangeAspect="1" noChangeArrowheads="1"/>
           </p:cNvPicPr>
@@ -6983,8 +7743,8 @@
         </p:blipFill>
         <p:spPr bwMode="auto">
           <a:xfrm>
-            <a:off x="857224" y="2214554"/>
-            <a:ext cx="2311811" cy="4010031"/>
+            <a:off x="3500430" y="2214554"/>
+            <a:ext cx="2303709" cy="4000528"/>
           </a:xfrm>
           <a:prstGeom prst="rect">
             <a:avLst/>
@@ -7001,7 +7761,7 @@
       </p:pic>
       <p:pic>
         <p:nvPicPr>
-          <p:cNvPr id="31747" name="Picture 3"/>
+          <p:cNvPr id="31748" name="Picture 4"/>
           <p:cNvPicPr>
             <a:picLocks noChangeAspect="1" noChangeArrowheads="1"/>
           </p:cNvPicPr>
@@ -7016,8 +7776,8 @@
         </p:blipFill>
         <p:spPr bwMode="auto">
           <a:xfrm>
-            <a:off x="3500430" y="2214554"/>
-            <a:ext cx="2303709" cy="4000528"/>
+            <a:off x="6072198" y="2214554"/>
+            <a:ext cx="2317076" cy="4000528"/>
           </a:xfrm>
           <a:prstGeom prst="rect">
             <a:avLst/>
@@ -7032,42 +7792,9 @@
           <a:effectLst/>
         </p:spPr>
       </p:pic>
-      <p:pic>
-        <p:nvPicPr>
-          <p:cNvPr id="31748" name="Picture 4"/>
-          <p:cNvPicPr>
-            <a:picLocks noChangeAspect="1" noChangeArrowheads="1"/>
-          </p:cNvPicPr>
-          <p:nvPr/>
-        </p:nvPicPr>
-        <p:blipFill>
-          <a:blip r:embed="rId4"/>
-          <a:srcRect/>
-          <a:stretch>
-            <a:fillRect/>
-          </a:stretch>
-        </p:blipFill>
-        <p:spPr bwMode="auto">
-          <a:xfrm>
-            <a:off x="6072198" y="2214554"/>
-            <a:ext cx="2317076" cy="4000528"/>
-          </a:xfrm>
-          <a:prstGeom prst="rect">
-            <a:avLst/>
-          </a:prstGeom>
-          <a:noFill/>
-          <a:ln w="9525">
-            <a:noFill/>
-            <a:miter lim="800000"/>
-            <a:headEnd/>
-            <a:tailEnd/>
-          </a:ln>
-          <a:effectLst/>
-        </p:spPr>
-      </p:pic>
-      <p:sp>
-        <p:nvSpPr>
-          <p:cNvPr id="6" name="pole tekstowe 5"/>
+      <p:sp>
+        <p:nvSpPr>
+          <p:cNvPr id="6" name="Pole tekstowe 5"/>
           <p:cNvSpPr txBox="1"/>
           <p:nvPr/>
         </p:nvSpPr>
@@ -7163,6 +7890,7 @@
               <a:rPr lang="pl-PL" sz="1300" dirty="0" smtClean="0"/>
               <a:t>.  Działanie tego fragmentu aplikacji wygląda tak samo jak w wyżej wymienionej części .</a:t>
             </a:r>
+            <a:endParaRPr lang="pl-PL" sz="1300" dirty="0" smtClean="0"/>
           </a:p>
           <a:p>
             <a:endParaRPr lang="pl-PL" sz="1500" dirty="0"/>
@@ -7172,6 +7900,39 @@
       <p:pic>
         <p:nvPicPr>
           <p:cNvPr id="32770" name="Picture 2"/>
+          <p:cNvPicPr>
+            <a:picLocks noChangeAspect="1" noChangeArrowheads="1"/>
+          </p:cNvPicPr>
+          <p:nvPr/>
+        </p:nvPicPr>
+        <p:blipFill>
+          <a:blip r:embed="rId1"/>
+          <a:srcRect/>
+          <a:stretch>
+            <a:fillRect/>
+          </a:stretch>
+        </p:blipFill>
+        <p:spPr bwMode="auto">
+          <a:xfrm>
+            <a:off x="571472" y="2143116"/>
+            <a:ext cx="2566993" cy="4433897"/>
+          </a:xfrm>
+          <a:prstGeom prst="rect">
+            <a:avLst/>
+          </a:prstGeom>
+          <a:noFill/>
+          <a:ln w="9525">
+            <a:noFill/>
+            <a:miter lim="800000"/>
+            <a:headEnd/>
+            <a:tailEnd/>
+          </a:ln>
+          <a:effectLst/>
+        </p:spPr>
+      </p:pic>
+      <p:pic>
+        <p:nvPicPr>
+          <p:cNvPr id="32771" name="Picture 3"/>
           <p:cNvPicPr>
             <a:picLocks noChangeAspect="1" noChangeArrowheads="1"/>
           </p:cNvPicPr>
@@ -7186,8 +7947,8 @@
         </p:blipFill>
         <p:spPr bwMode="auto">
           <a:xfrm>
-            <a:off x="571472" y="2143116"/>
-            <a:ext cx="2566993" cy="4433897"/>
+            <a:off x="3500431" y="2143116"/>
+            <a:ext cx="2573326" cy="4429156"/>
           </a:xfrm>
           <a:prstGeom prst="rect">
             <a:avLst/>
@@ -7204,7 +7965,7 @@
       </p:pic>
       <p:pic>
         <p:nvPicPr>
-          <p:cNvPr id="32771" name="Picture 3"/>
+          <p:cNvPr id="32772" name="Picture 4"/>
           <p:cNvPicPr>
             <a:picLocks noChangeAspect="1" noChangeArrowheads="1"/>
           </p:cNvPicPr>
@@ -7219,8 +7980,8 @@
         </p:blipFill>
         <p:spPr bwMode="auto">
           <a:xfrm>
-            <a:off x="3500431" y="2143116"/>
-            <a:ext cx="2573326" cy="4429156"/>
+            <a:off x="6286512" y="2143116"/>
+            <a:ext cx="2554491" cy="4429156"/>
           </a:xfrm>
           <a:prstGeom prst="rect">
             <a:avLst/>
@@ -7235,42 +7996,9 @@
           <a:effectLst/>
         </p:spPr>
       </p:pic>
-      <p:pic>
-        <p:nvPicPr>
-          <p:cNvPr id="32772" name="Picture 4"/>
-          <p:cNvPicPr>
-            <a:picLocks noChangeAspect="1" noChangeArrowheads="1"/>
-          </p:cNvPicPr>
-          <p:nvPr/>
-        </p:nvPicPr>
-        <p:blipFill>
-          <a:blip r:embed="rId4"/>
-          <a:srcRect/>
-          <a:stretch>
-            <a:fillRect/>
-          </a:stretch>
-        </p:blipFill>
-        <p:spPr bwMode="auto">
-          <a:xfrm>
-            <a:off x="6286512" y="2143116"/>
-            <a:ext cx="2554491" cy="4429156"/>
-          </a:xfrm>
-          <a:prstGeom prst="rect">
-            <a:avLst/>
-          </a:prstGeom>
-          <a:noFill/>
-          <a:ln w="9525">
-            <a:noFill/>
-            <a:miter lim="800000"/>
-            <a:headEnd/>
-            <a:tailEnd/>
-          </a:ln>
-          <a:effectLst/>
-        </p:spPr>
-      </p:pic>
-      <p:sp>
-        <p:nvSpPr>
-          <p:cNvPr id="6" name="pole tekstowe 5"/>
+      <p:sp>
+        <p:nvSpPr>
+          <p:cNvPr id="6" name="Pole tekstowe 5"/>
           <p:cNvSpPr txBox="1"/>
           <p:nvPr/>
         </p:nvSpPr>
@@ -7352,12 +8080,46 @@
               <a:rPr lang="pl-PL" sz="1500" dirty="0" smtClean="0"/>
               <a:t>Okno z właściwościami wierszy, zawiera ono wszystkie informacje na temat wybranej z listy pozycji. Istnieje tu możliwość edytowania wierszy, usuwania, dodawania do listy alergii oraz dodawania do listy ulubionych.</a:t>
             </a:r>
+            <a:endParaRPr lang="pl-PL" sz="1500" dirty="0" smtClean="0"/>
           </a:p>
         </p:txBody>
       </p:sp>
       <p:pic>
         <p:nvPicPr>
           <p:cNvPr id="33796" name="Picture 4"/>
+          <p:cNvPicPr>
+            <a:picLocks noChangeAspect="1" noChangeArrowheads="1"/>
+          </p:cNvPicPr>
+          <p:nvPr/>
+        </p:nvPicPr>
+        <p:blipFill>
+          <a:blip r:embed="rId1"/>
+          <a:srcRect/>
+          <a:stretch>
+            <a:fillRect/>
+          </a:stretch>
+        </p:blipFill>
+        <p:spPr bwMode="auto">
+          <a:xfrm>
+            <a:off x="1142976" y="1857364"/>
+            <a:ext cx="2683874" cy="4648211"/>
+          </a:xfrm>
+          <a:prstGeom prst="rect">
+            <a:avLst/>
+          </a:prstGeom>
+          <a:noFill/>
+          <a:ln w="9525">
+            <a:noFill/>
+            <a:miter lim="800000"/>
+            <a:headEnd/>
+            <a:tailEnd/>
+          </a:ln>
+          <a:effectLst/>
+        </p:spPr>
+      </p:pic>
+      <p:pic>
+        <p:nvPicPr>
+          <p:cNvPr id="33797" name="Picture 5"/>
           <p:cNvPicPr>
             <a:picLocks noChangeAspect="1" noChangeArrowheads="1"/>
           </p:cNvPicPr>
@@ -7372,8 +8134,8 @@
         </p:blipFill>
         <p:spPr bwMode="auto">
           <a:xfrm>
-            <a:off x="1142976" y="1857364"/>
-            <a:ext cx="2683874" cy="4648211"/>
+            <a:off x="5000628" y="1837916"/>
+            <a:ext cx="2698818" cy="4662918"/>
           </a:xfrm>
           <a:prstGeom prst="rect">
             <a:avLst/>
@@ -7388,42 +8150,9 @@
           <a:effectLst/>
         </p:spPr>
       </p:pic>
-      <p:pic>
-        <p:nvPicPr>
-          <p:cNvPr id="33797" name="Picture 5"/>
-          <p:cNvPicPr>
-            <a:picLocks noChangeAspect="1" noChangeArrowheads="1"/>
-          </p:cNvPicPr>
-          <p:nvPr/>
-        </p:nvPicPr>
-        <p:blipFill>
-          <a:blip r:embed="rId3"/>
-          <a:srcRect/>
-          <a:stretch>
-            <a:fillRect/>
-          </a:stretch>
-        </p:blipFill>
-        <p:spPr bwMode="auto">
-          <a:xfrm>
-            <a:off x="5000628" y="1837916"/>
-            <a:ext cx="2698818" cy="4662918"/>
-          </a:xfrm>
-          <a:prstGeom prst="rect">
-            <a:avLst/>
-          </a:prstGeom>
-          <a:noFill/>
-          <a:ln w="9525">
-            <a:noFill/>
-            <a:miter lim="800000"/>
-            <a:headEnd/>
-            <a:tailEnd/>
-          </a:ln>
-          <a:effectLst/>
-        </p:spPr>
-      </p:pic>
-      <p:sp>
-        <p:nvSpPr>
-          <p:cNvPr id="5" name="pole tekstowe 4"/>
+      <p:sp>
+        <p:nvSpPr>
+          <p:cNvPr id="5" name="Pole tekstowe 4"/>
           <p:cNvSpPr txBox="1"/>
           <p:nvPr/>
         </p:nvSpPr>
@@ -7749,7 +8478,10 @@
       </a:bgFillStyleLst>
     </a:fmtScheme>
   </a:themeElements>
-  <a:objectDefaults/>
-  <a:extraClrSchemeLst/>
+  <a:extLst>
+    <a:ext uri="{05A4C25C-085E-4340-85A3-A5531E510DB2}">
+      <thm15:themeFamily xmlns:thm15="http://schemas.microsoft.com/office/thememl/2012/main" name="Office Theme" id="{62F939B6-93AF-4DB8-9C6B-D6C7DFDC589F}" vid="{4A3C46E8-61CC-4603-A589-7422A47A8E4A}"/>
+    </a:ext>
+  </a:extLst>
 </a:theme>
 </file>
</xml_diff>